<commit_message>
updated and cleaned figures and model summary tables
</commit_message>
<xml_diff>
--- a/PaperOutline_v1_3.pptx
+++ b/PaperOutline_v1_3.pptx
@@ -5,7 +5,7 @@
     <p:sldMasterId id="2147483648" r:id="rId1"/>
   </p:sldMasterIdLst>
   <p:notesMasterIdLst>
-    <p:notesMasterId r:id="rId10"/>
+    <p:notesMasterId r:id="rId12"/>
   </p:notesMasterIdLst>
   <p:sldIdLst>
     <p:sldId id="319" r:id="rId2"/>
@@ -14,8 +14,10 @@
     <p:sldId id="327" r:id="rId5"/>
     <p:sldId id="328" r:id="rId6"/>
     <p:sldId id="329" r:id="rId7"/>
-    <p:sldId id="323" r:id="rId8"/>
-    <p:sldId id="324" r:id="rId9"/>
+    <p:sldId id="330" r:id="rId8"/>
+    <p:sldId id="331" r:id="rId9"/>
+    <p:sldId id="323" r:id="rId10"/>
+    <p:sldId id="324" r:id="rId11"/>
   </p:sldIdLst>
   <p:sldSz cx="12192000" cy="6858000"/>
   <p:notesSz cx="6858000" cy="9144000"/>
@@ -3901,6 +3903,77 @@
 </p:sld>
 </file>
 
+<file path=ppt/slides/slide10.xml><?xml version="1.0" encoding="utf-8"?>
+<p:sld xmlns:a="http://schemas.openxmlformats.org/drawingml/2006/main" xmlns:r="http://schemas.openxmlformats.org/officeDocument/2006/relationships" xmlns:p="http://schemas.openxmlformats.org/presentationml/2006/main">
+  <p:cSld>
+    <p:spTree>
+      <p:nvGrpSpPr>
+        <p:cNvPr id="1" name=""/>
+        <p:cNvGrpSpPr/>
+        <p:nvPr/>
+      </p:nvGrpSpPr>
+      <p:grpSpPr>
+        <a:xfrm>
+          <a:off x="0" y="0"/>
+          <a:ext cx="0" cy="0"/>
+          <a:chOff x="0" y="0"/>
+          <a:chExt cx="0" cy="0"/>
+        </a:xfrm>
+      </p:grpSpPr>
+      <p:pic>
+        <p:nvPicPr>
+          <p:cNvPr id="17" name="Picture 16" descr="Chart&#10;&#10;Description automatically generated">
+            <a:extLst>
+              <a:ext uri="{FF2B5EF4-FFF2-40B4-BE49-F238E27FC236}">
+                <a16:creationId xmlns:a16="http://schemas.microsoft.com/office/drawing/2014/main" id="{B0A57CFC-DA00-25C3-9408-E63214D4F4CA}"/>
+              </a:ext>
+            </a:extLst>
+          </p:cNvPr>
+          <p:cNvPicPr>
+            <a:picLocks noChangeAspect="1"/>
+          </p:cNvPicPr>
+          <p:nvPr/>
+        </p:nvPicPr>
+        <p:blipFill>
+          <a:blip r:embed="rId2">
+            <a:extLst>
+              <a:ext uri="{28A0092B-C50C-407E-A947-70E740481C1C}">
+                <a14:useLocalDpi xmlns:a14="http://schemas.microsoft.com/office/drawing/2010/main" val="0"/>
+              </a:ext>
+            </a:extLst>
+          </a:blip>
+          <a:stretch>
+            <a:fillRect/>
+          </a:stretch>
+        </p:blipFill>
+        <p:spPr>
+          <a:xfrm>
+            <a:off x="1809750" y="0"/>
+            <a:ext cx="8572500" cy="6858000"/>
+          </a:xfrm>
+          <a:prstGeom prst="rect">
+            <a:avLst/>
+          </a:prstGeom>
+          <a:ln>
+            <a:solidFill>
+              <a:schemeClr val="tx1"/>
+            </a:solidFill>
+          </a:ln>
+        </p:spPr>
+      </p:pic>
+    </p:spTree>
+    <p:extLst>
+      <p:ext uri="{BB962C8B-B14F-4D97-AF65-F5344CB8AC3E}">
+        <p14:creationId xmlns:p14="http://schemas.microsoft.com/office/powerpoint/2010/main" val="1656432974"/>
+      </p:ext>
+    </p:extLst>
+  </p:cSld>
+  <p:clrMapOvr>
+    <a:masterClrMapping/>
+  </p:clrMapOvr>
+</p:sld>
+</file>
+
 <file path=ppt/slides/slide2.xml><?xml version="1.0" encoding="utf-8"?>
 <p:sld xmlns:a="http://schemas.openxmlformats.org/drawingml/2006/main" xmlns:r="http://schemas.openxmlformats.org/officeDocument/2006/relationships" xmlns:p="http://schemas.openxmlformats.org/presentationml/2006/main">
   <p:cSld>
@@ -4007,7 +4080,7 @@
         </p:nvSpPr>
         <p:spPr>
           <a:xfrm>
-            <a:off x="5848252" y="2728377"/>
+            <a:off x="5848252" y="2925736"/>
             <a:ext cx="389850" cy="584775"/>
           </a:xfrm>
           <a:prstGeom prst="rect">
@@ -4069,7 +4142,7 @@
         </p:nvSpPr>
         <p:spPr>
           <a:xfrm>
-            <a:off x="6781028" y="880916"/>
+            <a:off x="6815406" y="974618"/>
             <a:ext cx="389850" cy="584775"/>
           </a:xfrm>
           <a:prstGeom prst="rect">
@@ -4131,7 +4204,7 @@
         </p:nvSpPr>
         <p:spPr>
           <a:xfrm>
-            <a:off x="6781028" y="1783254"/>
+            <a:off x="6781028" y="1980613"/>
             <a:ext cx="389850" cy="584775"/>
           </a:xfrm>
           <a:prstGeom prst="rect">
@@ -4193,7 +4266,7 @@
         </p:nvSpPr>
         <p:spPr>
           <a:xfrm>
-            <a:off x="3966173" y="2786655"/>
+            <a:off x="3966173" y="2984014"/>
             <a:ext cx="389850" cy="584775"/>
           </a:xfrm>
           <a:prstGeom prst="rect">
@@ -4255,7 +4328,7 @@
         </p:nvSpPr>
         <p:spPr>
           <a:xfrm>
-            <a:off x="6791438" y="2685592"/>
+            <a:off x="6804594" y="2935579"/>
             <a:ext cx="389850" cy="584775"/>
           </a:xfrm>
           <a:prstGeom prst="rect">
@@ -4317,7 +4390,7 @@
         </p:nvSpPr>
         <p:spPr>
           <a:xfrm>
-            <a:off x="6791438" y="3614004"/>
+            <a:off x="6804594" y="3863991"/>
             <a:ext cx="389850" cy="584775"/>
           </a:xfrm>
           <a:prstGeom prst="rect">
@@ -4379,7 +4452,7 @@
         </p:nvSpPr>
         <p:spPr>
           <a:xfrm>
-            <a:off x="5847643" y="1799891"/>
+            <a:off x="5847643" y="1997250"/>
             <a:ext cx="389850" cy="584775"/>
           </a:xfrm>
           <a:prstGeom prst="rect">
@@ -4441,7 +4514,7 @@
         </p:nvSpPr>
         <p:spPr>
           <a:xfrm>
-            <a:off x="3966173" y="3691143"/>
+            <a:off x="3966173" y="3888502"/>
             <a:ext cx="389850" cy="584775"/>
           </a:xfrm>
           <a:prstGeom prst="rect">
@@ -4756,7 +4829,7 @@
         </p:nvSpPr>
         <p:spPr>
           <a:xfrm>
-            <a:off x="63650" y="3565027"/>
+            <a:off x="63651" y="3565027"/>
             <a:ext cx="3850507" cy="3277820"/>
           </a:xfrm>
           <a:prstGeom prst="rect">
@@ -5788,7 +5861,7 @@
         <p:spPr>
           <a:xfrm>
             <a:off x="63650" y="3565027"/>
-            <a:ext cx="3850507" cy="3277820"/>
+            <a:ext cx="3850507" cy="3139321"/>
           </a:xfrm>
           <a:prstGeom prst="rect">
             <a:avLst/>
@@ -5805,8 +5878,6 @@
               <a:rPr lang="en-US" sz="900" b="1" dirty="0"/>
               <a:t>Abundance of presence only</a:t>
             </a:r>
-          </a:p>
-          <a:p>
             <a:endParaRPr lang="en-US" sz="900" dirty="0"/>
           </a:p>
           <a:p>
@@ -5979,7 +6050,7 @@
         </p:nvSpPr>
         <p:spPr>
           <a:xfrm>
-            <a:off x="1477501" y="564206"/>
+            <a:off x="1497236" y="564206"/>
             <a:ext cx="6206150" cy="369332"/>
           </a:xfrm>
           <a:prstGeom prst="rect">
@@ -6579,12 +6650,52 @@
           <a:chExt cx="0" cy="0"/>
         </a:xfrm>
       </p:grpSpPr>
+      <p:sp>
+        <p:nvSpPr>
+          <p:cNvPr id="4" name="Title 1">
+            <a:extLst>
+              <a:ext uri="{FF2B5EF4-FFF2-40B4-BE49-F238E27FC236}">
+                <a16:creationId xmlns:a16="http://schemas.microsoft.com/office/drawing/2014/main" id="{4B3EB7DA-4C0C-0218-3DD6-466871583DD9}"/>
+              </a:ext>
+            </a:extLst>
+          </p:cNvPr>
+          <p:cNvSpPr>
+            <a:spLocks noGrp="1"/>
+          </p:cNvSpPr>
+          <p:nvPr>
+            <p:ph type="title"/>
+          </p:nvPr>
+        </p:nvSpPr>
+        <p:spPr>
+          <a:xfrm>
+            <a:off x="0" y="25740"/>
+            <a:ext cx="7620000" cy="538466"/>
+          </a:xfrm>
+        </p:spPr>
+        <p:txBody>
+          <a:bodyPr>
+            <a:normAutofit fontScale="90000"/>
+          </a:bodyPr>
+          <a:lstStyle/>
+          <a:p>
+            <a:r>
+              <a:rPr lang="en-US" dirty="0"/>
+              <a:t>Models: </a:t>
+            </a:r>
+            <a:r>
+              <a:rPr lang="en-US" sz="4400" dirty="0"/>
+              <a:t>Summary/Figure</a:t>
+            </a:r>
+            <a:endParaRPr lang="en-US" dirty="0"/>
+          </a:p>
+        </p:txBody>
+      </p:sp>
       <p:pic>
         <p:nvPicPr>
-          <p:cNvPr id="5" name="Picture 4">
-            <a:extLst>
-              <a:ext uri="{FF2B5EF4-FFF2-40B4-BE49-F238E27FC236}">
-                <a16:creationId xmlns:a16="http://schemas.microsoft.com/office/drawing/2014/main" id="{6FD94798-2235-68DA-E129-A9242FE3A7C6}"/>
+          <p:cNvPr id="5" name="Picture 4" descr="Diagram&#10;&#10;Description automatically generated with low confidence">
+            <a:extLst>
+              <a:ext uri="{FF2B5EF4-FFF2-40B4-BE49-F238E27FC236}">
+                <a16:creationId xmlns:a16="http://schemas.microsoft.com/office/drawing/2014/main" id="{F2F2F654-FE9F-B627-F699-AA451159A393}"/>
               </a:ext>
             </a:extLst>
           </p:cNvPr>
@@ -6601,13 +6712,14 @@
               </a:ext>
             </a:extLst>
           </a:blip>
-          <a:srcRect/>
-          <a:stretch/>
+          <a:stretch>
+            <a:fillRect/>
+          </a:stretch>
         </p:blipFill>
         <p:spPr>
           <a:xfrm>
-            <a:off x="79416" y="76147"/>
-            <a:ext cx="5029276" cy="3352851"/>
+            <a:off x="7726860" y="0"/>
+            <a:ext cx="4408714" cy="6858000"/>
           </a:xfrm>
           <a:prstGeom prst="rect">
             <a:avLst/>
@@ -6619,212 +6731,965 @@
           </a:ln>
         </p:spPr>
       </p:pic>
-      <p:pic>
-        <p:nvPicPr>
-          <p:cNvPr id="9" name="Picture 8">
-            <a:extLst>
-              <a:ext uri="{FF2B5EF4-FFF2-40B4-BE49-F238E27FC236}">
-                <a16:creationId xmlns:a16="http://schemas.microsoft.com/office/drawing/2014/main" id="{F6B60D4E-DA31-C0DD-FDE6-81F66DFA2C05}"/>
-              </a:ext>
-            </a:extLst>
-          </p:cNvPr>
-          <p:cNvPicPr>
-            <a:picLocks noChangeAspect="1"/>
-          </p:cNvPicPr>
-          <p:nvPr/>
-        </p:nvPicPr>
-        <p:blipFill>
-          <a:blip r:embed="rId3">
-            <a:extLst>
-              <a:ext uri="{28A0092B-C50C-407E-A947-70E740481C1C}">
-                <a14:useLocalDpi xmlns:a14="http://schemas.microsoft.com/office/drawing/2010/main" val="0"/>
-              </a:ext>
-            </a:extLst>
-          </a:blip>
-          <a:srcRect/>
-          <a:stretch/>
-        </p:blipFill>
-        <p:spPr>
-          <a:xfrm>
-            <a:off x="5221346" y="-2"/>
-            <a:ext cx="3429000" cy="3429000"/>
-          </a:xfrm>
-          <a:prstGeom prst="rect">
-            <a:avLst/>
-          </a:prstGeom>
-        </p:spPr>
-      </p:pic>
-      <p:pic>
-        <p:nvPicPr>
-          <p:cNvPr id="11" name="Picture 10">
-            <a:extLst>
-              <a:ext uri="{FF2B5EF4-FFF2-40B4-BE49-F238E27FC236}">
-                <a16:creationId xmlns:a16="http://schemas.microsoft.com/office/drawing/2014/main" id="{CE640AF2-FDA7-7D89-D2CD-7D5F32369E11}"/>
-              </a:ext>
-            </a:extLst>
-          </p:cNvPr>
-          <p:cNvPicPr>
-            <a:picLocks noChangeAspect="1"/>
-          </p:cNvPicPr>
-          <p:nvPr/>
-        </p:nvPicPr>
-        <p:blipFill>
-          <a:blip r:embed="rId4">
-            <a:extLst>
-              <a:ext uri="{28A0092B-C50C-407E-A947-70E740481C1C}">
-                <a14:useLocalDpi xmlns:a14="http://schemas.microsoft.com/office/drawing/2010/main" val="0"/>
-              </a:ext>
-            </a:extLst>
-          </a:blip>
-          <a:srcRect/>
-          <a:stretch/>
-        </p:blipFill>
-        <p:spPr>
-          <a:xfrm>
-            <a:off x="8763000" y="0"/>
-            <a:ext cx="3429000" cy="3429000"/>
-          </a:xfrm>
-          <a:prstGeom prst="rect">
-            <a:avLst/>
-          </a:prstGeom>
-        </p:spPr>
-      </p:pic>
-      <p:pic>
-        <p:nvPicPr>
-          <p:cNvPr id="14" name="Picture 13">
-            <a:extLst>
-              <a:ext uri="{FF2B5EF4-FFF2-40B4-BE49-F238E27FC236}">
-                <a16:creationId xmlns:a16="http://schemas.microsoft.com/office/drawing/2014/main" id="{C32ED9E6-D291-2EE3-C90D-3F8AB938467A}"/>
-              </a:ext>
-            </a:extLst>
-          </p:cNvPr>
-          <p:cNvPicPr>
-            <a:picLocks noChangeAspect="1"/>
-          </p:cNvPicPr>
-          <p:nvPr/>
-        </p:nvPicPr>
-        <p:blipFill>
-          <a:blip r:embed="rId5">
-            <a:extLst>
-              <a:ext uri="{28A0092B-C50C-407E-A947-70E740481C1C}">
-                <a14:useLocalDpi xmlns:a14="http://schemas.microsoft.com/office/drawing/2010/main" val="0"/>
-              </a:ext>
-            </a:extLst>
-          </a:blip>
-          <a:srcRect/>
-          <a:stretch/>
-        </p:blipFill>
-        <p:spPr>
-          <a:xfrm>
-            <a:off x="5221346" y="3428999"/>
-            <a:ext cx="3429001" cy="3429001"/>
-          </a:xfrm>
-          <a:prstGeom prst="rect">
-            <a:avLst/>
-          </a:prstGeom>
-        </p:spPr>
-      </p:pic>
-      <p:pic>
-        <p:nvPicPr>
-          <p:cNvPr id="18" name="Picture 17">
-            <a:extLst>
-              <a:ext uri="{FF2B5EF4-FFF2-40B4-BE49-F238E27FC236}">
-                <a16:creationId xmlns:a16="http://schemas.microsoft.com/office/drawing/2014/main" id="{D1AE3916-4792-67CE-6EF4-4E30E6EF82BD}"/>
-              </a:ext>
-            </a:extLst>
-          </p:cNvPr>
-          <p:cNvPicPr>
-            <a:picLocks noChangeAspect="1"/>
-          </p:cNvPicPr>
-          <p:nvPr/>
-        </p:nvPicPr>
-        <p:blipFill>
-          <a:blip r:embed="rId6">
-            <a:extLst>
-              <a:ext uri="{28A0092B-C50C-407E-A947-70E740481C1C}">
-                <a14:useLocalDpi xmlns:a14="http://schemas.microsoft.com/office/drawing/2010/main" val="0"/>
-              </a:ext>
-            </a:extLst>
-          </a:blip>
-          <a:srcRect/>
-          <a:stretch/>
-        </p:blipFill>
-        <p:spPr>
-          <a:xfrm>
-            <a:off x="8762998" y="3428998"/>
-            <a:ext cx="3429002" cy="3429002"/>
-          </a:xfrm>
-          <a:prstGeom prst="rect">
-            <a:avLst/>
-          </a:prstGeom>
-        </p:spPr>
-      </p:pic>
-      <p:sp>
-        <p:nvSpPr>
-          <p:cNvPr id="36" name="Rectangle 35">
-            <a:extLst>
-              <a:ext uri="{FF2B5EF4-FFF2-40B4-BE49-F238E27FC236}">
-                <a16:creationId xmlns:a16="http://schemas.microsoft.com/office/drawing/2014/main" id="{470BE9EB-0BE0-8E85-F236-34BA746076C6}"/>
-              </a:ext>
-            </a:extLst>
-          </p:cNvPr>
-          <p:cNvSpPr/>
-          <p:nvPr/>
-        </p:nvSpPr>
-        <p:spPr>
-          <a:xfrm>
-            <a:off x="7778022" y="3264156"/>
-            <a:ext cx="389850" cy="584775"/>
-          </a:xfrm>
-          <a:prstGeom prst="rect">
-            <a:avLst/>
-          </a:prstGeom>
-          <a:noFill/>
-        </p:spPr>
-        <p:txBody>
-          <a:bodyPr wrap="none" lIns="91440" tIns="45720" rIns="91440" bIns="45720">
-            <a:spAutoFit/>
-          </a:bodyPr>
-          <a:lstStyle/>
-          <a:p>
-            <a:pPr algn="ctr"/>
-            <a:r>
-              <a:rPr lang="en-US" sz="3200" b="0" i="0" u="none" strike="noStrike" cap="none" spc="0" dirty="0">
-                <a:ln w="0"/>
-                <a:solidFill>
-                  <a:schemeClr val="tx1"/>
-                </a:solidFill>
-                <a:effectLst>
-                  <a:outerShdw blurRad="38100" dist="19050" dir="2700000" algn="tl" rotWithShape="0">
-                    <a:schemeClr val="dk1">
-                      <a:alpha val="40000"/>
-                    </a:schemeClr>
-                  </a:outerShdw>
-                </a:effectLst>
-                <a:latin typeface="Calibri" panose="020F0502020204030204" pitchFamily="34" charset="0"/>
-              </a:rPr>
-              <a:t>*</a:t>
-            </a:r>
-            <a:endParaRPr lang="en-US" sz="3200" b="0" cap="none" spc="0" dirty="0">
-              <a:ln w="0"/>
-              <a:solidFill>
-                <a:schemeClr val="tx1"/>
-              </a:solidFill>
-              <a:effectLst>
-                <a:outerShdw blurRad="38100" dist="19050" dir="2700000" algn="tl" rotWithShape="0">
-                  <a:schemeClr val="dk1">
-                    <a:alpha val="40000"/>
-                  </a:schemeClr>
-                </a:outerShdw>
-              </a:effectLst>
-            </a:endParaRPr>
-          </a:p>
-        </p:txBody>
-      </p:sp>
+      <p:graphicFrame>
+        <p:nvGraphicFramePr>
+          <p:cNvPr id="7" name="Table 6">
+            <a:extLst>
+              <a:ext uri="{FF2B5EF4-FFF2-40B4-BE49-F238E27FC236}">
+                <a16:creationId xmlns:a16="http://schemas.microsoft.com/office/drawing/2014/main" id="{EC4C04CA-FB2E-FF99-1D98-EFBDD90D8D24}"/>
+              </a:ext>
+            </a:extLst>
+          </p:cNvPr>
+          <p:cNvGraphicFramePr>
+            <a:graphicFrameLocks noGrp="1"/>
+          </p:cNvGraphicFramePr>
+          <p:nvPr>
+            <p:extLst>
+              <p:ext uri="{D42A27DB-BD31-4B8C-83A1-F6EECF244321}">
+                <p14:modId xmlns:p14="http://schemas.microsoft.com/office/powerpoint/2010/main" val="4056011892"/>
+              </p:ext>
+            </p:extLst>
+          </p:nvPr>
+        </p:nvGraphicFramePr>
+        <p:xfrm>
+          <a:off x="1294441" y="2343539"/>
+          <a:ext cx="5524500" cy="1645920"/>
+        </p:xfrm>
+        <a:graphic>
+          <a:graphicData uri="http://schemas.openxmlformats.org/drawingml/2006/table">
+            <a:tbl>
+              <a:tblPr>
+                <a:tableStyleId>{5C22544A-7EE6-4342-B048-85BDC9FD1C3A}</a:tableStyleId>
+              </a:tblPr>
+              <a:tblGrid>
+                <a:gridCol w="889000">
+                  <a:extLst>
+                    <a:ext uri="{9D8B030D-6E8A-4147-A177-3AD203B41FA5}">
+                      <a16:colId xmlns:a16="http://schemas.microsoft.com/office/drawing/2014/main" val="3847898177"/>
+                    </a:ext>
+                  </a:extLst>
+                </a:gridCol>
+                <a:gridCol w="3416300">
+                  <a:extLst>
+                    <a:ext uri="{9D8B030D-6E8A-4147-A177-3AD203B41FA5}">
+                      <a16:colId xmlns:a16="http://schemas.microsoft.com/office/drawing/2014/main" val="966551385"/>
+                    </a:ext>
+                  </a:extLst>
+                </a:gridCol>
+                <a:gridCol w="609600">
+                  <a:extLst>
+                    <a:ext uri="{9D8B030D-6E8A-4147-A177-3AD203B41FA5}">
+                      <a16:colId xmlns:a16="http://schemas.microsoft.com/office/drawing/2014/main" val="1838372271"/>
+                    </a:ext>
+                  </a:extLst>
+                </a:gridCol>
+                <a:gridCol w="609600">
+                  <a:extLst>
+                    <a:ext uri="{9D8B030D-6E8A-4147-A177-3AD203B41FA5}">
+                      <a16:colId xmlns:a16="http://schemas.microsoft.com/office/drawing/2014/main" val="261848200"/>
+                    </a:ext>
+                  </a:extLst>
+                </a:gridCol>
+              </a:tblGrid>
+              <a:tr h="182880">
+                <a:tc>
+                  <a:txBody>
+                    <a:bodyPr/>
+                    <a:lstStyle/>
+                    <a:p>
+                      <a:pPr algn="l" fontAlgn="b"/>
+                      <a:r>
+                        <a:rPr lang="en-US" sz="1100" b="1" u="none" strike="noStrike" dirty="0">
+                          <a:effectLst/>
+                        </a:rPr>
+                        <a:t>Taxa</a:t>
+                      </a:r>
+                      <a:endParaRPr lang="en-US" sz="1100" b="1" i="0" u="none" strike="noStrike" dirty="0">
+                        <a:solidFill>
+                          <a:srgbClr val="000000"/>
+                        </a:solidFill>
+                        <a:effectLst/>
+                        <a:latin typeface="Calibri" panose="020F0502020204030204" pitchFamily="34" charset="0"/>
+                      </a:endParaRPr>
+                    </a:p>
+                  </a:txBody>
+                  <a:tcPr marL="7620" marR="7620" marT="7620" marB="0" anchor="b"/>
+                </a:tc>
+                <a:tc>
+                  <a:txBody>
+                    <a:bodyPr/>
+                    <a:lstStyle/>
+                    <a:p>
+                      <a:pPr algn="l" fontAlgn="b"/>
+                      <a:r>
+                        <a:rPr lang="en-US" sz="1100" b="1" u="none" strike="noStrike">
+                          <a:effectLst/>
+                        </a:rPr>
+                        <a:t>Model</a:t>
+                      </a:r>
+                      <a:endParaRPr lang="en-US" sz="1100" b="1" i="0" u="none" strike="noStrike">
+                        <a:solidFill>
+                          <a:srgbClr val="000000"/>
+                        </a:solidFill>
+                        <a:effectLst/>
+                        <a:latin typeface="Calibri" panose="020F0502020204030204" pitchFamily="34" charset="0"/>
+                      </a:endParaRPr>
+                    </a:p>
+                  </a:txBody>
+                  <a:tcPr marL="7620" marR="7620" marT="7620" marB="0" anchor="b"/>
+                </a:tc>
+                <a:tc>
+                  <a:txBody>
+                    <a:bodyPr/>
+                    <a:lstStyle/>
+                    <a:p>
+                      <a:pPr algn="l" fontAlgn="b"/>
+                      <a:r>
+                        <a:rPr lang="en-US" sz="1100" b="1" u="none" strike="noStrike" dirty="0">
+                          <a:effectLst/>
+                        </a:rPr>
+                        <a:t>P-value</a:t>
+                      </a:r>
+                      <a:endParaRPr lang="en-US" sz="1100" b="1" i="0" u="none" strike="noStrike" dirty="0">
+                        <a:solidFill>
+                          <a:srgbClr val="000000"/>
+                        </a:solidFill>
+                        <a:effectLst/>
+                        <a:latin typeface="Calibri" panose="020F0502020204030204" pitchFamily="34" charset="0"/>
+                      </a:endParaRPr>
+                    </a:p>
+                  </a:txBody>
+                  <a:tcPr marL="7620" marR="7620" marT="7620" marB="0" anchor="b"/>
+                </a:tc>
+                <a:tc>
+                  <a:txBody>
+                    <a:bodyPr/>
+                    <a:lstStyle/>
+                    <a:p>
+                      <a:pPr algn="l" fontAlgn="b"/>
+                      <a:r>
+                        <a:rPr lang="en-US" sz="1100" b="1" u="none" strike="noStrike" dirty="0">
+                          <a:effectLst/>
+                        </a:rPr>
+                        <a:t>R-sq.(adj)</a:t>
+                      </a:r>
+                      <a:endParaRPr lang="en-US" sz="1100" b="1" i="0" u="none" strike="noStrike" dirty="0">
+                        <a:solidFill>
+                          <a:srgbClr val="000000"/>
+                        </a:solidFill>
+                        <a:effectLst/>
+                        <a:latin typeface="Calibri" panose="020F0502020204030204" pitchFamily="34" charset="0"/>
+                      </a:endParaRPr>
+                    </a:p>
+                  </a:txBody>
+                  <a:tcPr marL="7620" marR="7620" marT="7620" marB="0" anchor="b"/>
+                </a:tc>
+                <a:extLst>
+                  <a:ext uri="{0D108BD9-81ED-4DB2-BD59-A6C34878D82A}">
+                    <a16:rowId xmlns:a16="http://schemas.microsoft.com/office/drawing/2014/main" val="4153557550"/>
+                  </a:ext>
+                </a:extLst>
+              </a:tr>
+              <a:tr h="182880">
+                <a:tc>
+                  <a:txBody>
+                    <a:bodyPr/>
+                    <a:lstStyle/>
+                    <a:p>
+                      <a:pPr algn="l" fontAlgn="b"/>
+                      <a:r>
+                        <a:rPr lang="en-US" sz="1100" u="none" strike="noStrike" dirty="0">
+                          <a:effectLst/>
+                        </a:rPr>
+                        <a:t>Daphnia spp.</a:t>
+                      </a:r>
+                      <a:endParaRPr lang="en-US" sz="1100" b="0" i="0" u="none" strike="noStrike" dirty="0">
+                        <a:solidFill>
+                          <a:srgbClr val="000000"/>
+                        </a:solidFill>
+                        <a:effectLst/>
+                        <a:latin typeface="Calibri" panose="020F0502020204030204" pitchFamily="34" charset="0"/>
+                      </a:endParaRPr>
+                    </a:p>
+                  </a:txBody>
+                  <a:tcPr marL="7620" marR="7620" marT="7620" marB="0" anchor="b"/>
+                </a:tc>
+                <a:tc>
+                  <a:txBody>
+                    <a:bodyPr/>
+                    <a:lstStyle/>
+                    <a:p>
+                      <a:pPr algn="l" rtl="0" fontAlgn="ctr"/>
+                      <a:r>
+                        <a:rPr lang="en-US" sz="1100" u="none" strike="noStrike" dirty="0">
+                          <a:effectLst/>
+                        </a:rPr>
+                        <a:t>Presence ~ s(salinity)</a:t>
+                      </a:r>
+                      <a:endParaRPr lang="en-US" sz="1100" b="0" i="0" u="none" strike="noStrike" dirty="0">
+                        <a:solidFill>
+                          <a:srgbClr val="000000"/>
+                        </a:solidFill>
+                        <a:effectLst/>
+                        <a:latin typeface="Calibri" panose="020F0502020204030204" pitchFamily="34" charset="0"/>
+                      </a:endParaRPr>
+                    </a:p>
+                  </a:txBody>
+                  <a:tcPr marL="7620" marR="7620" marT="7620" marB="0" anchor="ctr"/>
+                </a:tc>
+                <a:tc>
+                  <a:txBody>
+                    <a:bodyPr/>
+                    <a:lstStyle/>
+                    <a:p>
+                      <a:pPr algn="l" fontAlgn="b"/>
+                      <a:r>
+                        <a:rPr lang="en-US" sz="1100" u="none" strike="noStrike" dirty="0">
+                          <a:effectLst/>
+                        </a:rPr>
+                        <a:t>&lt;2e-16</a:t>
+                      </a:r>
+                      <a:endParaRPr lang="en-US" sz="1100" b="0" i="0" u="none" strike="noStrike" dirty="0">
+                        <a:solidFill>
+                          <a:srgbClr val="000000"/>
+                        </a:solidFill>
+                        <a:effectLst/>
+                        <a:latin typeface="Calibri" panose="020F0502020204030204" pitchFamily="34" charset="0"/>
+                      </a:endParaRPr>
+                    </a:p>
+                  </a:txBody>
+                  <a:tcPr marL="7620" marR="7620" marT="7620" marB="0" anchor="b"/>
+                </a:tc>
+                <a:tc>
+                  <a:txBody>
+                    <a:bodyPr/>
+                    <a:lstStyle/>
+                    <a:p>
+                      <a:pPr algn="l" fontAlgn="b"/>
+                      <a:r>
+                        <a:rPr lang="en-US" sz="1100" u="none" strike="noStrike" dirty="0">
+                          <a:effectLst/>
+                        </a:rPr>
+                        <a:t>0.239</a:t>
+                      </a:r>
+                      <a:endParaRPr lang="en-US" sz="1100" b="0" i="0" u="none" strike="noStrike" dirty="0">
+                        <a:solidFill>
+                          <a:srgbClr val="000000"/>
+                        </a:solidFill>
+                        <a:effectLst/>
+                        <a:latin typeface="Calibri" panose="020F0502020204030204" pitchFamily="34" charset="0"/>
+                      </a:endParaRPr>
+                    </a:p>
+                  </a:txBody>
+                  <a:tcPr marL="7620" marR="7620" marT="7620" marB="0" anchor="b"/>
+                </a:tc>
+                <a:extLst>
+                  <a:ext uri="{0D108BD9-81ED-4DB2-BD59-A6C34878D82A}">
+                    <a16:rowId xmlns:a16="http://schemas.microsoft.com/office/drawing/2014/main" val="3289229042"/>
+                  </a:ext>
+                </a:extLst>
+              </a:tr>
+              <a:tr h="182880">
+                <a:tc>
+                  <a:txBody>
+                    <a:bodyPr/>
+                    <a:lstStyle/>
+                    <a:p>
+                      <a:pPr algn="l" fontAlgn="b"/>
+                      <a:r>
+                        <a:rPr lang="en-US" sz="1100" u="none" strike="noStrike">
+                          <a:effectLst/>
+                        </a:rPr>
+                        <a:t>Daphnia spp.</a:t>
+                      </a:r>
+                      <a:endParaRPr lang="en-US" sz="1100" b="0" i="0" u="none" strike="noStrike">
+                        <a:solidFill>
+                          <a:srgbClr val="000000"/>
+                        </a:solidFill>
+                        <a:effectLst/>
+                        <a:latin typeface="Calibri" panose="020F0502020204030204" pitchFamily="34" charset="0"/>
+                      </a:endParaRPr>
+                    </a:p>
+                  </a:txBody>
+                  <a:tcPr marL="7620" marR="7620" marT="7620" marB="0" anchor="b"/>
+                </a:tc>
+                <a:tc>
+                  <a:txBody>
+                    <a:bodyPr/>
+                    <a:lstStyle/>
+                    <a:p>
+                      <a:pPr algn="l" fontAlgn="b"/>
+                      <a:r>
+                        <a:rPr lang="en-US" sz="1100" u="none" strike="noStrike">
+                          <a:effectLst/>
+                        </a:rPr>
+                        <a:t>BPUE ~ s(salinity) + s(month, k = 5) + s(Station, bs = "re")</a:t>
+                      </a:r>
+                      <a:endParaRPr lang="en-US" sz="1100" b="0" i="0" u="none" strike="noStrike">
+                        <a:solidFill>
+                          <a:srgbClr val="000000"/>
+                        </a:solidFill>
+                        <a:effectLst/>
+                        <a:latin typeface="Calibri" panose="020F0502020204030204" pitchFamily="34" charset="0"/>
+                      </a:endParaRPr>
+                    </a:p>
+                  </a:txBody>
+                  <a:tcPr marL="7620" marR="7620" marT="7620" marB="0" anchor="b"/>
+                </a:tc>
+                <a:tc>
+                  <a:txBody>
+                    <a:bodyPr/>
+                    <a:lstStyle/>
+                    <a:p>
+                      <a:pPr algn="l" fontAlgn="b"/>
+                      <a:r>
+                        <a:rPr lang="en-US" sz="1100" u="none" strike="noStrike">
+                          <a:effectLst/>
+                        </a:rPr>
+                        <a:t>&lt;2e-16</a:t>
+                      </a:r>
+                      <a:endParaRPr lang="en-US" sz="1100" b="0" i="0" u="none" strike="noStrike">
+                        <a:solidFill>
+                          <a:srgbClr val="000000"/>
+                        </a:solidFill>
+                        <a:effectLst/>
+                        <a:latin typeface="Calibri" panose="020F0502020204030204" pitchFamily="34" charset="0"/>
+                      </a:endParaRPr>
+                    </a:p>
+                  </a:txBody>
+                  <a:tcPr marL="7620" marR="7620" marT="7620" marB="0" anchor="b"/>
+                </a:tc>
+                <a:tc>
+                  <a:txBody>
+                    <a:bodyPr/>
+                    <a:lstStyle/>
+                    <a:p>
+                      <a:pPr algn="l" fontAlgn="b"/>
+                      <a:r>
+                        <a:rPr lang="en-US" sz="1100" u="none" strike="noStrike">
+                          <a:effectLst/>
+                        </a:rPr>
+                        <a:t>0.161</a:t>
+                      </a:r>
+                      <a:endParaRPr lang="en-US" sz="1100" b="0" i="0" u="none" strike="noStrike">
+                        <a:solidFill>
+                          <a:srgbClr val="000000"/>
+                        </a:solidFill>
+                        <a:effectLst/>
+                        <a:latin typeface="Calibri" panose="020F0502020204030204" pitchFamily="34" charset="0"/>
+                      </a:endParaRPr>
+                    </a:p>
+                  </a:txBody>
+                  <a:tcPr marL="7620" marR="7620" marT="7620" marB="0" anchor="b"/>
+                </a:tc>
+                <a:extLst>
+                  <a:ext uri="{0D108BD9-81ED-4DB2-BD59-A6C34878D82A}">
+                    <a16:rowId xmlns:a16="http://schemas.microsoft.com/office/drawing/2014/main" val="3022615768"/>
+                  </a:ext>
+                </a:extLst>
+              </a:tr>
+              <a:tr h="182880">
+                <a:tc>
+                  <a:txBody>
+                    <a:bodyPr/>
+                    <a:lstStyle/>
+                    <a:p>
+                      <a:pPr algn="l" fontAlgn="b"/>
+                      <a:r>
+                        <a:rPr lang="en-US" sz="1100" u="none" strike="noStrike">
+                          <a:effectLst/>
+                        </a:rPr>
+                        <a:t>H. longirostris</a:t>
+                      </a:r>
+                      <a:endParaRPr lang="en-US" sz="1100" b="0" i="0" u="none" strike="noStrike">
+                        <a:solidFill>
+                          <a:srgbClr val="000000"/>
+                        </a:solidFill>
+                        <a:effectLst/>
+                        <a:latin typeface="Calibri" panose="020F0502020204030204" pitchFamily="34" charset="0"/>
+                      </a:endParaRPr>
+                    </a:p>
+                  </a:txBody>
+                  <a:tcPr marL="7620" marR="7620" marT="7620" marB="0" anchor="b"/>
+                </a:tc>
+                <a:tc>
+                  <a:txBody>
+                    <a:bodyPr/>
+                    <a:lstStyle/>
+                    <a:p>
+                      <a:pPr algn="l" rtl="0" fontAlgn="ctr"/>
+                      <a:r>
+                        <a:rPr lang="en-US" sz="1100" u="none" strike="noStrike">
+                          <a:effectLst/>
+                        </a:rPr>
+                        <a:t>Presence ~ s(salinity)</a:t>
+                      </a:r>
+                      <a:endParaRPr lang="en-US" sz="1100" b="0" i="0" u="none" strike="noStrike">
+                        <a:solidFill>
+                          <a:srgbClr val="000000"/>
+                        </a:solidFill>
+                        <a:effectLst/>
+                        <a:latin typeface="Calibri" panose="020F0502020204030204" pitchFamily="34" charset="0"/>
+                      </a:endParaRPr>
+                    </a:p>
+                  </a:txBody>
+                  <a:tcPr marL="7620" marR="7620" marT="7620" marB="0" anchor="ctr"/>
+                </a:tc>
+                <a:tc>
+                  <a:txBody>
+                    <a:bodyPr/>
+                    <a:lstStyle/>
+                    <a:p>
+                      <a:pPr algn="l" fontAlgn="b"/>
+                      <a:r>
+                        <a:rPr lang="en-US" sz="1100" u="none" strike="noStrike">
+                          <a:effectLst/>
+                        </a:rPr>
+                        <a:t>&lt;2e-16</a:t>
+                      </a:r>
+                      <a:endParaRPr lang="en-US" sz="1100" b="0" i="0" u="none" strike="noStrike">
+                        <a:solidFill>
+                          <a:srgbClr val="000000"/>
+                        </a:solidFill>
+                        <a:effectLst/>
+                        <a:latin typeface="Calibri" panose="020F0502020204030204" pitchFamily="34" charset="0"/>
+                      </a:endParaRPr>
+                    </a:p>
+                  </a:txBody>
+                  <a:tcPr marL="7620" marR="7620" marT="7620" marB="0" anchor="b"/>
+                </a:tc>
+                <a:tc>
+                  <a:txBody>
+                    <a:bodyPr/>
+                    <a:lstStyle/>
+                    <a:p>
+                      <a:pPr algn="l" fontAlgn="b"/>
+                      <a:r>
+                        <a:rPr lang="en-US" sz="1100" u="none" strike="noStrike">
+                          <a:effectLst/>
+                        </a:rPr>
+                        <a:t>0.035</a:t>
+                      </a:r>
+                      <a:endParaRPr lang="en-US" sz="1100" b="0" i="0" u="none" strike="noStrike">
+                        <a:solidFill>
+                          <a:srgbClr val="000000"/>
+                        </a:solidFill>
+                        <a:effectLst/>
+                        <a:latin typeface="Calibri" panose="020F0502020204030204" pitchFamily="34" charset="0"/>
+                      </a:endParaRPr>
+                    </a:p>
+                  </a:txBody>
+                  <a:tcPr marL="7620" marR="7620" marT="7620" marB="0" anchor="b"/>
+                </a:tc>
+                <a:extLst>
+                  <a:ext uri="{0D108BD9-81ED-4DB2-BD59-A6C34878D82A}">
+                    <a16:rowId xmlns:a16="http://schemas.microsoft.com/office/drawing/2014/main" val="3192986153"/>
+                  </a:ext>
+                </a:extLst>
+              </a:tr>
+              <a:tr h="182880">
+                <a:tc>
+                  <a:txBody>
+                    <a:bodyPr/>
+                    <a:lstStyle/>
+                    <a:p>
+                      <a:pPr algn="l" fontAlgn="b"/>
+                      <a:r>
+                        <a:rPr lang="en-US" sz="1100" u="none" strike="noStrike">
+                          <a:effectLst/>
+                        </a:rPr>
+                        <a:t>H. longirostris</a:t>
+                      </a:r>
+                      <a:endParaRPr lang="en-US" sz="1100" b="0" i="0" u="none" strike="noStrike">
+                        <a:solidFill>
+                          <a:srgbClr val="000000"/>
+                        </a:solidFill>
+                        <a:effectLst/>
+                        <a:latin typeface="Calibri" panose="020F0502020204030204" pitchFamily="34" charset="0"/>
+                      </a:endParaRPr>
+                    </a:p>
+                  </a:txBody>
+                  <a:tcPr marL="7620" marR="7620" marT="7620" marB="0" anchor="b"/>
+                </a:tc>
+                <a:tc>
+                  <a:txBody>
+                    <a:bodyPr/>
+                    <a:lstStyle/>
+                    <a:p>
+                      <a:pPr algn="l" rtl="0" fontAlgn="ctr"/>
+                      <a:r>
+                        <a:rPr lang="en-US" sz="1100" u="none" strike="noStrike">
+                          <a:effectLst/>
+                        </a:rPr>
+                        <a:t>BPUE ~ s(salinity) + s(month, k = 5)</a:t>
+                      </a:r>
+                      <a:endParaRPr lang="en-US" sz="1100" b="0" i="0" u="none" strike="noStrike">
+                        <a:solidFill>
+                          <a:srgbClr val="000000"/>
+                        </a:solidFill>
+                        <a:effectLst/>
+                        <a:latin typeface="Calibri" panose="020F0502020204030204" pitchFamily="34" charset="0"/>
+                      </a:endParaRPr>
+                    </a:p>
+                  </a:txBody>
+                  <a:tcPr marL="7620" marR="7620" marT="7620" marB="0" anchor="ctr"/>
+                </a:tc>
+                <a:tc>
+                  <a:txBody>
+                    <a:bodyPr/>
+                    <a:lstStyle/>
+                    <a:p>
+                      <a:pPr algn="l" fontAlgn="b"/>
+                      <a:r>
+                        <a:rPr lang="en-US" sz="1100" u="none" strike="noStrike">
+                          <a:effectLst/>
+                        </a:rPr>
+                        <a:t>&lt;2e-16</a:t>
+                      </a:r>
+                      <a:endParaRPr lang="en-US" sz="1100" b="0" i="0" u="none" strike="noStrike">
+                        <a:solidFill>
+                          <a:srgbClr val="000000"/>
+                        </a:solidFill>
+                        <a:effectLst/>
+                        <a:latin typeface="Calibri" panose="020F0502020204030204" pitchFamily="34" charset="0"/>
+                      </a:endParaRPr>
+                    </a:p>
+                  </a:txBody>
+                  <a:tcPr marL="7620" marR="7620" marT="7620" marB="0" anchor="b"/>
+                </a:tc>
+                <a:tc>
+                  <a:txBody>
+                    <a:bodyPr/>
+                    <a:lstStyle/>
+                    <a:p>
+                      <a:pPr algn="l" fontAlgn="b"/>
+                      <a:r>
+                        <a:rPr lang="en-US" sz="1100" u="none" strike="noStrike">
+                          <a:effectLst/>
+                        </a:rPr>
+                        <a:t>0.0634</a:t>
+                      </a:r>
+                      <a:endParaRPr lang="en-US" sz="1100" b="0" i="0" u="none" strike="noStrike">
+                        <a:solidFill>
+                          <a:srgbClr val="000000"/>
+                        </a:solidFill>
+                        <a:effectLst/>
+                        <a:latin typeface="Calibri" panose="020F0502020204030204" pitchFamily="34" charset="0"/>
+                      </a:endParaRPr>
+                    </a:p>
+                  </a:txBody>
+                  <a:tcPr marL="7620" marR="7620" marT="7620" marB="0" anchor="b"/>
+                </a:tc>
+                <a:extLst>
+                  <a:ext uri="{0D108BD9-81ED-4DB2-BD59-A6C34878D82A}">
+                    <a16:rowId xmlns:a16="http://schemas.microsoft.com/office/drawing/2014/main" val="1562348141"/>
+                  </a:ext>
+                </a:extLst>
+              </a:tr>
+              <a:tr h="182880">
+                <a:tc>
+                  <a:txBody>
+                    <a:bodyPr/>
+                    <a:lstStyle/>
+                    <a:p>
+                      <a:pPr algn="l" fontAlgn="b"/>
+                      <a:r>
+                        <a:rPr lang="en-US" sz="1100" u="none" strike="noStrike">
+                          <a:effectLst/>
+                        </a:rPr>
+                        <a:t>L. tetraspina</a:t>
+                      </a:r>
+                      <a:endParaRPr lang="en-US" sz="1100" b="0" i="0" u="none" strike="noStrike">
+                        <a:solidFill>
+                          <a:srgbClr val="000000"/>
+                        </a:solidFill>
+                        <a:effectLst/>
+                        <a:latin typeface="Calibri" panose="020F0502020204030204" pitchFamily="34" charset="0"/>
+                      </a:endParaRPr>
+                    </a:p>
+                  </a:txBody>
+                  <a:tcPr marL="7620" marR="7620" marT="7620" marB="0" anchor="b"/>
+                </a:tc>
+                <a:tc>
+                  <a:txBody>
+                    <a:bodyPr/>
+                    <a:lstStyle/>
+                    <a:p>
+                      <a:pPr algn="l" rtl="0" fontAlgn="ctr"/>
+                      <a:r>
+                        <a:rPr lang="en-US" sz="1100" u="none" strike="noStrike">
+                          <a:effectLst/>
+                        </a:rPr>
+                        <a:t>Presence ~ s(salinity)</a:t>
+                      </a:r>
+                      <a:endParaRPr lang="en-US" sz="1100" b="0" i="0" u="none" strike="noStrike">
+                        <a:solidFill>
+                          <a:srgbClr val="000000"/>
+                        </a:solidFill>
+                        <a:effectLst/>
+                        <a:latin typeface="Calibri" panose="020F0502020204030204" pitchFamily="34" charset="0"/>
+                      </a:endParaRPr>
+                    </a:p>
+                  </a:txBody>
+                  <a:tcPr marL="7620" marR="7620" marT="7620" marB="0" anchor="ctr"/>
+                </a:tc>
+                <a:tc>
+                  <a:txBody>
+                    <a:bodyPr/>
+                    <a:lstStyle/>
+                    <a:p>
+                      <a:pPr algn="l" fontAlgn="b"/>
+                      <a:r>
+                        <a:rPr lang="en-US" sz="1100" u="none" strike="noStrike">
+                          <a:effectLst/>
+                        </a:rPr>
+                        <a:t>&lt;2e-16</a:t>
+                      </a:r>
+                      <a:endParaRPr lang="en-US" sz="1100" b="0" i="0" u="none" strike="noStrike">
+                        <a:solidFill>
+                          <a:srgbClr val="000000"/>
+                        </a:solidFill>
+                        <a:effectLst/>
+                        <a:latin typeface="Calibri" panose="020F0502020204030204" pitchFamily="34" charset="0"/>
+                      </a:endParaRPr>
+                    </a:p>
+                  </a:txBody>
+                  <a:tcPr marL="7620" marR="7620" marT="7620" marB="0" anchor="b"/>
+                </a:tc>
+                <a:tc>
+                  <a:txBody>
+                    <a:bodyPr/>
+                    <a:lstStyle/>
+                    <a:p>
+                      <a:pPr algn="l" fontAlgn="b"/>
+                      <a:r>
+                        <a:rPr lang="en-US" sz="1100" u="none" strike="noStrike">
+                          <a:effectLst/>
+                        </a:rPr>
+                        <a:t>0.0248</a:t>
+                      </a:r>
+                      <a:endParaRPr lang="en-US" sz="1100" b="0" i="0" u="none" strike="noStrike">
+                        <a:solidFill>
+                          <a:srgbClr val="000000"/>
+                        </a:solidFill>
+                        <a:effectLst/>
+                        <a:latin typeface="Calibri" panose="020F0502020204030204" pitchFamily="34" charset="0"/>
+                      </a:endParaRPr>
+                    </a:p>
+                  </a:txBody>
+                  <a:tcPr marL="7620" marR="7620" marT="7620" marB="0" anchor="b"/>
+                </a:tc>
+                <a:extLst>
+                  <a:ext uri="{0D108BD9-81ED-4DB2-BD59-A6C34878D82A}">
+                    <a16:rowId xmlns:a16="http://schemas.microsoft.com/office/drawing/2014/main" val="3761164049"/>
+                  </a:ext>
+                </a:extLst>
+              </a:tr>
+              <a:tr h="182880">
+                <a:tc>
+                  <a:txBody>
+                    <a:bodyPr/>
+                    <a:lstStyle/>
+                    <a:p>
+                      <a:pPr algn="l" fontAlgn="b"/>
+                      <a:r>
+                        <a:rPr lang="en-US" sz="1100" u="none" strike="noStrike">
+                          <a:effectLst/>
+                        </a:rPr>
+                        <a:t>L. tetraspina</a:t>
+                      </a:r>
+                      <a:endParaRPr lang="en-US" sz="1100" b="0" i="0" u="none" strike="noStrike">
+                        <a:solidFill>
+                          <a:srgbClr val="000000"/>
+                        </a:solidFill>
+                        <a:effectLst/>
+                        <a:latin typeface="Calibri" panose="020F0502020204030204" pitchFamily="34" charset="0"/>
+                      </a:endParaRPr>
+                    </a:p>
+                  </a:txBody>
+                  <a:tcPr marL="7620" marR="7620" marT="7620" marB="0" anchor="b"/>
+                </a:tc>
+                <a:tc>
+                  <a:txBody>
+                    <a:bodyPr/>
+                    <a:lstStyle/>
+                    <a:p>
+                      <a:pPr algn="l" rtl="0" fontAlgn="ctr"/>
+                      <a:r>
+                        <a:rPr lang="en-US" sz="1100" u="none" strike="noStrike">
+                          <a:effectLst/>
+                        </a:rPr>
+                        <a:t>BPUE ~ s(salinity) + s(month, k = 5)</a:t>
+                      </a:r>
+                      <a:endParaRPr lang="en-US" sz="1100" b="0" i="0" u="none" strike="noStrike">
+                        <a:solidFill>
+                          <a:srgbClr val="000000"/>
+                        </a:solidFill>
+                        <a:effectLst/>
+                        <a:latin typeface="Calibri" panose="020F0502020204030204" pitchFamily="34" charset="0"/>
+                      </a:endParaRPr>
+                    </a:p>
+                  </a:txBody>
+                  <a:tcPr marL="7620" marR="7620" marT="7620" marB="0" anchor="ctr"/>
+                </a:tc>
+                <a:tc>
+                  <a:txBody>
+                    <a:bodyPr/>
+                    <a:lstStyle/>
+                    <a:p>
+                      <a:pPr algn="l" fontAlgn="b"/>
+                      <a:r>
+                        <a:rPr lang="en-US" sz="1100" u="none" strike="noStrike">
+                          <a:effectLst/>
+                        </a:rPr>
+                        <a:t>&lt;2e-16</a:t>
+                      </a:r>
+                      <a:endParaRPr lang="en-US" sz="1100" b="0" i="0" u="none" strike="noStrike">
+                        <a:solidFill>
+                          <a:srgbClr val="000000"/>
+                        </a:solidFill>
+                        <a:effectLst/>
+                        <a:latin typeface="Calibri" panose="020F0502020204030204" pitchFamily="34" charset="0"/>
+                      </a:endParaRPr>
+                    </a:p>
+                  </a:txBody>
+                  <a:tcPr marL="7620" marR="7620" marT="7620" marB="0" anchor="b"/>
+                </a:tc>
+                <a:tc>
+                  <a:txBody>
+                    <a:bodyPr/>
+                    <a:lstStyle/>
+                    <a:p>
+                      <a:pPr algn="l" fontAlgn="b"/>
+                      <a:r>
+                        <a:rPr lang="en-US" sz="1100" u="none" strike="noStrike">
+                          <a:effectLst/>
+                        </a:rPr>
+                        <a:t>0.351</a:t>
+                      </a:r>
+                      <a:endParaRPr lang="en-US" sz="1100" b="0" i="0" u="none" strike="noStrike">
+                        <a:solidFill>
+                          <a:srgbClr val="000000"/>
+                        </a:solidFill>
+                        <a:effectLst/>
+                        <a:latin typeface="Calibri" panose="020F0502020204030204" pitchFamily="34" charset="0"/>
+                      </a:endParaRPr>
+                    </a:p>
+                  </a:txBody>
+                  <a:tcPr marL="7620" marR="7620" marT="7620" marB="0" anchor="b"/>
+                </a:tc>
+                <a:extLst>
+                  <a:ext uri="{0D108BD9-81ED-4DB2-BD59-A6C34878D82A}">
+                    <a16:rowId xmlns:a16="http://schemas.microsoft.com/office/drawing/2014/main" val="55820589"/>
+                  </a:ext>
+                </a:extLst>
+              </a:tr>
+              <a:tr h="182880">
+                <a:tc>
+                  <a:txBody>
+                    <a:bodyPr/>
+                    <a:lstStyle/>
+                    <a:p>
+                      <a:pPr algn="l" fontAlgn="b"/>
+                      <a:r>
+                        <a:rPr lang="en-US" sz="1100" u="none" strike="noStrike">
+                          <a:effectLst/>
+                        </a:rPr>
+                        <a:t>P. forbesi</a:t>
+                      </a:r>
+                      <a:endParaRPr lang="en-US" sz="1100" b="0" i="0" u="none" strike="noStrike">
+                        <a:solidFill>
+                          <a:srgbClr val="000000"/>
+                        </a:solidFill>
+                        <a:effectLst/>
+                        <a:latin typeface="Calibri" panose="020F0502020204030204" pitchFamily="34" charset="0"/>
+                      </a:endParaRPr>
+                    </a:p>
+                  </a:txBody>
+                  <a:tcPr marL="7620" marR="7620" marT="7620" marB="0" anchor="b"/>
+                </a:tc>
+                <a:tc>
+                  <a:txBody>
+                    <a:bodyPr/>
+                    <a:lstStyle/>
+                    <a:p>
+                      <a:pPr algn="l" rtl="0" fontAlgn="ctr"/>
+                      <a:r>
+                        <a:rPr lang="en-US" sz="1100" u="none" strike="noStrike">
+                          <a:effectLst/>
+                        </a:rPr>
+                        <a:t>Presence ~ s(salinity)</a:t>
+                      </a:r>
+                      <a:endParaRPr lang="en-US" sz="1100" b="0" i="0" u="none" strike="noStrike">
+                        <a:solidFill>
+                          <a:srgbClr val="000000"/>
+                        </a:solidFill>
+                        <a:effectLst/>
+                        <a:latin typeface="Calibri" panose="020F0502020204030204" pitchFamily="34" charset="0"/>
+                      </a:endParaRPr>
+                    </a:p>
+                  </a:txBody>
+                  <a:tcPr marL="7620" marR="7620" marT="7620" marB="0" anchor="ctr"/>
+                </a:tc>
+                <a:tc>
+                  <a:txBody>
+                    <a:bodyPr/>
+                    <a:lstStyle/>
+                    <a:p>
+                      <a:pPr algn="l" fontAlgn="b"/>
+                      <a:r>
+                        <a:rPr lang="en-US" sz="1100" u="none" strike="noStrike">
+                          <a:effectLst/>
+                        </a:rPr>
+                        <a:t>0.00119</a:t>
+                      </a:r>
+                      <a:endParaRPr lang="en-US" sz="1100" b="0" i="0" u="none" strike="noStrike">
+                        <a:solidFill>
+                          <a:srgbClr val="000000"/>
+                        </a:solidFill>
+                        <a:effectLst/>
+                        <a:latin typeface="Calibri" panose="020F0502020204030204" pitchFamily="34" charset="0"/>
+                      </a:endParaRPr>
+                    </a:p>
+                  </a:txBody>
+                  <a:tcPr marL="7620" marR="7620" marT="7620" marB="0" anchor="b"/>
+                </a:tc>
+                <a:tc>
+                  <a:txBody>
+                    <a:bodyPr/>
+                    <a:lstStyle/>
+                    <a:p>
+                      <a:pPr algn="l" fontAlgn="b"/>
+                      <a:r>
+                        <a:rPr lang="en-US" sz="1100" u="none" strike="noStrike">
+                          <a:effectLst/>
+                        </a:rPr>
+                        <a:t>0.0353</a:t>
+                      </a:r>
+                      <a:endParaRPr lang="en-US" sz="1100" b="0" i="0" u="none" strike="noStrike">
+                        <a:solidFill>
+                          <a:srgbClr val="000000"/>
+                        </a:solidFill>
+                        <a:effectLst/>
+                        <a:latin typeface="Calibri" panose="020F0502020204030204" pitchFamily="34" charset="0"/>
+                      </a:endParaRPr>
+                    </a:p>
+                  </a:txBody>
+                  <a:tcPr marL="7620" marR="7620" marT="7620" marB="0" anchor="b"/>
+                </a:tc>
+                <a:extLst>
+                  <a:ext uri="{0D108BD9-81ED-4DB2-BD59-A6C34878D82A}">
+                    <a16:rowId xmlns:a16="http://schemas.microsoft.com/office/drawing/2014/main" val="501071142"/>
+                  </a:ext>
+                </a:extLst>
+              </a:tr>
+              <a:tr h="182880">
+                <a:tc>
+                  <a:txBody>
+                    <a:bodyPr/>
+                    <a:lstStyle/>
+                    <a:p>
+                      <a:pPr algn="l" fontAlgn="b"/>
+                      <a:r>
+                        <a:rPr lang="en-US" sz="1100" u="none" strike="noStrike">
+                          <a:effectLst/>
+                        </a:rPr>
+                        <a:t>P. forbesi</a:t>
+                      </a:r>
+                      <a:endParaRPr lang="en-US" sz="1100" b="0" i="0" u="none" strike="noStrike">
+                        <a:solidFill>
+                          <a:srgbClr val="000000"/>
+                        </a:solidFill>
+                        <a:effectLst/>
+                        <a:latin typeface="Calibri" panose="020F0502020204030204" pitchFamily="34" charset="0"/>
+                      </a:endParaRPr>
+                    </a:p>
+                  </a:txBody>
+                  <a:tcPr marL="7620" marR="7620" marT="7620" marB="0" anchor="b"/>
+                </a:tc>
+                <a:tc>
+                  <a:txBody>
+                    <a:bodyPr/>
+                    <a:lstStyle/>
+                    <a:p>
+                      <a:pPr algn="l" rtl="0" fontAlgn="ctr"/>
+                      <a:r>
+                        <a:rPr lang="en-US" sz="1100" u="none" strike="noStrike">
+                          <a:effectLst/>
+                        </a:rPr>
+                        <a:t>BPUE ~ s(salinity) + s(month, k = 5)</a:t>
+                      </a:r>
+                      <a:endParaRPr lang="en-US" sz="1100" b="0" i="0" u="none" strike="noStrike">
+                        <a:solidFill>
+                          <a:srgbClr val="000000"/>
+                        </a:solidFill>
+                        <a:effectLst/>
+                        <a:latin typeface="Calibri" panose="020F0502020204030204" pitchFamily="34" charset="0"/>
+                      </a:endParaRPr>
+                    </a:p>
+                  </a:txBody>
+                  <a:tcPr marL="7620" marR="7620" marT="7620" marB="0" anchor="ctr"/>
+                </a:tc>
+                <a:tc>
+                  <a:txBody>
+                    <a:bodyPr/>
+                    <a:lstStyle/>
+                    <a:p>
+                      <a:pPr algn="l" fontAlgn="b"/>
+                      <a:r>
+                        <a:rPr lang="en-US" sz="1100" u="none" strike="noStrike">
+                          <a:effectLst/>
+                        </a:rPr>
+                        <a:t>&lt;2e-16</a:t>
+                      </a:r>
+                      <a:endParaRPr lang="en-US" sz="1100" b="0" i="0" u="none" strike="noStrike">
+                        <a:solidFill>
+                          <a:srgbClr val="000000"/>
+                        </a:solidFill>
+                        <a:effectLst/>
+                        <a:latin typeface="Calibri" panose="020F0502020204030204" pitchFamily="34" charset="0"/>
+                      </a:endParaRPr>
+                    </a:p>
+                  </a:txBody>
+                  <a:tcPr marL="7620" marR="7620" marT="7620" marB="0" anchor="b"/>
+                </a:tc>
+                <a:tc>
+                  <a:txBody>
+                    <a:bodyPr/>
+                    <a:lstStyle/>
+                    <a:p>
+                      <a:pPr algn="l" fontAlgn="b"/>
+                      <a:r>
+                        <a:rPr lang="en-US" sz="1100" u="none" strike="noStrike" dirty="0">
+                          <a:effectLst/>
+                        </a:rPr>
+                        <a:t>0.184</a:t>
+                      </a:r>
+                      <a:endParaRPr lang="en-US" sz="1100" b="0" i="0" u="none" strike="noStrike" dirty="0">
+                        <a:solidFill>
+                          <a:srgbClr val="000000"/>
+                        </a:solidFill>
+                        <a:effectLst/>
+                        <a:latin typeface="Calibri" panose="020F0502020204030204" pitchFamily="34" charset="0"/>
+                      </a:endParaRPr>
+                    </a:p>
+                  </a:txBody>
+                  <a:tcPr marL="7620" marR="7620" marT="7620" marB="0" anchor="b"/>
+                </a:tc>
+                <a:extLst>
+                  <a:ext uri="{0D108BD9-81ED-4DB2-BD59-A6C34878D82A}">
+                    <a16:rowId xmlns:a16="http://schemas.microsoft.com/office/drawing/2014/main" val="1331085522"/>
+                  </a:ext>
+                </a:extLst>
+              </a:tr>
+            </a:tbl>
+          </a:graphicData>
+        </a:graphic>
+      </p:graphicFrame>
     </p:spTree>
     <p:extLst>
       <p:ext uri="{BB962C8B-B14F-4D97-AF65-F5344CB8AC3E}">
-        <p14:creationId xmlns:p14="http://schemas.microsoft.com/office/powerpoint/2010/main" val="3527320659"/>
+        <p14:creationId xmlns:p14="http://schemas.microsoft.com/office/powerpoint/2010/main" val="3803828548"/>
       </p:ext>
     </p:extLst>
   </p:cSld>
@@ -6853,10 +7718,10 @@
       </p:grpSpPr>
       <p:pic>
         <p:nvPicPr>
-          <p:cNvPr id="17" name="Picture 16" descr="Chart&#10;&#10;Description automatically generated">
-            <a:extLst>
-              <a:ext uri="{FF2B5EF4-FFF2-40B4-BE49-F238E27FC236}">
-                <a16:creationId xmlns:a16="http://schemas.microsoft.com/office/drawing/2014/main" id="{B0A57CFC-DA00-25C3-9408-E63214D4F4CA}"/>
+          <p:cNvPr id="4" name="Picture 3">
+            <a:extLst>
+              <a:ext uri="{FF2B5EF4-FFF2-40B4-BE49-F238E27FC236}">
+                <a16:creationId xmlns:a16="http://schemas.microsoft.com/office/drawing/2014/main" id="{9D54FECC-F255-A56A-A692-5EE181E73FCD}"/>
               </a:ext>
             </a:extLst>
           </p:cNvPr>
@@ -6873,24 +7738,666 @@
               </a:ext>
             </a:extLst>
           </a:blip>
+          <a:srcRect/>
+          <a:stretch/>
+        </p:blipFill>
+        <p:spPr>
+          <a:xfrm>
+            <a:off x="4414118" y="1066565"/>
+            <a:ext cx="7774398" cy="5182933"/>
+          </a:xfrm>
+          <a:prstGeom prst="rect">
+            <a:avLst/>
+          </a:prstGeom>
+          <a:ln>
+            <a:solidFill>
+              <a:schemeClr val="tx1"/>
+            </a:solidFill>
+          </a:ln>
+        </p:spPr>
+      </p:pic>
+      <p:sp>
+        <p:nvSpPr>
+          <p:cNvPr id="5" name="Title 1">
+            <a:extLst>
+              <a:ext uri="{FF2B5EF4-FFF2-40B4-BE49-F238E27FC236}">
+                <a16:creationId xmlns:a16="http://schemas.microsoft.com/office/drawing/2014/main" id="{F2954678-B0DA-F98D-C9AC-39FD919AC100}"/>
+              </a:ext>
+            </a:extLst>
+          </p:cNvPr>
+          <p:cNvSpPr>
+            <a:spLocks noGrp="1"/>
+          </p:cNvSpPr>
+          <p:nvPr>
+            <p:ph type="title"/>
+          </p:nvPr>
+        </p:nvSpPr>
+        <p:spPr>
+          <a:xfrm>
+            <a:off x="0" y="25740"/>
+            <a:ext cx="7620000" cy="538466"/>
+          </a:xfrm>
+        </p:spPr>
+        <p:txBody>
+          <a:bodyPr>
+            <a:normAutofit fontScale="90000"/>
+          </a:bodyPr>
+          <a:lstStyle/>
+          <a:p>
+            <a:r>
+              <a:rPr lang="en-US" dirty="0"/>
+              <a:t>‘Preferred’ salinity ranges</a:t>
+            </a:r>
+          </a:p>
+        </p:txBody>
+      </p:sp>
+      <p:sp>
+        <p:nvSpPr>
+          <p:cNvPr id="6" name="TextBox 5">
+            <a:extLst>
+              <a:ext uri="{FF2B5EF4-FFF2-40B4-BE49-F238E27FC236}">
+                <a16:creationId xmlns:a16="http://schemas.microsoft.com/office/drawing/2014/main" id="{A3B97273-B08F-5CDB-A265-D6E3FA9E3164}"/>
+              </a:ext>
+            </a:extLst>
+          </p:cNvPr>
+          <p:cNvSpPr txBox="1"/>
+          <p:nvPr/>
+        </p:nvSpPr>
+        <p:spPr>
+          <a:xfrm>
+            <a:off x="0" y="1066565"/>
+            <a:ext cx="6206150" cy="646331"/>
+          </a:xfrm>
+          <a:prstGeom prst="rect">
+            <a:avLst/>
+          </a:prstGeom>
+          <a:noFill/>
+        </p:spPr>
+        <p:txBody>
+          <a:bodyPr wrap="square">
+            <a:spAutoFit/>
+          </a:bodyPr>
+          <a:lstStyle/>
+          <a:p>
+            <a:r>
+              <a:rPr lang="en-US" sz="1800" dirty="0"/>
+              <a:t>Salinity range: </a:t>
+            </a:r>
+          </a:p>
+          <a:p>
+            <a:r>
+              <a:rPr lang="en-US" sz="1800" dirty="0"/>
+              <a:t>weighted mean +/- standard deviation</a:t>
+            </a:r>
+          </a:p>
+        </p:txBody>
+      </p:sp>
+    </p:spTree>
+    <p:extLst>
+      <p:ext uri="{BB962C8B-B14F-4D97-AF65-F5344CB8AC3E}">
+        <p14:creationId xmlns:p14="http://schemas.microsoft.com/office/powerpoint/2010/main" val="4024928137"/>
+      </p:ext>
+    </p:extLst>
+  </p:cSld>
+  <p:clrMapOvr>
+    <a:masterClrMapping/>
+  </p:clrMapOvr>
+</p:sld>
+</file>
+
+<file path=ppt/slides/slide9.xml><?xml version="1.0" encoding="utf-8"?>
+<p:sld xmlns:a="http://schemas.openxmlformats.org/drawingml/2006/main" xmlns:r="http://schemas.openxmlformats.org/officeDocument/2006/relationships" xmlns:p="http://schemas.openxmlformats.org/presentationml/2006/main">
+  <p:cSld>
+    <p:spTree>
+      <p:nvGrpSpPr>
+        <p:cNvPr id="1" name=""/>
+        <p:cNvGrpSpPr/>
+        <p:nvPr/>
+      </p:nvGrpSpPr>
+      <p:grpSpPr>
+        <a:xfrm>
+          <a:off x="0" y="0"/>
+          <a:ext cx="0" cy="0"/>
+          <a:chOff x="0" y="0"/>
+          <a:chExt cx="0" cy="0"/>
+        </a:xfrm>
+      </p:grpSpPr>
+      <p:pic>
+        <p:nvPicPr>
+          <p:cNvPr id="3" name="Picture 2" descr="Chart, box and whisker chart&#10;&#10;Description automatically generated">
+            <a:extLst>
+              <a:ext uri="{FF2B5EF4-FFF2-40B4-BE49-F238E27FC236}">
+                <a16:creationId xmlns:a16="http://schemas.microsoft.com/office/drawing/2014/main" id="{01410686-AB3B-369D-659E-7A677DB4B5A9}"/>
+              </a:ext>
+            </a:extLst>
+          </p:cNvPr>
+          <p:cNvPicPr>
+            <a:picLocks noChangeAspect="1"/>
+          </p:cNvPicPr>
+          <p:nvPr/>
+        </p:nvPicPr>
+        <p:blipFill>
+          <a:blip r:embed="rId2">
+            <a:extLst>
+              <a:ext uri="{28A0092B-C50C-407E-A947-70E740481C1C}">
+                <a14:useLocalDpi xmlns:a14="http://schemas.microsoft.com/office/drawing/2010/main" val="0"/>
+              </a:ext>
+            </a:extLst>
+          </a:blip>
           <a:stretch>
             <a:fillRect/>
           </a:stretch>
         </p:blipFill>
         <p:spPr>
           <a:xfrm>
-            <a:off x="1809750" y="0"/>
-            <a:ext cx="8572500" cy="6858000"/>
+            <a:off x="5318650" y="0"/>
+            <a:ext cx="6858000" cy="6858000"/>
+          </a:xfrm>
+          <a:prstGeom prst="rect">
+            <a:avLst/>
+          </a:prstGeom>
+          <a:ln>
+            <a:solidFill>
+              <a:schemeClr val="tx1"/>
+            </a:solidFill>
+          </a:ln>
+        </p:spPr>
+      </p:pic>
+      <p:graphicFrame>
+        <p:nvGraphicFramePr>
+          <p:cNvPr id="4" name="Table 3">
+            <a:extLst>
+              <a:ext uri="{FF2B5EF4-FFF2-40B4-BE49-F238E27FC236}">
+                <a16:creationId xmlns:a16="http://schemas.microsoft.com/office/drawing/2014/main" id="{6AD9544B-9483-BBD5-CFA9-A86CF99672F1}"/>
+              </a:ext>
+            </a:extLst>
+          </p:cNvPr>
+          <p:cNvGraphicFramePr>
+            <a:graphicFrameLocks noGrp="1"/>
+          </p:cNvGraphicFramePr>
+          <p:nvPr>
+            <p:extLst>
+              <p:ext uri="{D42A27DB-BD31-4B8C-83A1-F6EECF244321}">
+                <p14:modId xmlns:p14="http://schemas.microsoft.com/office/powerpoint/2010/main" val="3620362097"/>
+              </p:ext>
+            </p:extLst>
+          </p:nvPr>
+        </p:nvGraphicFramePr>
+        <p:xfrm>
+          <a:off x="539111" y="1873205"/>
+          <a:ext cx="4127500" cy="914400"/>
+        </p:xfrm>
+        <a:graphic>
+          <a:graphicData uri="http://schemas.openxmlformats.org/drawingml/2006/table">
+            <a:tbl>
+              <a:tblPr>
+                <a:tableStyleId>{5C22544A-7EE6-4342-B048-85BDC9FD1C3A}</a:tableStyleId>
+              </a:tblPr>
+              <a:tblGrid>
+                <a:gridCol w="889000">
+                  <a:extLst>
+                    <a:ext uri="{9D8B030D-6E8A-4147-A177-3AD203B41FA5}">
+                      <a16:colId xmlns:a16="http://schemas.microsoft.com/office/drawing/2014/main" val="112294753"/>
+                    </a:ext>
+                  </a:extLst>
+                </a:gridCol>
+                <a:gridCol w="1778000">
+                  <a:extLst>
+                    <a:ext uri="{9D8B030D-6E8A-4147-A177-3AD203B41FA5}">
+                      <a16:colId xmlns:a16="http://schemas.microsoft.com/office/drawing/2014/main" val="996520253"/>
+                    </a:ext>
+                  </a:extLst>
+                </a:gridCol>
+                <a:gridCol w="1460500">
+                  <a:extLst>
+                    <a:ext uri="{9D8B030D-6E8A-4147-A177-3AD203B41FA5}">
+                      <a16:colId xmlns:a16="http://schemas.microsoft.com/office/drawing/2014/main" val="1717505064"/>
+                    </a:ext>
+                  </a:extLst>
+                </a:gridCol>
+              </a:tblGrid>
+              <a:tr h="182880">
+                <a:tc>
+                  <a:txBody>
+                    <a:bodyPr/>
+                    <a:lstStyle/>
+                    <a:p>
+                      <a:pPr algn="l" fontAlgn="b"/>
+                      <a:r>
+                        <a:rPr lang="en-US" sz="1100" b="1" u="none" strike="noStrike" dirty="0">
+                          <a:effectLst/>
+                        </a:rPr>
+                        <a:t>Taxa</a:t>
+                      </a:r>
+                      <a:endParaRPr lang="en-US" sz="1100" b="1" i="0" u="none" strike="noStrike" dirty="0">
+                        <a:solidFill>
+                          <a:srgbClr val="000000"/>
+                        </a:solidFill>
+                        <a:effectLst/>
+                        <a:latin typeface="Calibri" panose="020F0502020204030204" pitchFamily="34" charset="0"/>
+                      </a:endParaRPr>
+                    </a:p>
+                  </a:txBody>
+                  <a:tcPr marL="7620" marR="7620" marT="7620" marB="0" anchor="b"/>
+                </a:tc>
+                <a:tc>
+                  <a:txBody>
+                    <a:bodyPr/>
+                    <a:lstStyle/>
+                    <a:p>
+                      <a:pPr algn="l" fontAlgn="b"/>
+                      <a:r>
+                        <a:rPr lang="en-US" sz="1100" b="1" u="none" strike="noStrike" dirty="0">
+                          <a:effectLst/>
+                        </a:rPr>
+                        <a:t>Model</a:t>
+                      </a:r>
+                      <a:endParaRPr lang="en-US" sz="1100" b="1" i="0" u="none" strike="noStrike" dirty="0">
+                        <a:solidFill>
+                          <a:srgbClr val="000000"/>
+                        </a:solidFill>
+                        <a:effectLst/>
+                        <a:latin typeface="Calibri" panose="020F0502020204030204" pitchFamily="34" charset="0"/>
+                      </a:endParaRPr>
+                    </a:p>
+                  </a:txBody>
+                  <a:tcPr marL="7620" marR="7620" marT="7620" marB="0" anchor="b"/>
+                </a:tc>
+                <a:tc>
+                  <a:txBody>
+                    <a:bodyPr/>
+                    <a:lstStyle/>
+                    <a:p>
+                      <a:pPr algn="l" fontAlgn="b"/>
+                      <a:r>
+                        <a:rPr lang="en-US" sz="1100" b="1" u="none" strike="noStrike" dirty="0">
+                          <a:effectLst/>
+                        </a:rPr>
+                        <a:t>W-D Tukey p-value</a:t>
+                      </a:r>
+                      <a:endParaRPr lang="en-US" sz="1100" b="1" i="0" u="none" strike="noStrike" dirty="0">
+                        <a:solidFill>
+                          <a:srgbClr val="000000"/>
+                        </a:solidFill>
+                        <a:effectLst/>
+                        <a:latin typeface="Calibri" panose="020F0502020204030204" pitchFamily="34" charset="0"/>
+                      </a:endParaRPr>
+                    </a:p>
+                  </a:txBody>
+                  <a:tcPr marL="7620" marR="7620" marT="7620" marB="0" anchor="b"/>
+                </a:tc>
+                <a:extLst>
+                  <a:ext uri="{0D108BD9-81ED-4DB2-BD59-A6C34878D82A}">
+                    <a16:rowId xmlns:a16="http://schemas.microsoft.com/office/drawing/2014/main" val="3264800817"/>
+                  </a:ext>
+                </a:extLst>
+              </a:tr>
+              <a:tr h="182880">
+                <a:tc>
+                  <a:txBody>
+                    <a:bodyPr/>
+                    <a:lstStyle/>
+                    <a:p>
+                      <a:pPr algn="l" fontAlgn="b"/>
+                      <a:r>
+                        <a:rPr lang="en-US" sz="1100" u="none" strike="noStrike">
+                          <a:effectLst/>
+                        </a:rPr>
+                        <a:t>Daphnia</a:t>
+                      </a:r>
+                      <a:endParaRPr lang="en-US" sz="1100" b="0" i="0" u="none" strike="noStrike">
+                        <a:solidFill>
+                          <a:srgbClr val="000000"/>
+                        </a:solidFill>
+                        <a:effectLst/>
+                        <a:latin typeface="Calibri" panose="020F0502020204030204" pitchFamily="34" charset="0"/>
+                      </a:endParaRPr>
+                    </a:p>
+                  </a:txBody>
+                  <a:tcPr marL="7620" marR="7620" marT="7620" marB="0" anchor="b"/>
+                </a:tc>
+                <a:tc>
+                  <a:txBody>
+                    <a:bodyPr/>
+                    <a:lstStyle/>
+                    <a:p>
+                      <a:pPr algn="l" fontAlgn="b"/>
+                      <a:r>
+                        <a:rPr lang="en-US" sz="1100" u="none" strike="noStrike">
+                          <a:effectLst/>
+                        </a:rPr>
+                        <a:t>aov(log(BPUE + 1) ~ Drought)</a:t>
+                      </a:r>
+                      <a:endParaRPr lang="en-US" sz="1100" b="0" i="0" u="none" strike="noStrike">
+                        <a:solidFill>
+                          <a:srgbClr val="000000"/>
+                        </a:solidFill>
+                        <a:effectLst/>
+                        <a:latin typeface="Calibri" panose="020F0502020204030204" pitchFamily="34" charset="0"/>
+                      </a:endParaRPr>
+                    </a:p>
+                  </a:txBody>
+                  <a:tcPr marL="7620" marR="7620" marT="7620" marB="0" anchor="b"/>
+                </a:tc>
+                <a:tc>
+                  <a:txBody>
+                    <a:bodyPr/>
+                    <a:lstStyle/>
+                    <a:p>
+                      <a:pPr algn="r" fontAlgn="b"/>
+                      <a:r>
+                        <a:rPr lang="en-US" sz="1100" u="none" strike="noStrike" dirty="0">
+                          <a:effectLst/>
+                        </a:rPr>
+                        <a:t>0.5612784</a:t>
+                      </a:r>
+                      <a:endParaRPr lang="en-US" sz="1100" b="0" i="0" u="none" strike="noStrike" dirty="0">
+                        <a:solidFill>
+                          <a:srgbClr val="000000"/>
+                        </a:solidFill>
+                        <a:effectLst/>
+                        <a:latin typeface="Calibri" panose="020F0502020204030204" pitchFamily="34" charset="0"/>
+                      </a:endParaRPr>
+                    </a:p>
+                  </a:txBody>
+                  <a:tcPr marL="7620" marR="7620" marT="7620" marB="0" anchor="b"/>
+                </a:tc>
+                <a:extLst>
+                  <a:ext uri="{0D108BD9-81ED-4DB2-BD59-A6C34878D82A}">
+                    <a16:rowId xmlns:a16="http://schemas.microsoft.com/office/drawing/2014/main" val="3033043276"/>
+                  </a:ext>
+                </a:extLst>
+              </a:tr>
+              <a:tr h="182880">
+                <a:tc>
+                  <a:txBody>
+                    <a:bodyPr/>
+                    <a:lstStyle/>
+                    <a:p>
+                      <a:pPr algn="l" fontAlgn="b"/>
+                      <a:r>
+                        <a:rPr lang="en-US" sz="1100" u="none" strike="noStrike">
+                          <a:effectLst/>
+                        </a:rPr>
+                        <a:t>H. longirostris</a:t>
+                      </a:r>
+                      <a:endParaRPr lang="en-US" sz="1100" b="0" i="0" u="none" strike="noStrike">
+                        <a:solidFill>
+                          <a:srgbClr val="000000"/>
+                        </a:solidFill>
+                        <a:effectLst/>
+                        <a:latin typeface="Calibri" panose="020F0502020204030204" pitchFamily="34" charset="0"/>
+                      </a:endParaRPr>
+                    </a:p>
+                  </a:txBody>
+                  <a:tcPr marL="7620" marR="7620" marT="7620" marB="0" anchor="b"/>
+                </a:tc>
+                <a:tc>
+                  <a:txBody>
+                    <a:bodyPr/>
+                    <a:lstStyle/>
+                    <a:p>
+                      <a:pPr algn="l" fontAlgn="b"/>
+                      <a:r>
+                        <a:rPr lang="en-US" sz="1100" u="none" strike="noStrike">
+                          <a:effectLst/>
+                        </a:rPr>
+                        <a:t>aov(log(BPUE + 1) ~ Drought)</a:t>
+                      </a:r>
+                      <a:endParaRPr lang="en-US" sz="1100" b="0" i="0" u="none" strike="noStrike">
+                        <a:solidFill>
+                          <a:srgbClr val="000000"/>
+                        </a:solidFill>
+                        <a:effectLst/>
+                        <a:latin typeface="Calibri" panose="020F0502020204030204" pitchFamily="34" charset="0"/>
+                      </a:endParaRPr>
+                    </a:p>
+                  </a:txBody>
+                  <a:tcPr marL="7620" marR="7620" marT="7620" marB="0" anchor="b"/>
+                </a:tc>
+                <a:tc>
+                  <a:txBody>
+                    <a:bodyPr/>
+                    <a:lstStyle/>
+                    <a:p>
+                      <a:pPr algn="r" fontAlgn="b"/>
+                      <a:r>
+                        <a:rPr lang="en-US" sz="1100" u="none" strike="noStrike">
+                          <a:effectLst/>
+                        </a:rPr>
+                        <a:t>0.309038</a:t>
+                      </a:r>
+                      <a:endParaRPr lang="en-US" sz="1100" b="0" i="0" u="none" strike="noStrike">
+                        <a:solidFill>
+                          <a:srgbClr val="000000"/>
+                        </a:solidFill>
+                        <a:effectLst/>
+                        <a:latin typeface="Calibri" panose="020F0502020204030204" pitchFamily="34" charset="0"/>
+                      </a:endParaRPr>
+                    </a:p>
+                  </a:txBody>
+                  <a:tcPr marL="7620" marR="7620" marT="7620" marB="0" anchor="b"/>
+                </a:tc>
+                <a:extLst>
+                  <a:ext uri="{0D108BD9-81ED-4DB2-BD59-A6C34878D82A}">
+                    <a16:rowId xmlns:a16="http://schemas.microsoft.com/office/drawing/2014/main" val="293842581"/>
+                  </a:ext>
+                </a:extLst>
+              </a:tr>
+              <a:tr h="182880">
+                <a:tc>
+                  <a:txBody>
+                    <a:bodyPr/>
+                    <a:lstStyle/>
+                    <a:p>
+                      <a:pPr algn="l" fontAlgn="b"/>
+                      <a:r>
+                        <a:rPr lang="en-US" sz="1100" u="none" strike="noStrike">
+                          <a:effectLst/>
+                        </a:rPr>
+                        <a:t>L. tetraspina</a:t>
+                      </a:r>
+                      <a:endParaRPr lang="en-US" sz="1100" b="0" i="0" u="none" strike="noStrike">
+                        <a:solidFill>
+                          <a:srgbClr val="000000"/>
+                        </a:solidFill>
+                        <a:effectLst/>
+                        <a:latin typeface="Calibri" panose="020F0502020204030204" pitchFamily="34" charset="0"/>
+                      </a:endParaRPr>
+                    </a:p>
+                  </a:txBody>
+                  <a:tcPr marL="7620" marR="7620" marT="7620" marB="0" anchor="b"/>
+                </a:tc>
+                <a:tc>
+                  <a:txBody>
+                    <a:bodyPr/>
+                    <a:lstStyle/>
+                    <a:p>
+                      <a:pPr algn="l" fontAlgn="b"/>
+                      <a:r>
+                        <a:rPr lang="en-US" sz="1100" u="none" strike="noStrike">
+                          <a:effectLst/>
+                        </a:rPr>
+                        <a:t>aov(log(BPUE + 1) ~ Drought)</a:t>
+                      </a:r>
+                      <a:endParaRPr lang="en-US" sz="1100" b="0" i="0" u="none" strike="noStrike">
+                        <a:solidFill>
+                          <a:srgbClr val="000000"/>
+                        </a:solidFill>
+                        <a:effectLst/>
+                        <a:latin typeface="Calibri" panose="020F0502020204030204" pitchFamily="34" charset="0"/>
+                      </a:endParaRPr>
+                    </a:p>
+                  </a:txBody>
+                  <a:tcPr marL="7620" marR="7620" marT="7620" marB="0" anchor="b"/>
+                </a:tc>
+                <a:tc>
+                  <a:txBody>
+                    <a:bodyPr/>
+                    <a:lstStyle/>
+                    <a:p>
+                      <a:pPr algn="r" fontAlgn="b"/>
+                      <a:r>
+                        <a:rPr lang="en-US" sz="1100" u="none" strike="noStrike">
+                          <a:effectLst/>
+                        </a:rPr>
+                        <a:t>0.0055199</a:t>
+                      </a:r>
+                      <a:endParaRPr lang="en-US" sz="1100" b="0" i="0" u="none" strike="noStrike">
+                        <a:solidFill>
+                          <a:srgbClr val="000000"/>
+                        </a:solidFill>
+                        <a:effectLst/>
+                        <a:latin typeface="Calibri" panose="020F0502020204030204" pitchFamily="34" charset="0"/>
+                      </a:endParaRPr>
+                    </a:p>
+                  </a:txBody>
+                  <a:tcPr marL="7620" marR="7620" marT="7620" marB="0" anchor="b"/>
+                </a:tc>
+                <a:extLst>
+                  <a:ext uri="{0D108BD9-81ED-4DB2-BD59-A6C34878D82A}">
+                    <a16:rowId xmlns:a16="http://schemas.microsoft.com/office/drawing/2014/main" val="3258790197"/>
+                  </a:ext>
+                </a:extLst>
+              </a:tr>
+              <a:tr h="182880">
+                <a:tc>
+                  <a:txBody>
+                    <a:bodyPr/>
+                    <a:lstStyle/>
+                    <a:p>
+                      <a:pPr algn="l" fontAlgn="b"/>
+                      <a:r>
+                        <a:rPr lang="en-US" sz="1100" u="none" strike="noStrike">
+                          <a:effectLst/>
+                        </a:rPr>
+                        <a:t>P. forbesi</a:t>
+                      </a:r>
+                      <a:endParaRPr lang="en-US" sz="1100" b="0" i="0" u="none" strike="noStrike">
+                        <a:solidFill>
+                          <a:srgbClr val="000000"/>
+                        </a:solidFill>
+                        <a:effectLst/>
+                        <a:latin typeface="Calibri" panose="020F0502020204030204" pitchFamily="34" charset="0"/>
+                      </a:endParaRPr>
+                    </a:p>
+                  </a:txBody>
+                  <a:tcPr marL="7620" marR="7620" marT="7620" marB="0" anchor="b"/>
+                </a:tc>
+                <a:tc>
+                  <a:txBody>
+                    <a:bodyPr/>
+                    <a:lstStyle/>
+                    <a:p>
+                      <a:pPr algn="l" fontAlgn="b"/>
+                      <a:r>
+                        <a:rPr lang="en-US" sz="1100" u="none" strike="noStrike">
+                          <a:effectLst/>
+                        </a:rPr>
+                        <a:t>aov(log(BPUE + 1) ~ Drought)</a:t>
+                      </a:r>
+                      <a:endParaRPr lang="en-US" sz="1100" b="0" i="0" u="none" strike="noStrike">
+                        <a:solidFill>
+                          <a:srgbClr val="000000"/>
+                        </a:solidFill>
+                        <a:effectLst/>
+                        <a:latin typeface="Calibri" panose="020F0502020204030204" pitchFamily="34" charset="0"/>
+                      </a:endParaRPr>
+                    </a:p>
+                  </a:txBody>
+                  <a:tcPr marL="7620" marR="7620" marT="7620" marB="0" anchor="b"/>
+                </a:tc>
+                <a:tc>
+                  <a:txBody>
+                    <a:bodyPr/>
+                    <a:lstStyle/>
+                    <a:p>
+                      <a:pPr algn="r" fontAlgn="b"/>
+                      <a:r>
+                        <a:rPr lang="en-US" sz="1100" u="none" strike="noStrike" dirty="0">
+                          <a:effectLst/>
+                        </a:rPr>
+                        <a:t>0.3829747</a:t>
+                      </a:r>
+                      <a:endParaRPr lang="en-US" sz="1100" b="0" i="0" u="none" strike="noStrike" dirty="0">
+                        <a:solidFill>
+                          <a:srgbClr val="000000"/>
+                        </a:solidFill>
+                        <a:effectLst/>
+                        <a:latin typeface="Calibri" panose="020F0502020204030204" pitchFamily="34" charset="0"/>
+                      </a:endParaRPr>
+                    </a:p>
+                  </a:txBody>
+                  <a:tcPr marL="7620" marR="7620" marT="7620" marB="0" anchor="b"/>
+                </a:tc>
+                <a:extLst>
+                  <a:ext uri="{0D108BD9-81ED-4DB2-BD59-A6C34878D82A}">
+                    <a16:rowId xmlns:a16="http://schemas.microsoft.com/office/drawing/2014/main" val="2938809697"/>
+                  </a:ext>
+                </a:extLst>
+              </a:tr>
+            </a:tbl>
+          </a:graphicData>
+        </a:graphic>
+      </p:graphicFrame>
+      <p:sp>
+        <p:nvSpPr>
+          <p:cNvPr id="6" name="Title 1">
+            <a:extLst>
+              <a:ext uri="{FF2B5EF4-FFF2-40B4-BE49-F238E27FC236}">
+                <a16:creationId xmlns:a16="http://schemas.microsoft.com/office/drawing/2014/main" id="{77AFAD3A-9516-F99D-D240-41411CD18501}"/>
+              </a:ext>
+            </a:extLst>
+          </p:cNvPr>
+          <p:cNvSpPr txBox="1">
+            <a:spLocks/>
+          </p:cNvSpPr>
+          <p:nvPr/>
+        </p:nvSpPr>
+        <p:spPr>
+          <a:xfrm>
+            <a:off x="0" y="25740"/>
+            <a:ext cx="5203528" cy="1638600"/>
           </a:xfrm>
           <a:prstGeom prst="rect">
             <a:avLst/>
           </a:prstGeom>
         </p:spPr>
-      </p:pic>
+        <p:txBody>
+          <a:bodyPr>
+            <a:normAutofit fontScale="90000"/>
+          </a:bodyPr>
+          <a:lstStyle>
+            <a:lvl1pPr algn="l" defTabSz="914400" rtl="0" eaLnBrk="1" latinLnBrk="0" hangingPunct="1">
+              <a:lnSpc>
+                <a:spcPct val="90000"/>
+              </a:lnSpc>
+              <a:spcBef>
+                <a:spcPct val="0"/>
+              </a:spcBef>
+              <a:buNone/>
+              <a:defRPr sz="4400" kern="1200">
+                <a:solidFill>
+                  <a:schemeClr val="tx1"/>
+                </a:solidFill>
+                <a:latin typeface="+mj-lt"/>
+                <a:ea typeface="+mj-ea"/>
+                <a:cs typeface="+mj-cs"/>
+              </a:defRPr>
+            </a:lvl1pPr>
+          </a:lstStyle>
+          <a:p>
+            <a:r>
+              <a:rPr lang="en-US" dirty="0"/>
+              <a:t>BPUE variance within ‘preferred’ salinity zone</a:t>
+            </a:r>
+          </a:p>
+        </p:txBody>
+      </p:sp>
     </p:spTree>
     <p:extLst>
       <p:ext uri="{BB962C8B-B14F-4D97-AF65-F5344CB8AC3E}">
-        <p14:creationId xmlns:p14="http://schemas.microsoft.com/office/powerpoint/2010/main" val="1656432974"/>
+        <p14:creationId xmlns:p14="http://schemas.microsoft.com/office/powerpoint/2010/main" val="3527320659"/>
       </p:ext>
     </p:extLst>
   </p:cSld>

</xml_diff>

<commit_message>
December updates, new mapping, new salinity distribution figure 6
</commit_message>
<xml_diff>
--- a/PaperOutline_v1_3.pptx
+++ b/PaperOutline_v1_3.pptx
@@ -5,7 +5,7 @@
     <p:sldMasterId id="2147483648" r:id="rId1"/>
   </p:sldMasterIdLst>
   <p:notesMasterIdLst>
-    <p:notesMasterId r:id="rId12"/>
+    <p:notesMasterId r:id="rId15"/>
   </p:notesMasterIdLst>
   <p:sldIdLst>
     <p:sldId id="319" r:id="rId2"/>
@@ -18,6 +18,9 @@
     <p:sldId id="331" r:id="rId9"/>
     <p:sldId id="323" r:id="rId10"/>
     <p:sldId id="324" r:id="rId11"/>
+    <p:sldId id="332" r:id="rId12"/>
+    <p:sldId id="333" r:id="rId13"/>
+    <p:sldId id="334" r:id="rId14"/>
   </p:sldIdLst>
   <p:sldSz cx="12192000" cy="6858000"/>
   <p:notesSz cx="6858000" cy="9144000"/>
@@ -206,7 +209,7 @@
           <a:p>
             <a:fld id="{982D7E43-E401-43ED-ACCB-2C6410FE48A5}" type="datetimeFigureOut">
               <a:rPr lang="en-US" smtClean="0"/>
-              <a:t>9/2/2022</a:t>
+              <a:t>12/12/2022</a:t>
             </a:fld>
             <a:endParaRPr lang="en-US"/>
           </a:p>
@@ -560,6 +563,174 @@
 </p:notes>
 </file>
 
+<file path=ppt/notesSlides/notesSlide2.xml><?xml version="1.0" encoding="utf-8"?>
+<p:notes xmlns:a="http://schemas.openxmlformats.org/drawingml/2006/main" xmlns:r="http://schemas.openxmlformats.org/officeDocument/2006/relationships" xmlns:p="http://schemas.openxmlformats.org/presentationml/2006/main">
+  <p:cSld>
+    <p:spTree>
+      <p:nvGrpSpPr>
+        <p:cNvPr id="1" name=""/>
+        <p:cNvGrpSpPr/>
+        <p:nvPr/>
+      </p:nvGrpSpPr>
+      <p:grpSpPr>
+        <a:xfrm>
+          <a:off x="0" y="0"/>
+          <a:ext cx="0" cy="0"/>
+          <a:chOff x="0" y="0"/>
+          <a:chExt cx="0" cy="0"/>
+        </a:xfrm>
+      </p:grpSpPr>
+      <p:sp>
+        <p:nvSpPr>
+          <p:cNvPr id="2" name="Slide Image Placeholder 1"/>
+          <p:cNvSpPr>
+            <a:spLocks noGrp="1" noRot="1" noChangeAspect="1"/>
+          </p:cNvSpPr>
+          <p:nvPr>
+            <p:ph type="sldImg"/>
+          </p:nvPr>
+        </p:nvSpPr>
+        <p:spPr/>
+      </p:sp>
+      <p:sp>
+        <p:nvSpPr>
+          <p:cNvPr id="3" name="Notes Placeholder 2"/>
+          <p:cNvSpPr>
+            <a:spLocks noGrp="1"/>
+          </p:cNvSpPr>
+          <p:nvPr>
+            <p:ph type="body" idx="1"/>
+          </p:nvPr>
+        </p:nvSpPr>
+        <p:spPr/>
+        <p:txBody>
+          <a:bodyPr/>
+          <a:lstStyle/>
+          <a:p>
+            <a:endParaRPr lang="en-US" dirty="0"/>
+          </a:p>
+        </p:txBody>
+      </p:sp>
+      <p:sp>
+        <p:nvSpPr>
+          <p:cNvPr id="4" name="Slide Number Placeholder 3"/>
+          <p:cNvSpPr>
+            <a:spLocks noGrp="1"/>
+          </p:cNvSpPr>
+          <p:nvPr>
+            <p:ph type="sldNum" sz="quarter" idx="5"/>
+          </p:nvPr>
+        </p:nvSpPr>
+        <p:spPr/>
+        <p:txBody>
+          <a:bodyPr/>
+          <a:lstStyle/>
+          <a:p>
+            <a:fld id="{EA87809D-E210-4F1B-A8DB-E3455A6CAC80}" type="slidenum">
+              <a:rPr lang="en-US" smtClean="0"/>
+              <a:t>7</a:t>
+            </a:fld>
+            <a:endParaRPr lang="en-US"/>
+          </a:p>
+        </p:txBody>
+      </p:sp>
+    </p:spTree>
+    <p:extLst>
+      <p:ext uri="{BB962C8B-B14F-4D97-AF65-F5344CB8AC3E}">
+        <p14:creationId xmlns:p14="http://schemas.microsoft.com/office/powerpoint/2010/main" val="650669877"/>
+      </p:ext>
+    </p:extLst>
+  </p:cSld>
+  <p:clrMapOvr>
+    <a:masterClrMapping/>
+  </p:clrMapOvr>
+</p:notes>
+</file>
+
+<file path=ppt/notesSlides/notesSlide3.xml><?xml version="1.0" encoding="utf-8"?>
+<p:notes xmlns:a="http://schemas.openxmlformats.org/drawingml/2006/main" xmlns:r="http://schemas.openxmlformats.org/officeDocument/2006/relationships" xmlns:p="http://schemas.openxmlformats.org/presentationml/2006/main">
+  <p:cSld>
+    <p:spTree>
+      <p:nvGrpSpPr>
+        <p:cNvPr id="1" name=""/>
+        <p:cNvGrpSpPr/>
+        <p:nvPr/>
+      </p:nvGrpSpPr>
+      <p:grpSpPr>
+        <a:xfrm>
+          <a:off x="0" y="0"/>
+          <a:ext cx="0" cy="0"/>
+          <a:chOff x="0" y="0"/>
+          <a:chExt cx="0" cy="0"/>
+        </a:xfrm>
+      </p:grpSpPr>
+      <p:sp>
+        <p:nvSpPr>
+          <p:cNvPr id="2" name="Slide Image Placeholder 1"/>
+          <p:cNvSpPr>
+            <a:spLocks noGrp="1" noRot="1" noChangeAspect="1"/>
+          </p:cNvSpPr>
+          <p:nvPr>
+            <p:ph type="sldImg"/>
+          </p:nvPr>
+        </p:nvSpPr>
+        <p:spPr/>
+      </p:sp>
+      <p:sp>
+        <p:nvSpPr>
+          <p:cNvPr id="3" name="Notes Placeholder 2"/>
+          <p:cNvSpPr>
+            <a:spLocks noGrp="1"/>
+          </p:cNvSpPr>
+          <p:nvPr>
+            <p:ph type="body" idx="1"/>
+          </p:nvPr>
+        </p:nvSpPr>
+        <p:spPr/>
+        <p:txBody>
+          <a:bodyPr/>
+          <a:lstStyle/>
+          <a:p>
+            <a:endParaRPr lang="en-US" dirty="0"/>
+          </a:p>
+        </p:txBody>
+      </p:sp>
+      <p:sp>
+        <p:nvSpPr>
+          <p:cNvPr id="4" name="Slide Number Placeholder 3"/>
+          <p:cNvSpPr>
+            <a:spLocks noGrp="1"/>
+          </p:cNvSpPr>
+          <p:nvPr>
+            <p:ph type="sldNum" sz="quarter" idx="5"/>
+          </p:nvPr>
+        </p:nvSpPr>
+        <p:spPr/>
+        <p:txBody>
+          <a:bodyPr/>
+          <a:lstStyle/>
+          <a:p>
+            <a:fld id="{EA87809D-E210-4F1B-A8DB-E3455A6CAC80}" type="slidenum">
+              <a:rPr lang="en-US" smtClean="0"/>
+              <a:t>12</a:t>
+            </a:fld>
+            <a:endParaRPr lang="en-US"/>
+          </a:p>
+        </p:txBody>
+      </p:sp>
+    </p:spTree>
+    <p:extLst>
+      <p:ext uri="{BB962C8B-B14F-4D97-AF65-F5344CB8AC3E}">
+        <p14:creationId xmlns:p14="http://schemas.microsoft.com/office/powerpoint/2010/main" val="122042480"/>
+      </p:ext>
+    </p:extLst>
+  </p:cSld>
+  <p:clrMapOvr>
+    <a:masterClrMapping/>
+  </p:clrMapOvr>
+</p:notes>
+</file>
+
 <file path=ppt/slideLayouts/slideLayout1.xml><?xml version="1.0" encoding="utf-8"?>
 <p:sldLayout xmlns:a="http://schemas.openxmlformats.org/drawingml/2006/main" xmlns:r="http://schemas.openxmlformats.org/officeDocument/2006/relationships" xmlns:p="http://schemas.openxmlformats.org/presentationml/2006/main" type="title" preserve="1">
   <p:cSld name="Title Slide">
@@ -707,7 +878,7 @@
           <a:p>
             <a:fld id="{C81EE8AC-7356-4E1A-8866-5ADEE4133E9C}" type="datetimeFigureOut">
               <a:rPr lang="en-US" smtClean="0"/>
-              <a:t>9/2/2022</a:t>
+              <a:t>12/12/2022</a:t>
             </a:fld>
             <a:endParaRPr lang="en-US"/>
           </a:p>
@@ -905,7 +1076,7 @@
           <a:p>
             <a:fld id="{C81EE8AC-7356-4E1A-8866-5ADEE4133E9C}" type="datetimeFigureOut">
               <a:rPr lang="en-US" smtClean="0"/>
-              <a:t>9/2/2022</a:t>
+              <a:t>12/12/2022</a:t>
             </a:fld>
             <a:endParaRPr lang="en-US"/>
           </a:p>
@@ -1113,7 +1284,7 @@
           <a:p>
             <a:fld id="{C81EE8AC-7356-4E1A-8866-5ADEE4133E9C}" type="datetimeFigureOut">
               <a:rPr lang="en-US" smtClean="0"/>
-              <a:t>9/2/2022</a:t>
+              <a:t>12/12/2022</a:t>
             </a:fld>
             <a:endParaRPr lang="en-US"/>
           </a:p>
@@ -1311,7 +1482,7 @@
           <a:p>
             <a:fld id="{C81EE8AC-7356-4E1A-8866-5ADEE4133E9C}" type="datetimeFigureOut">
               <a:rPr lang="en-US" smtClean="0"/>
-              <a:t>9/2/2022</a:t>
+              <a:t>12/12/2022</a:t>
             </a:fld>
             <a:endParaRPr lang="en-US"/>
           </a:p>
@@ -1586,7 +1757,7 @@
           <a:p>
             <a:fld id="{C81EE8AC-7356-4E1A-8866-5ADEE4133E9C}" type="datetimeFigureOut">
               <a:rPr lang="en-US" smtClean="0"/>
-              <a:t>9/2/2022</a:t>
+              <a:t>12/12/2022</a:t>
             </a:fld>
             <a:endParaRPr lang="en-US"/>
           </a:p>
@@ -1851,7 +2022,7 @@
           <a:p>
             <a:fld id="{C81EE8AC-7356-4E1A-8866-5ADEE4133E9C}" type="datetimeFigureOut">
               <a:rPr lang="en-US" smtClean="0"/>
-              <a:t>9/2/2022</a:t>
+              <a:t>12/12/2022</a:t>
             </a:fld>
             <a:endParaRPr lang="en-US"/>
           </a:p>
@@ -2263,7 +2434,7 @@
           <a:p>
             <a:fld id="{C81EE8AC-7356-4E1A-8866-5ADEE4133E9C}" type="datetimeFigureOut">
               <a:rPr lang="en-US" smtClean="0"/>
-              <a:t>9/2/2022</a:t>
+              <a:t>12/12/2022</a:t>
             </a:fld>
             <a:endParaRPr lang="en-US"/>
           </a:p>
@@ -2404,7 +2575,7 @@
           <a:p>
             <a:fld id="{C81EE8AC-7356-4E1A-8866-5ADEE4133E9C}" type="datetimeFigureOut">
               <a:rPr lang="en-US" smtClean="0"/>
-              <a:t>9/2/2022</a:t>
+              <a:t>12/12/2022</a:t>
             </a:fld>
             <a:endParaRPr lang="en-US"/>
           </a:p>
@@ -2517,7 +2688,7 @@
           <a:p>
             <a:fld id="{C81EE8AC-7356-4E1A-8866-5ADEE4133E9C}" type="datetimeFigureOut">
               <a:rPr lang="en-US" smtClean="0"/>
-              <a:t>9/2/2022</a:t>
+              <a:t>12/12/2022</a:t>
             </a:fld>
             <a:endParaRPr lang="en-US"/>
           </a:p>
@@ -2828,7 +2999,7 @@
           <a:p>
             <a:fld id="{C81EE8AC-7356-4E1A-8866-5ADEE4133E9C}" type="datetimeFigureOut">
               <a:rPr lang="en-US" smtClean="0"/>
-              <a:t>9/2/2022</a:t>
+              <a:t>12/12/2022</a:t>
             </a:fld>
             <a:endParaRPr lang="en-US"/>
           </a:p>
@@ -3116,7 +3287,7 @@
           <a:p>
             <a:fld id="{C81EE8AC-7356-4E1A-8866-5ADEE4133E9C}" type="datetimeFigureOut">
               <a:rPr lang="en-US" smtClean="0"/>
-              <a:t>9/2/2022</a:t>
+              <a:t>12/12/2022</a:t>
             </a:fld>
             <a:endParaRPr lang="en-US"/>
           </a:p>
@@ -3357,7 +3528,7 @@
           <a:p>
             <a:fld id="{C81EE8AC-7356-4E1A-8866-5ADEE4133E9C}" type="datetimeFigureOut">
               <a:rPr lang="en-US" smtClean="0"/>
-              <a:t>9/2/2022</a:t>
+              <a:t>12/12/2022</a:t>
             </a:fld>
             <a:endParaRPr lang="en-US"/>
           </a:p>
@@ -3922,10 +4093,10 @@
       </p:grpSpPr>
       <p:pic>
         <p:nvPicPr>
-          <p:cNvPr id="17" name="Picture 16" descr="Chart&#10;&#10;Description automatically generated">
+          <p:cNvPr id="5" name="Picture 4">
             <a:extLst>
               <a:ext uri="{FF2B5EF4-FFF2-40B4-BE49-F238E27FC236}">
-                <a16:creationId xmlns:a16="http://schemas.microsoft.com/office/drawing/2014/main" id="{B0A57CFC-DA00-25C3-9408-E63214D4F4CA}"/>
+                <a16:creationId xmlns:a16="http://schemas.microsoft.com/office/drawing/2014/main" id="{4B73F493-73B0-3537-2712-BE0412AA2ECB}"/>
               </a:ext>
             </a:extLst>
           </p:cNvPr>
@@ -3974,6 +4145,1076 @@
 </p:sld>
 </file>
 
+<file path=ppt/slides/slide11.xml><?xml version="1.0" encoding="utf-8"?>
+<p:sld xmlns:a="http://schemas.openxmlformats.org/drawingml/2006/main" xmlns:r="http://schemas.openxmlformats.org/officeDocument/2006/relationships" xmlns:p="http://schemas.openxmlformats.org/presentationml/2006/main">
+  <p:cSld>
+    <p:spTree>
+      <p:nvGrpSpPr>
+        <p:cNvPr id="1" name=""/>
+        <p:cNvGrpSpPr/>
+        <p:nvPr/>
+      </p:nvGrpSpPr>
+      <p:grpSpPr>
+        <a:xfrm>
+          <a:off x="0" y="0"/>
+          <a:ext cx="0" cy="0"/>
+          <a:chOff x="0" y="0"/>
+          <a:chExt cx="0" cy="0"/>
+        </a:xfrm>
+      </p:grpSpPr>
+      <p:pic>
+        <p:nvPicPr>
+          <p:cNvPr id="11" name="Picture 10" descr="Chart, map&#10;&#10;Description automatically generated">
+            <a:extLst>
+              <a:ext uri="{FF2B5EF4-FFF2-40B4-BE49-F238E27FC236}">
+                <a16:creationId xmlns:a16="http://schemas.microsoft.com/office/drawing/2014/main" id="{BE5315BA-A868-DA79-DA59-2D1434FA75B4}"/>
+              </a:ext>
+            </a:extLst>
+          </p:cNvPr>
+          <p:cNvPicPr>
+            <a:picLocks noChangeAspect="1"/>
+          </p:cNvPicPr>
+          <p:nvPr/>
+        </p:nvPicPr>
+        <p:blipFill>
+          <a:blip r:embed="rId2">
+            <a:extLst>
+              <a:ext uri="{28A0092B-C50C-407E-A947-70E740481C1C}">
+                <a14:useLocalDpi xmlns:a14="http://schemas.microsoft.com/office/drawing/2010/main" val="0"/>
+              </a:ext>
+            </a:extLst>
+          </a:blip>
+          <a:stretch>
+            <a:fillRect/>
+          </a:stretch>
+        </p:blipFill>
+        <p:spPr>
+          <a:xfrm>
+            <a:off x="848412" y="280447"/>
+            <a:ext cx="10797619" cy="6478571"/>
+          </a:xfrm>
+          <a:prstGeom prst="rect">
+            <a:avLst/>
+          </a:prstGeom>
+        </p:spPr>
+      </p:pic>
+    </p:spTree>
+    <p:extLst>
+      <p:ext uri="{BB962C8B-B14F-4D97-AF65-F5344CB8AC3E}">
+        <p14:creationId xmlns:p14="http://schemas.microsoft.com/office/powerpoint/2010/main" val="874757307"/>
+      </p:ext>
+    </p:extLst>
+  </p:cSld>
+  <p:clrMapOvr>
+    <a:masterClrMapping/>
+  </p:clrMapOvr>
+</p:sld>
+</file>
+
+<file path=ppt/slides/slide12.xml><?xml version="1.0" encoding="utf-8"?>
+<p:sld xmlns:a="http://schemas.openxmlformats.org/drawingml/2006/main" xmlns:r="http://schemas.openxmlformats.org/officeDocument/2006/relationships" xmlns:p="http://schemas.openxmlformats.org/presentationml/2006/main">
+  <p:cSld>
+    <p:spTree>
+      <p:nvGrpSpPr>
+        <p:cNvPr id="1" name=""/>
+        <p:cNvGrpSpPr/>
+        <p:nvPr/>
+      </p:nvGrpSpPr>
+      <p:grpSpPr>
+        <a:xfrm>
+          <a:off x="0" y="0"/>
+          <a:ext cx="0" cy="0"/>
+          <a:chOff x="0" y="0"/>
+          <a:chExt cx="0" cy="0"/>
+        </a:xfrm>
+      </p:grpSpPr>
+      <p:grpSp>
+        <p:nvGrpSpPr>
+          <p:cNvPr id="2" name="Group 1">
+            <a:extLst>
+              <a:ext uri="{FF2B5EF4-FFF2-40B4-BE49-F238E27FC236}">
+                <a16:creationId xmlns:a16="http://schemas.microsoft.com/office/drawing/2014/main" id="{E4258F93-DF2A-7E09-9F17-646839D3F46B}"/>
+              </a:ext>
+            </a:extLst>
+          </p:cNvPr>
+          <p:cNvGrpSpPr/>
+          <p:nvPr/>
+        </p:nvGrpSpPr>
+        <p:grpSpPr>
+          <a:xfrm>
+            <a:off x="1" y="228597"/>
+            <a:ext cx="10668007" cy="6400804"/>
+            <a:chOff x="1" y="228597"/>
+            <a:chExt cx="10668007" cy="6400804"/>
+          </a:xfrm>
+        </p:grpSpPr>
+        <p:grpSp>
+          <p:nvGrpSpPr>
+            <p:cNvPr id="26" name="Group 25">
+              <a:extLst>
+                <a:ext uri="{FF2B5EF4-FFF2-40B4-BE49-F238E27FC236}">
+                  <a16:creationId xmlns:a16="http://schemas.microsoft.com/office/drawing/2014/main" id="{6267E7DE-D78E-60C2-89EF-795D3B759001}"/>
+                </a:ext>
+              </a:extLst>
+            </p:cNvPr>
+            <p:cNvGrpSpPr/>
+            <p:nvPr/>
+          </p:nvGrpSpPr>
+          <p:grpSpPr>
+            <a:xfrm>
+              <a:off x="1" y="228597"/>
+              <a:ext cx="10668007" cy="6400804"/>
+              <a:chOff x="1" y="228597"/>
+              <a:chExt cx="10668007" cy="6400804"/>
+            </a:xfrm>
+          </p:grpSpPr>
+          <p:pic>
+            <p:nvPicPr>
+              <p:cNvPr id="3" name="Picture 2">
+                <a:extLst>
+                  <a:ext uri="{FF2B5EF4-FFF2-40B4-BE49-F238E27FC236}">
+                    <a16:creationId xmlns:a16="http://schemas.microsoft.com/office/drawing/2014/main" id="{3802DED3-75DC-3027-7B01-CA27DEB19FAB}"/>
+                  </a:ext>
+                </a:extLst>
+              </p:cNvPr>
+              <p:cNvPicPr>
+                <a:picLocks noChangeAspect="1"/>
+              </p:cNvPicPr>
+              <p:nvPr/>
+            </p:nvPicPr>
+            <p:blipFill>
+              <a:blip r:embed="rId3">
+                <a:extLst>
+                  <a:ext uri="{28A0092B-C50C-407E-A947-70E740481C1C}">
+                    <a14:useLocalDpi xmlns:a14="http://schemas.microsoft.com/office/drawing/2010/main" val="0"/>
+                  </a:ext>
+                </a:extLst>
+              </a:blip>
+              <a:srcRect/>
+              <a:stretch/>
+            </p:blipFill>
+            <p:spPr>
+              <a:xfrm>
+                <a:off x="1" y="228597"/>
+                <a:ext cx="10668007" cy="6400804"/>
+              </a:xfrm>
+              <a:prstGeom prst="rect">
+                <a:avLst/>
+              </a:prstGeom>
+              <a:ln>
+                <a:solidFill>
+                  <a:schemeClr val="tx1"/>
+                </a:solidFill>
+              </a:ln>
+            </p:spPr>
+          </p:pic>
+          <p:grpSp>
+            <p:nvGrpSpPr>
+              <p:cNvPr id="11" name="Group 10">
+                <a:extLst>
+                  <a:ext uri="{FF2B5EF4-FFF2-40B4-BE49-F238E27FC236}">
+                    <a16:creationId xmlns:a16="http://schemas.microsoft.com/office/drawing/2014/main" id="{6DDADF9F-B83F-AEC7-28FF-F01704AA9379}"/>
+                  </a:ext>
+                </a:extLst>
+              </p:cNvPr>
+              <p:cNvGrpSpPr/>
+              <p:nvPr/>
+            </p:nvGrpSpPr>
+            <p:grpSpPr>
+              <a:xfrm>
+                <a:off x="725028" y="2977322"/>
+                <a:ext cx="1040100" cy="808837"/>
+                <a:chOff x="-470601" y="2625316"/>
+                <a:chExt cx="1040100" cy="967270"/>
+              </a:xfrm>
+            </p:grpSpPr>
+            <p:sp>
+              <p:nvSpPr>
+                <p:cNvPr id="12" name="Rectangle: Rounded Corners 11">
+                  <a:extLst>
+                    <a:ext uri="{FF2B5EF4-FFF2-40B4-BE49-F238E27FC236}">
+                      <a16:creationId xmlns:a16="http://schemas.microsoft.com/office/drawing/2014/main" id="{78F6A85A-3D99-665C-AB07-1AA16E6C18E7}"/>
+                    </a:ext>
+                  </a:extLst>
+                </p:cNvPr>
+                <p:cNvSpPr/>
+                <p:nvPr/>
+              </p:nvSpPr>
+              <p:spPr>
+                <a:xfrm>
+                  <a:off x="-470601" y="2625316"/>
+                  <a:ext cx="1040100" cy="377072"/>
+                </a:xfrm>
+                <a:prstGeom prst="roundRect">
+                  <a:avLst/>
+                </a:prstGeom>
+                <a:solidFill>
+                  <a:schemeClr val="bg1"/>
+                </a:solidFill>
+                <a:ln w="19050">
+                  <a:solidFill>
+                    <a:schemeClr val="tx1"/>
+                  </a:solidFill>
+                </a:ln>
+              </p:spPr>
+              <p:style>
+                <a:lnRef idx="2">
+                  <a:schemeClr val="accent1">
+                    <a:shade val="50000"/>
+                  </a:schemeClr>
+                </a:lnRef>
+                <a:fillRef idx="1">
+                  <a:schemeClr val="accent1"/>
+                </a:fillRef>
+                <a:effectRef idx="0">
+                  <a:schemeClr val="accent1"/>
+                </a:effectRef>
+                <a:fontRef idx="minor">
+                  <a:schemeClr val="lt1"/>
+                </a:fontRef>
+              </p:style>
+              <p:txBody>
+                <a:bodyPr rtlCol="0" anchor="ctr"/>
+                <a:lstStyle/>
+                <a:p>
+                  <a:pPr algn="ctr"/>
+                  <a:r>
+                    <a:rPr lang="en-US" dirty="0">
+                      <a:solidFill>
+                        <a:sysClr val="windowText" lastClr="000000"/>
+                      </a:solidFill>
+                    </a:rPr>
+                    <a:t>40 RKM</a:t>
+                  </a:r>
+                </a:p>
+              </p:txBody>
+            </p:sp>
+            <p:cxnSp>
+              <p:nvCxnSpPr>
+                <p:cNvPr id="13" name="Straight Connector 12">
+                  <a:extLst>
+                    <a:ext uri="{FF2B5EF4-FFF2-40B4-BE49-F238E27FC236}">
+                      <a16:creationId xmlns:a16="http://schemas.microsoft.com/office/drawing/2014/main" id="{0D5614B5-5603-58B0-8F21-49C4F59FF7C7}"/>
+                    </a:ext>
+                  </a:extLst>
+                </p:cNvPr>
+                <p:cNvCxnSpPr>
+                  <a:cxnSpLocks/>
+                </p:cNvCxnSpPr>
+                <p:nvPr/>
+              </p:nvCxnSpPr>
+              <p:spPr>
+                <a:xfrm>
+                  <a:off x="11742" y="3008949"/>
+                  <a:ext cx="0" cy="583637"/>
+                </a:xfrm>
+                <a:prstGeom prst="line">
+                  <a:avLst/>
+                </a:prstGeom>
+                <a:ln w="57150">
+                  <a:solidFill>
+                    <a:schemeClr val="tx1"/>
+                  </a:solidFill>
+                </a:ln>
+              </p:spPr>
+              <p:style>
+                <a:lnRef idx="1">
+                  <a:schemeClr val="accent1"/>
+                </a:lnRef>
+                <a:fillRef idx="0">
+                  <a:schemeClr val="accent1"/>
+                </a:fillRef>
+                <a:effectRef idx="0">
+                  <a:schemeClr val="accent1"/>
+                </a:effectRef>
+                <a:fontRef idx="minor">
+                  <a:schemeClr val="tx1"/>
+                </a:fontRef>
+              </p:style>
+            </p:cxnSp>
+          </p:grpSp>
+          <p:grpSp>
+            <p:nvGrpSpPr>
+              <p:cNvPr id="14" name="Group 13">
+                <a:extLst>
+                  <a:ext uri="{FF2B5EF4-FFF2-40B4-BE49-F238E27FC236}">
+                    <a16:creationId xmlns:a16="http://schemas.microsoft.com/office/drawing/2014/main" id="{1A5C3246-3B2E-FFE2-736F-B499E303CE95}"/>
+                  </a:ext>
+                </a:extLst>
+              </p:cNvPr>
+              <p:cNvGrpSpPr/>
+              <p:nvPr/>
+            </p:nvGrpSpPr>
+            <p:grpSpPr>
+              <a:xfrm>
+                <a:off x="7726828" y="2882243"/>
+                <a:ext cx="1209783" cy="728222"/>
+                <a:chOff x="4257764" y="2203299"/>
+                <a:chExt cx="1209783" cy="870864"/>
+              </a:xfrm>
+            </p:grpSpPr>
+            <p:sp>
+              <p:nvSpPr>
+                <p:cNvPr id="15" name="Rectangle: Rounded Corners 14">
+                  <a:extLst>
+                    <a:ext uri="{FF2B5EF4-FFF2-40B4-BE49-F238E27FC236}">
+                      <a16:creationId xmlns:a16="http://schemas.microsoft.com/office/drawing/2014/main" id="{7236A458-1BA4-6154-130B-0E7F42E97247}"/>
+                    </a:ext>
+                  </a:extLst>
+                </p:cNvPr>
+                <p:cNvSpPr/>
+                <p:nvPr/>
+              </p:nvSpPr>
+              <p:spPr>
+                <a:xfrm>
+                  <a:off x="4257764" y="2203299"/>
+                  <a:ext cx="1209783" cy="377072"/>
+                </a:xfrm>
+                <a:prstGeom prst="roundRect">
+                  <a:avLst/>
+                </a:prstGeom>
+                <a:solidFill>
+                  <a:schemeClr val="bg1"/>
+                </a:solidFill>
+                <a:ln w="19050">
+                  <a:solidFill>
+                    <a:schemeClr val="tx1"/>
+                  </a:solidFill>
+                </a:ln>
+              </p:spPr>
+              <p:style>
+                <a:lnRef idx="2">
+                  <a:schemeClr val="accent1">
+                    <a:shade val="50000"/>
+                  </a:schemeClr>
+                </a:lnRef>
+                <a:fillRef idx="1">
+                  <a:schemeClr val="accent1"/>
+                </a:fillRef>
+                <a:effectRef idx="0">
+                  <a:schemeClr val="accent1"/>
+                </a:effectRef>
+                <a:fontRef idx="minor">
+                  <a:schemeClr val="lt1"/>
+                </a:fontRef>
+              </p:style>
+              <p:txBody>
+                <a:bodyPr rtlCol="0" anchor="ctr"/>
+                <a:lstStyle/>
+                <a:p>
+                  <a:pPr algn="ctr"/>
+                  <a:r>
+                    <a:rPr lang="en-US" dirty="0">
+                      <a:solidFill>
+                        <a:sysClr val="windowText" lastClr="000000"/>
+                      </a:solidFill>
+                    </a:rPr>
+                    <a:t>100 RKM</a:t>
+                  </a:r>
+                </a:p>
+              </p:txBody>
+            </p:sp>
+            <p:cxnSp>
+              <p:nvCxnSpPr>
+                <p:cNvPr id="16" name="Straight Connector 15">
+                  <a:extLst>
+                    <a:ext uri="{FF2B5EF4-FFF2-40B4-BE49-F238E27FC236}">
+                      <a16:creationId xmlns:a16="http://schemas.microsoft.com/office/drawing/2014/main" id="{995EE4AF-A5A2-A617-EBD9-1D29BE313204}"/>
+                    </a:ext>
+                  </a:extLst>
+                </p:cNvPr>
+                <p:cNvCxnSpPr>
+                  <a:cxnSpLocks/>
+                </p:cNvCxnSpPr>
+                <p:nvPr/>
+              </p:nvCxnSpPr>
+              <p:spPr>
+                <a:xfrm>
+                  <a:off x="4854827" y="2580371"/>
+                  <a:ext cx="0" cy="493792"/>
+                </a:xfrm>
+                <a:prstGeom prst="line">
+                  <a:avLst/>
+                </a:prstGeom>
+                <a:ln w="57150">
+                  <a:solidFill>
+                    <a:schemeClr val="tx1"/>
+                  </a:solidFill>
+                </a:ln>
+              </p:spPr>
+              <p:style>
+                <a:lnRef idx="1">
+                  <a:schemeClr val="accent1"/>
+                </a:lnRef>
+                <a:fillRef idx="0">
+                  <a:schemeClr val="accent1"/>
+                </a:fillRef>
+                <a:effectRef idx="0">
+                  <a:schemeClr val="accent1"/>
+                </a:effectRef>
+                <a:fontRef idx="minor">
+                  <a:schemeClr val="tx1"/>
+                </a:fontRef>
+              </p:style>
+            </p:cxnSp>
+          </p:grpSp>
+          <p:grpSp>
+            <p:nvGrpSpPr>
+              <p:cNvPr id="20" name="Group 19">
+                <a:extLst>
+                  <a:ext uri="{FF2B5EF4-FFF2-40B4-BE49-F238E27FC236}">
+                    <a16:creationId xmlns:a16="http://schemas.microsoft.com/office/drawing/2014/main" id="{AF81A71E-4554-D9B5-CCEA-82D7032745E8}"/>
+                  </a:ext>
+                </a:extLst>
+              </p:cNvPr>
+              <p:cNvGrpSpPr/>
+              <p:nvPr/>
+            </p:nvGrpSpPr>
+            <p:grpSpPr>
+              <a:xfrm>
+                <a:off x="9294829" y="4504002"/>
+                <a:ext cx="1234920" cy="742360"/>
+                <a:chOff x="2249856" y="4639569"/>
+                <a:chExt cx="1234920" cy="887771"/>
+              </a:xfrm>
+            </p:grpSpPr>
+            <p:sp>
+              <p:nvSpPr>
+                <p:cNvPr id="21" name="Rectangle: Rounded Corners 20">
+                  <a:extLst>
+                    <a:ext uri="{FF2B5EF4-FFF2-40B4-BE49-F238E27FC236}">
+                      <a16:creationId xmlns:a16="http://schemas.microsoft.com/office/drawing/2014/main" id="{6DBB03C4-D2D1-B537-4D2C-A2EC066AF12E}"/>
+                    </a:ext>
+                  </a:extLst>
+                </p:cNvPr>
+                <p:cNvSpPr/>
+                <p:nvPr/>
+              </p:nvSpPr>
+              <p:spPr>
+                <a:xfrm>
+                  <a:off x="2249856" y="5150268"/>
+                  <a:ext cx="1234920" cy="377072"/>
+                </a:xfrm>
+                <a:prstGeom prst="roundRect">
+                  <a:avLst/>
+                </a:prstGeom>
+                <a:solidFill>
+                  <a:schemeClr val="bg1"/>
+                </a:solidFill>
+                <a:ln w="19050">
+                  <a:solidFill>
+                    <a:schemeClr val="tx1"/>
+                  </a:solidFill>
+                </a:ln>
+              </p:spPr>
+              <p:style>
+                <a:lnRef idx="2">
+                  <a:schemeClr val="accent1">
+                    <a:shade val="50000"/>
+                  </a:schemeClr>
+                </a:lnRef>
+                <a:fillRef idx="1">
+                  <a:schemeClr val="accent1"/>
+                </a:fillRef>
+                <a:effectRef idx="0">
+                  <a:schemeClr val="accent1"/>
+                </a:effectRef>
+                <a:fontRef idx="minor">
+                  <a:schemeClr val="lt1"/>
+                </a:fontRef>
+              </p:style>
+              <p:txBody>
+                <a:bodyPr rtlCol="0" anchor="ctr"/>
+                <a:lstStyle/>
+                <a:p>
+                  <a:pPr algn="ctr"/>
+                  <a:r>
+                    <a:rPr lang="en-US" dirty="0">
+                      <a:solidFill>
+                        <a:sysClr val="windowText" lastClr="000000"/>
+                      </a:solidFill>
+                    </a:rPr>
+                    <a:t>120 RKM</a:t>
+                  </a:r>
+                </a:p>
+              </p:txBody>
+            </p:sp>
+            <p:cxnSp>
+              <p:nvCxnSpPr>
+                <p:cNvPr id="22" name="Straight Connector 21">
+                  <a:extLst>
+                    <a:ext uri="{FF2B5EF4-FFF2-40B4-BE49-F238E27FC236}">
+                      <a16:creationId xmlns:a16="http://schemas.microsoft.com/office/drawing/2014/main" id="{ABB3590D-AC13-20B3-D363-8C2A5AB28A6F}"/>
+                    </a:ext>
+                  </a:extLst>
+                </p:cNvPr>
+                <p:cNvCxnSpPr>
+                  <a:cxnSpLocks/>
+                </p:cNvCxnSpPr>
+                <p:nvPr/>
+              </p:nvCxnSpPr>
+              <p:spPr>
+                <a:xfrm>
+                  <a:off x="3234962" y="4639569"/>
+                  <a:ext cx="1" cy="510699"/>
+                </a:xfrm>
+                <a:prstGeom prst="line">
+                  <a:avLst/>
+                </a:prstGeom>
+                <a:ln w="57150">
+                  <a:solidFill>
+                    <a:schemeClr val="tx1"/>
+                  </a:solidFill>
+                </a:ln>
+              </p:spPr>
+              <p:style>
+                <a:lnRef idx="1">
+                  <a:schemeClr val="accent1"/>
+                </a:lnRef>
+                <a:fillRef idx="0">
+                  <a:schemeClr val="accent1"/>
+                </a:fillRef>
+                <a:effectRef idx="0">
+                  <a:schemeClr val="accent1"/>
+                </a:effectRef>
+                <a:fontRef idx="minor">
+                  <a:schemeClr val="tx1"/>
+                </a:fontRef>
+              </p:style>
+            </p:cxnSp>
+          </p:grpSp>
+        </p:grpSp>
+        <p:sp>
+          <p:nvSpPr>
+            <p:cNvPr id="27" name="Rectangle: Rounded Corners 26">
+              <a:extLst>
+                <a:ext uri="{FF2B5EF4-FFF2-40B4-BE49-F238E27FC236}">
+                  <a16:creationId xmlns:a16="http://schemas.microsoft.com/office/drawing/2014/main" id="{B6912135-F845-320B-3411-2B4A2AEBCCBF}"/>
+                </a:ext>
+              </a:extLst>
+            </p:cNvPr>
+            <p:cNvSpPr/>
+            <p:nvPr/>
+          </p:nvSpPr>
+          <p:spPr>
+            <a:xfrm>
+              <a:off x="2796613" y="1514301"/>
+              <a:ext cx="1492583" cy="315310"/>
+            </a:xfrm>
+            <a:prstGeom prst="roundRect">
+              <a:avLst/>
+            </a:prstGeom>
+            <a:solidFill>
+              <a:schemeClr val="bg1"/>
+            </a:solidFill>
+            <a:ln w="19050">
+              <a:solidFill>
+                <a:schemeClr val="tx1"/>
+              </a:solidFill>
+            </a:ln>
+          </p:spPr>
+          <p:style>
+            <a:lnRef idx="2">
+              <a:schemeClr val="accent1">
+                <a:shade val="50000"/>
+              </a:schemeClr>
+            </a:lnRef>
+            <a:fillRef idx="1">
+              <a:schemeClr val="accent1"/>
+            </a:fillRef>
+            <a:effectRef idx="0">
+              <a:schemeClr val="accent1"/>
+            </a:effectRef>
+            <a:fontRef idx="minor">
+              <a:schemeClr val="lt1"/>
+            </a:fontRef>
+          </p:style>
+          <p:txBody>
+            <a:bodyPr rtlCol="0" anchor="ctr"/>
+            <a:lstStyle/>
+            <a:p>
+              <a:pPr algn="ctr"/>
+              <a:r>
+                <a:rPr lang="en-US" dirty="0">
+                  <a:solidFill>
+                    <a:sysClr val="windowText" lastClr="000000"/>
+                  </a:solidFill>
+                </a:rPr>
+                <a:t>Suisun Marsh</a:t>
+              </a:r>
+            </a:p>
+          </p:txBody>
+        </p:sp>
+        <p:sp>
+          <p:nvSpPr>
+            <p:cNvPr id="28" name="Rectangle: Rounded Corners 27">
+              <a:extLst>
+                <a:ext uri="{FF2B5EF4-FFF2-40B4-BE49-F238E27FC236}">
+                  <a16:creationId xmlns:a16="http://schemas.microsoft.com/office/drawing/2014/main" id="{619E638C-9AAE-82C6-51B5-F9F357C9E29F}"/>
+                </a:ext>
+              </a:extLst>
+            </p:cNvPr>
+            <p:cNvSpPr/>
+            <p:nvPr/>
+          </p:nvSpPr>
+          <p:spPr>
+            <a:xfrm>
+              <a:off x="2070720" y="3115314"/>
+              <a:ext cx="1302482" cy="315310"/>
+            </a:xfrm>
+            <a:prstGeom prst="roundRect">
+              <a:avLst/>
+            </a:prstGeom>
+            <a:solidFill>
+              <a:schemeClr val="bg1"/>
+            </a:solidFill>
+            <a:ln w="19050">
+              <a:solidFill>
+                <a:schemeClr val="tx1"/>
+              </a:solidFill>
+            </a:ln>
+          </p:spPr>
+          <p:style>
+            <a:lnRef idx="2">
+              <a:schemeClr val="accent1">
+                <a:shade val="50000"/>
+              </a:schemeClr>
+            </a:lnRef>
+            <a:fillRef idx="1">
+              <a:schemeClr val="accent1"/>
+            </a:fillRef>
+            <a:effectRef idx="0">
+              <a:schemeClr val="accent1"/>
+            </a:effectRef>
+            <a:fontRef idx="minor">
+              <a:schemeClr val="lt1"/>
+            </a:fontRef>
+          </p:style>
+          <p:txBody>
+            <a:bodyPr rtlCol="0" anchor="ctr"/>
+            <a:lstStyle/>
+            <a:p>
+              <a:pPr algn="ctr"/>
+              <a:r>
+                <a:rPr lang="en-US" dirty="0">
+                  <a:solidFill>
+                    <a:sysClr val="windowText" lastClr="000000"/>
+                  </a:solidFill>
+                </a:rPr>
+                <a:t>Suisun Bay</a:t>
+              </a:r>
+            </a:p>
+          </p:txBody>
+        </p:sp>
+        <p:sp>
+          <p:nvSpPr>
+            <p:cNvPr id="29" name="Rectangle: Rounded Corners 28">
+              <a:extLst>
+                <a:ext uri="{FF2B5EF4-FFF2-40B4-BE49-F238E27FC236}">
+                  <a16:creationId xmlns:a16="http://schemas.microsoft.com/office/drawing/2014/main" id="{530562FA-4CB0-E994-3B78-C83F8C08EB27}"/>
+                </a:ext>
+              </a:extLst>
+            </p:cNvPr>
+            <p:cNvSpPr/>
+            <p:nvPr/>
+          </p:nvSpPr>
+          <p:spPr>
+            <a:xfrm>
+              <a:off x="5239727" y="3272969"/>
+              <a:ext cx="1302481" cy="315310"/>
+            </a:xfrm>
+            <a:prstGeom prst="roundRect">
+              <a:avLst/>
+            </a:prstGeom>
+            <a:solidFill>
+              <a:schemeClr val="bg1"/>
+            </a:solidFill>
+            <a:ln w="19050">
+              <a:solidFill>
+                <a:schemeClr val="tx1"/>
+              </a:solidFill>
+            </a:ln>
+          </p:spPr>
+          <p:style>
+            <a:lnRef idx="2">
+              <a:schemeClr val="accent1">
+                <a:shade val="50000"/>
+              </a:schemeClr>
+            </a:lnRef>
+            <a:fillRef idx="1">
+              <a:schemeClr val="accent1"/>
+            </a:fillRef>
+            <a:effectRef idx="0">
+              <a:schemeClr val="accent1"/>
+            </a:effectRef>
+            <a:fontRef idx="minor">
+              <a:schemeClr val="lt1"/>
+            </a:fontRef>
+          </p:style>
+          <p:txBody>
+            <a:bodyPr rtlCol="0" anchor="ctr"/>
+            <a:lstStyle/>
+            <a:p>
+              <a:pPr algn="ctr"/>
+              <a:r>
+                <a:rPr lang="en-US" dirty="0">
+                  <a:solidFill>
+                    <a:sysClr val="windowText" lastClr="000000"/>
+                  </a:solidFill>
+                </a:rPr>
+                <a:t>Confluence</a:t>
+              </a:r>
+            </a:p>
+          </p:txBody>
+        </p:sp>
+        <p:sp>
+          <p:nvSpPr>
+            <p:cNvPr id="30" name="Rectangle: Rounded Corners 29">
+              <a:extLst>
+                <a:ext uri="{FF2B5EF4-FFF2-40B4-BE49-F238E27FC236}">
+                  <a16:creationId xmlns:a16="http://schemas.microsoft.com/office/drawing/2014/main" id="{5D18B63A-9CBA-1D12-03EA-400F5992B603}"/>
+                </a:ext>
+              </a:extLst>
+            </p:cNvPr>
+            <p:cNvSpPr/>
+            <p:nvPr/>
+          </p:nvSpPr>
+          <p:spPr>
+            <a:xfrm>
+              <a:off x="7959355" y="4381697"/>
+              <a:ext cx="977256" cy="576801"/>
+            </a:xfrm>
+            <a:prstGeom prst="roundRect">
+              <a:avLst/>
+            </a:prstGeom>
+            <a:solidFill>
+              <a:schemeClr val="bg1"/>
+            </a:solidFill>
+            <a:ln w="19050">
+              <a:solidFill>
+                <a:schemeClr val="tx1"/>
+              </a:solidFill>
+            </a:ln>
+          </p:spPr>
+          <p:style>
+            <a:lnRef idx="2">
+              <a:schemeClr val="accent1">
+                <a:shade val="50000"/>
+              </a:schemeClr>
+            </a:lnRef>
+            <a:fillRef idx="1">
+              <a:schemeClr val="accent1"/>
+            </a:fillRef>
+            <a:effectRef idx="0">
+              <a:schemeClr val="accent1"/>
+            </a:effectRef>
+            <a:fontRef idx="minor">
+              <a:schemeClr val="lt1"/>
+            </a:fontRef>
+          </p:style>
+          <p:txBody>
+            <a:bodyPr rtlCol="0" anchor="ctr"/>
+            <a:lstStyle/>
+            <a:p>
+              <a:pPr algn="ctr"/>
+              <a:r>
+                <a:rPr lang="en-US" dirty="0">
+                  <a:solidFill>
+                    <a:sysClr val="windowText" lastClr="000000"/>
+                  </a:solidFill>
+                </a:rPr>
+                <a:t>South Central</a:t>
+              </a:r>
+            </a:p>
+          </p:txBody>
+        </p:sp>
+        <p:sp>
+          <p:nvSpPr>
+            <p:cNvPr id="6" name="Rectangle: Rounded Corners 5">
+              <a:extLst>
+                <a:ext uri="{FF2B5EF4-FFF2-40B4-BE49-F238E27FC236}">
+                  <a16:creationId xmlns:a16="http://schemas.microsoft.com/office/drawing/2014/main" id="{991FB8A4-9F26-5F9D-AA78-7096E28E1209}"/>
+                </a:ext>
+              </a:extLst>
+            </p:cNvPr>
+            <p:cNvSpPr/>
+            <p:nvPr/>
+          </p:nvSpPr>
+          <p:spPr>
+            <a:xfrm>
+              <a:off x="5788044" y="4233974"/>
+              <a:ext cx="1040100" cy="315310"/>
+            </a:xfrm>
+            <a:prstGeom prst="roundRect">
+              <a:avLst/>
+            </a:prstGeom>
+            <a:solidFill>
+              <a:schemeClr val="bg1"/>
+            </a:solidFill>
+            <a:ln w="19050">
+              <a:solidFill>
+                <a:schemeClr val="tx1"/>
+              </a:solidFill>
+            </a:ln>
+          </p:spPr>
+          <p:style>
+            <a:lnRef idx="2">
+              <a:schemeClr val="accent1">
+                <a:shade val="50000"/>
+              </a:schemeClr>
+            </a:lnRef>
+            <a:fillRef idx="1">
+              <a:schemeClr val="accent1"/>
+            </a:fillRef>
+            <a:effectRef idx="0">
+              <a:schemeClr val="accent1"/>
+            </a:effectRef>
+            <a:fontRef idx="minor">
+              <a:schemeClr val="lt1"/>
+            </a:fontRef>
+          </p:style>
+          <p:txBody>
+            <a:bodyPr rtlCol="0" anchor="ctr"/>
+            <a:lstStyle/>
+            <a:p>
+              <a:pPr algn="ctr"/>
+              <a:r>
+                <a:rPr lang="en-US" dirty="0">
+                  <a:solidFill>
+                    <a:sysClr val="windowText" lastClr="000000"/>
+                  </a:solidFill>
+                </a:rPr>
+                <a:t>80 RKM</a:t>
+              </a:r>
+            </a:p>
+          </p:txBody>
+        </p:sp>
+        <p:cxnSp>
+          <p:nvCxnSpPr>
+            <p:cNvPr id="7" name="Straight Connector 6">
+              <a:extLst>
+                <a:ext uri="{FF2B5EF4-FFF2-40B4-BE49-F238E27FC236}">
+                  <a16:creationId xmlns:a16="http://schemas.microsoft.com/office/drawing/2014/main" id="{5B994C17-3D00-EBA3-0AFA-025BFC945E66}"/>
+                </a:ext>
+              </a:extLst>
+            </p:cNvPr>
+            <p:cNvCxnSpPr>
+              <a:cxnSpLocks/>
+            </p:cNvCxnSpPr>
+            <p:nvPr/>
+          </p:nvCxnSpPr>
+          <p:spPr>
+            <a:xfrm>
+              <a:off x="6317521" y="3745933"/>
+              <a:ext cx="0" cy="488041"/>
+            </a:xfrm>
+            <a:prstGeom prst="line">
+              <a:avLst/>
+            </a:prstGeom>
+            <a:ln w="57150">
+              <a:solidFill>
+                <a:schemeClr val="tx1"/>
+              </a:solidFill>
+            </a:ln>
+          </p:spPr>
+          <p:style>
+            <a:lnRef idx="1">
+              <a:schemeClr val="accent1"/>
+            </a:lnRef>
+            <a:fillRef idx="0">
+              <a:schemeClr val="accent1"/>
+            </a:fillRef>
+            <a:effectRef idx="0">
+              <a:schemeClr val="accent1"/>
+            </a:effectRef>
+            <a:fontRef idx="minor">
+              <a:schemeClr val="tx1"/>
+            </a:fontRef>
+          </p:style>
+        </p:cxnSp>
+        <p:sp>
+          <p:nvSpPr>
+            <p:cNvPr id="8" name="Rectangle: Rounded Corners 7">
+              <a:extLst>
+                <a:ext uri="{FF2B5EF4-FFF2-40B4-BE49-F238E27FC236}">
+                  <a16:creationId xmlns:a16="http://schemas.microsoft.com/office/drawing/2014/main" id="{EAC317E7-91A4-3DE1-1C18-D5A4AAC97B36}"/>
+                </a:ext>
+              </a:extLst>
+            </p:cNvPr>
+            <p:cNvSpPr/>
+            <p:nvPr/>
+          </p:nvSpPr>
+          <p:spPr>
+            <a:xfrm>
+              <a:off x="3092750" y="3786160"/>
+              <a:ext cx="1040100" cy="315310"/>
+            </a:xfrm>
+            <a:prstGeom prst="roundRect">
+              <a:avLst/>
+            </a:prstGeom>
+            <a:solidFill>
+              <a:schemeClr val="bg1"/>
+            </a:solidFill>
+            <a:ln w="19050">
+              <a:solidFill>
+                <a:schemeClr val="tx1"/>
+              </a:solidFill>
+            </a:ln>
+          </p:spPr>
+          <p:style>
+            <a:lnRef idx="2">
+              <a:schemeClr val="accent1">
+                <a:shade val="50000"/>
+              </a:schemeClr>
+            </a:lnRef>
+            <a:fillRef idx="1">
+              <a:schemeClr val="accent1"/>
+            </a:fillRef>
+            <a:effectRef idx="0">
+              <a:schemeClr val="accent1"/>
+            </a:effectRef>
+            <a:fontRef idx="minor">
+              <a:schemeClr val="lt1"/>
+            </a:fontRef>
+          </p:style>
+          <p:txBody>
+            <a:bodyPr rtlCol="0" anchor="ctr"/>
+            <a:lstStyle/>
+            <a:p>
+              <a:pPr algn="ctr"/>
+              <a:r>
+                <a:rPr lang="en-US" dirty="0">
+                  <a:solidFill>
+                    <a:sysClr val="windowText" lastClr="000000"/>
+                  </a:solidFill>
+                </a:rPr>
+                <a:t>60 RKM</a:t>
+              </a:r>
+            </a:p>
+          </p:txBody>
+        </p:sp>
+        <p:cxnSp>
+          <p:nvCxnSpPr>
+            <p:cNvPr id="9" name="Straight Connector 8">
+              <a:extLst>
+                <a:ext uri="{FF2B5EF4-FFF2-40B4-BE49-F238E27FC236}">
+                  <a16:creationId xmlns:a16="http://schemas.microsoft.com/office/drawing/2014/main" id="{6C22D49B-F256-0E98-B9D8-A789AF3CECE1}"/>
+                </a:ext>
+              </a:extLst>
+            </p:cNvPr>
+            <p:cNvCxnSpPr>
+              <a:cxnSpLocks/>
+            </p:cNvCxnSpPr>
+            <p:nvPr/>
+          </p:nvCxnSpPr>
+          <p:spPr>
+            <a:xfrm>
+              <a:off x="3622227" y="3298119"/>
+              <a:ext cx="0" cy="488041"/>
+            </a:xfrm>
+            <a:prstGeom prst="line">
+              <a:avLst/>
+            </a:prstGeom>
+            <a:ln w="57150">
+              <a:solidFill>
+                <a:schemeClr val="tx1"/>
+              </a:solidFill>
+            </a:ln>
+          </p:spPr>
+          <p:style>
+            <a:lnRef idx="1">
+              <a:schemeClr val="accent1"/>
+            </a:lnRef>
+            <a:fillRef idx="0">
+              <a:schemeClr val="accent1"/>
+            </a:fillRef>
+            <a:effectRef idx="0">
+              <a:schemeClr val="accent1"/>
+            </a:effectRef>
+            <a:fontRef idx="minor">
+              <a:schemeClr val="tx1"/>
+            </a:fontRef>
+          </p:style>
+        </p:cxnSp>
+      </p:grpSp>
+    </p:spTree>
+    <p:extLst>
+      <p:ext uri="{BB962C8B-B14F-4D97-AF65-F5344CB8AC3E}">
+        <p14:creationId xmlns:p14="http://schemas.microsoft.com/office/powerpoint/2010/main" val="1877813908"/>
+      </p:ext>
+    </p:extLst>
+  </p:cSld>
+  <p:clrMapOvr>
+    <a:masterClrMapping/>
+  </p:clrMapOvr>
+</p:sld>
+</file>
+
+<file path=ppt/slides/slide13.xml><?xml version="1.0" encoding="utf-8"?>
+<p:sld xmlns:a="http://schemas.openxmlformats.org/drawingml/2006/main" xmlns:r="http://schemas.openxmlformats.org/officeDocument/2006/relationships" xmlns:p="http://schemas.openxmlformats.org/presentationml/2006/main">
+  <p:cSld>
+    <p:spTree>
+      <p:nvGrpSpPr>
+        <p:cNvPr id="1" name=""/>
+        <p:cNvGrpSpPr/>
+        <p:nvPr/>
+      </p:nvGrpSpPr>
+      <p:grpSpPr>
+        <a:xfrm>
+          <a:off x="0" y="0"/>
+          <a:ext cx="0" cy="0"/>
+          <a:chOff x="0" y="0"/>
+          <a:chExt cx="0" cy="0"/>
+        </a:xfrm>
+      </p:grpSpPr>
+      <p:pic>
+        <p:nvPicPr>
+          <p:cNvPr id="3" name="Picture 2">
+            <a:extLst>
+              <a:ext uri="{FF2B5EF4-FFF2-40B4-BE49-F238E27FC236}">
+                <a16:creationId xmlns:a16="http://schemas.microsoft.com/office/drawing/2014/main" id="{6EF273FB-4982-CB26-0477-F93C9238C838}"/>
+              </a:ext>
+            </a:extLst>
+          </p:cNvPr>
+          <p:cNvPicPr>
+            <a:picLocks noChangeAspect="1"/>
+          </p:cNvPicPr>
+          <p:nvPr/>
+        </p:nvPicPr>
+        <p:blipFill>
+          <a:blip r:embed="rId2">
+            <a:extLst>
+              <a:ext uri="{28A0092B-C50C-407E-A947-70E740481C1C}">
+                <a14:useLocalDpi xmlns:a14="http://schemas.microsoft.com/office/drawing/2010/main" val="0"/>
+              </a:ext>
+            </a:extLst>
+          </a:blip>
+          <a:srcRect/>
+          <a:stretch/>
+        </p:blipFill>
+        <p:spPr>
+          <a:xfrm>
+            <a:off x="1809750" y="0"/>
+            <a:ext cx="8572500" cy="6857999"/>
+          </a:xfrm>
+          <a:prstGeom prst="rect">
+            <a:avLst/>
+          </a:prstGeom>
+        </p:spPr>
+      </p:pic>
+    </p:spTree>
+    <p:extLst>
+      <p:ext uri="{BB962C8B-B14F-4D97-AF65-F5344CB8AC3E}">
+        <p14:creationId xmlns:p14="http://schemas.microsoft.com/office/powerpoint/2010/main" val="1673608104"/>
+      </p:ext>
+    </p:extLst>
+  </p:cSld>
+  <p:clrMapOvr>
+    <a:masterClrMapping/>
+  </p:clrMapOvr>
+</p:sld>
+</file>
+
 <file path=ppt/slides/slide2.xml><?xml version="1.0" encoding="utf-8"?>
 <p:sld xmlns:a="http://schemas.openxmlformats.org/drawingml/2006/main" xmlns:r="http://schemas.openxmlformats.org/officeDocument/2006/relationships" xmlns:p="http://schemas.openxmlformats.org/presentationml/2006/main">
   <p:cSld>
@@ -4026,77 +5267,113 @@
           </a:p>
         </p:txBody>
       </p:sp>
-      <p:pic>
-        <p:nvPicPr>
-          <p:cNvPr id="8" name="Picture 7">
+      <p:grpSp>
+        <p:nvGrpSpPr>
+          <p:cNvPr id="2" name="Group 1">
             <a:extLst>
               <a:ext uri="{FF2B5EF4-FFF2-40B4-BE49-F238E27FC236}">
-                <a16:creationId xmlns:a16="http://schemas.microsoft.com/office/drawing/2014/main" id="{D9B76EE9-E49A-92A2-B2AB-6E5D14DBD249}"/>
+                <a16:creationId xmlns:a16="http://schemas.microsoft.com/office/drawing/2014/main" id="{BAD0BDDD-A6D5-9D34-89FD-A02F077C8B3C}"/>
               </a:ext>
             </a:extLst>
           </p:cNvPr>
-          <p:cNvPicPr>
-            <a:picLocks noChangeAspect="1"/>
-          </p:cNvPicPr>
+          <p:cNvGrpSpPr/>
           <p:nvPr/>
-        </p:nvPicPr>
-        <p:blipFill>
-          <a:blip r:embed="rId3">
-            <a:extLst>
-              <a:ext uri="{28A0092B-C50C-407E-A947-70E740481C1C}">
-                <a14:useLocalDpi xmlns:a14="http://schemas.microsoft.com/office/drawing/2010/main" val="0"/>
-              </a:ext>
-            </a:extLst>
-          </a:blip>
-          <a:srcRect/>
-          <a:stretch/>
-        </p:blipFill>
-        <p:spPr>
+        </p:nvGrpSpPr>
+        <p:grpSpPr>
           <a:xfrm>
             <a:off x="2863794" y="767982"/>
             <a:ext cx="5846323" cy="5846323"/>
+            <a:chOff x="2863794" y="767982"/>
+            <a:chExt cx="5846323" cy="5846323"/>
           </a:xfrm>
-          <a:prstGeom prst="rect">
-            <a:avLst/>
-          </a:prstGeom>
-          <a:ln>
-            <a:solidFill>
-              <a:schemeClr val="tx1"/>
-            </a:solidFill>
-          </a:ln>
-        </p:spPr>
-      </p:pic>
-      <p:sp>
-        <p:nvSpPr>
-          <p:cNvPr id="22" name="Rectangle 21">
-            <a:extLst>
-              <a:ext uri="{FF2B5EF4-FFF2-40B4-BE49-F238E27FC236}">
-                <a16:creationId xmlns:a16="http://schemas.microsoft.com/office/drawing/2014/main" id="{5342D929-30E8-F968-02F4-9BAB59E01340}"/>
-              </a:ext>
-            </a:extLst>
-          </p:cNvPr>
-          <p:cNvSpPr/>
-          <p:nvPr/>
-        </p:nvSpPr>
-        <p:spPr>
-          <a:xfrm>
-            <a:off x="5848252" y="2925736"/>
-            <a:ext cx="389850" cy="584775"/>
-          </a:xfrm>
-          <a:prstGeom prst="rect">
-            <a:avLst/>
-          </a:prstGeom>
-          <a:noFill/>
-        </p:spPr>
-        <p:txBody>
-          <a:bodyPr wrap="none" lIns="91440" tIns="45720" rIns="91440" bIns="45720">
-            <a:spAutoFit/>
-          </a:bodyPr>
-          <a:lstStyle/>
-          <a:p>
-            <a:pPr algn="ctr"/>
-            <a:r>
-              <a:rPr lang="en-US" sz="3200" b="0" i="0" u="none" strike="noStrike" cap="none" spc="0" dirty="0">
+        </p:grpSpPr>
+        <p:pic>
+          <p:nvPicPr>
+            <p:cNvPr id="8" name="Picture 7">
+              <a:extLst>
+                <a:ext uri="{FF2B5EF4-FFF2-40B4-BE49-F238E27FC236}">
+                  <a16:creationId xmlns:a16="http://schemas.microsoft.com/office/drawing/2014/main" id="{D9B76EE9-E49A-92A2-B2AB-6E5D14DBD249}"/>
+                </a:ext>
+              </a:extLst>
+            </p:cNvPr>
+            <p:cNvPicPr>
+              <a:picLocks noChangeAspect="1"/>
+            </p:cNvPicPr>
+            <p:nvPr/>
+          </p:nvPicPr>
+          <p:blipFill>
+            <a:blip r:embed="rId3">
+              <a:extLst>
+                <a:ext uri="{28A0092B-C50C-407E-A947-70E740481C1C}">
+                  <a14:useLocalDpi xmlns:a14="http://schemas.microsoft.com/office/drawing/2010/main" val="0"/>
+                </a:ext>
+              </a:extLst>
+            </a:blip>
+            <a:srcRect/>
+            <a:stretch/>
+          </p:blipFill>
+          <p:spPr>
+            <a:xfrm>
+              <a:off x="2863794" y="767982"/>
+              <a:ext cx="5846323" cy="5846323"/>
+            </a:xfrm>
+            <a:prstGeom prst="rect">
+              <a:avLst/>
+            </a:prstGeom>
+            <a:ln>
+              <a:solidFill>
+                <a:schemeClr val="tx1"/>
+              </a:solidFill>
+            </a:ln>
+          </p:spPr>
+        </p:pic>
+        <p:sp>
+          <p:nvSpPr>
+            <p:cNvPr id="22" name="Rectangle 21">
+              <a:extLst>
+                <a:ext uri="{FF2B5EF4-FFF2-40B4-BE49-F238E27FC236}">
+                  <a16:creationId xmlns:a16="http://schemas.microsoft.com/office/drawing/2014/main" id="{5342D929-30E8-F968-02F4-9BAB59E01340}"/>
+                </a:ext>
+              </a:extLst>
+            </p:cNvPr>
+            <p:cNvSpPr/>
+            <p:nvPr/>
+          </p:nvSpPr>
+          <p:spPr>
+            <a:xfrm>
+              <a:off x="5848252" y="2925736"/>
+              <a:ext cx="389850" cy="584775"/>
+            </a:xfrm>
+            <a:prstGeom prst="rect">
+              <a:avLst/>
+            </a:prstGeom>
+            <a:noFill/>
+          </p:spPr>
+          <p:txBody>
+            <a:bodyPr wrap="none" lIns="91440" tIns="45720" rIns="91440" bIns="45720">
+              <a:spAutoFit/>
+            </a:bodyPr>
+            <a:lstStyle/>
+            <a:p>
+              <a:pPr algn="ctr"/>
+              <a:r>
+                <a:rPr lang="en-US" sz="3200" b="0" i="0" u="none" strike="noStrike" cap="none" spc="0" dirty="0">
+                  <a:ln w="0"/>
+                  <a:solidFill>
+                    <a:schemeClr val="tx1"/>
+                  </a:solidFill>
+                  <a:effectLst>
+                    <a:outerShdw blurRad="38100" dist="19050" dir="2700000" algn="tl" rotWithShape="0">
+                      <a:schemeClr val="dk1">
+                        <a:alpha val="40000"/>
+                      </a:schemeClr>
+                    </a:outerShdw>
+                  </a:effectLst>
+                  <a:latin typeface="Calibri" panose="020F0502020204030204" pitchFamily="34" charset="0"/>
+                </a:rPr>
+                <a:t>*</a:t>
+              </a:r>
+              <a:endParaRPr lang="en-US" sz="3200" b="0" cap="none" spc="0" dirty="0">
                 <a:ln w="0"/>
                 <a:solidFill>
                   <a:schemeClr val="tx1"/>
@@ -4108,57 +5385,57 @@
                     </a:schemeClr>
                   </a:outerShdw>
                 </a:effectLst>
-                <a:latin typeface="Calibri" panose="020F0502020204030204" pitchFamily="34" charset="0"/>
-              </a:rPr>
-              <a:t>*</a:t>
-            </a:r>
-            <a:endParaRPr lang="en-US" sz="3200" b="0" cap="none" spc="0" dirty="0">
-              <a:ln w="0"/>
-              <a:solidFill>
-                <a:schemeClr val="tx1"/>
-              </a:solidFill>
-              <a:effectLst>
-                <a:outerShdw blurRad="38100" dist="19050" dir="2700000" algn="tl" rotWithShape="0">
-                  <a:schemeClr val="dk1">
-                    <a:alpha val="40000"/>
-                  </a:schemeClr>
-                </a:outerShdw>
-              </a:effectLst>
-            </a:endParaRPr>
-          </a:p>
-        </p:txBody>
-      </p:sp>
-      <p:sp>
-        <p:nvSpPr>
-          <p:cNvPr id="23" name="Rectangle 22">
-            <a:extLst>
-              <a:ext uri="{FF2B5EF4-FFF2-40B4-BE49-F238E27FC236}">
-                <a16:creationId xmlns:a16="http://schemas.microsoft.com/office/drawing/2014/main" id="{2AB111DB-FC09-3248-E3C6-8515548A25B8}"/>
-              </a:ext>
-            </a:extLst>
-          </p:cNvPr>
-          <p:cNvSpPr/>
-          <p:nvPr/>
-        </p:nvSpPr>
-        <p:spPr>
-          <a:xfrm>
-            <a:off x="6815406" y="974618"/>
-            <a:ext cx="389850" cy="584775"/>
-          </a:xfrm>
-          <a:prstGeom prst="rect">
-            <a:avLst/>
-          </a:prstGeom>
-          <a:noFill/>
-        </p:spPr>
-        <p:txBody>
-          <a:bodyPr wrap="none" lIns="91440" tIns="45720" rIns="91440" bIns="45720">
-            <a:spAutoFit/>
-          </a:bodyPr>
-          <a:lstStyle/>
-          <a:p>
-            <a:pPr algn="ctr"/>
-            <a:r>
-              <a:rPr lang="en-US" sz="3200" b="0" i="0" u="none" strike="noStrike" cap="none" spc="0" dirty="0">
+              </a:endParaRPr>
+            </a:p>
+          </p:txBody>
+        </p:sp>
+        <p:sp>
+          <p:nvSpPr>
+            <p:cNvPr id="23" name="Rectangle 22">
+              <a:extLst>
+                <a:ext uri="{FF2B5EF4-FFF2-40B4-BE49-F238E27FC236}">
+                  <a16:creationId xmlns:a16="http://schemas.microsoft.com/office/drawing/2014/main" id="{2AB111DB-FC09-3248-E3C6-8515548A25B8}"/>
+                </a:ext>
+              </a:extLst>
+            </p:cNvPr>
+            <p:cNvSpPr/>
+            <p:nvPr/>
+          </p:nvSpPr>
+          <p:spPr>
+            <a:xfrm>
+              <a:off x="6815406" y="974618"/>
+              <a:ext cx="389850" cy="584775"/>
+            </a:xfrm>
+            <a:prstGeom prst="rect">
+              <a:avLst/>
+            </a:prstGeom>
+            <a:noFill/>
+          </p:spPr>
+          <p:txBody>
+            <a:bodyPr wrap="none" lIns="91440" tIns="45720" rIns="91440" bIns="45720">
+              <a:spAutoFit/>
+            </a:bodyPr>
+            <a:lstStyle/>
+            <a:p>
+              <a:pPr algn="ctr"/>
+              <a:r>
+                <a:rPr lang="en-US" sz="3200" b="0" i="0" u="none" strike="noStrike" cap="none" spc="0" dirty="0">
+                  <a:ln w="0"/>
+                  <a:solidFill>
+                    <a:schemeClr val="tx1"/>
+                  </a:solidFill>
+                  <a:effectLst>
+                    <a:outerShdw blurRad="38100" dist="19050" dir="2700000" algn="tl" rotWithShape="0">
+                      <a:schemeClr val="dk1">
+                        <a:alpha val="40000"/>
+                      </a:schemeClr>
+                    </a:outerShdw>
+                  </a:effectLst>
+                  <a:latin typeface="Calibri" panose="020F0502020204030204" pitchFamily="34" charset="0"/>
+                </a:rPr>
+                <a:t>*</a:t>
+              </a:r>
+              <a:endParaRPr lang="en-US" sz="3200" b="0" cap="none" spc="0" dirty="0">
                 <a:ln w="0"/>
                 <a:solidFill>
                   <a:schemeClr val="tx1"/>
@@ -4170,57 +5447,57 @@
                     </a:schemeClr>
                   </a:outerShdw>
                 </a:effectLst>
-                <a:latin typeface="Calibri" panose="020F0502020204030204" pitchFamily="34" charset="0"/>
-              </a:rPr>
-              <a:t>*</a:t>
-            </a:r>
-            <a:endParaRPr lang="en-US" sz="3200" b="0" cap="none" spc="0" dirty="0">
-              <a:ln w="0"/>
-              <a:solidFill>
-                <a:schemeClr val="tx1"/>
-              </a:solidFill>
-              <a:effectLst>
-                <a:outerShdw blurRad="38100" dist="19050" dir="2700000" algn="tl" rotWithShape="0">
-                  <a:schemeClr val="dk1">
-                    <a:alpha val="40000"/>
-                  </a:schemeClr>
-                </a:outerShdw>
-              </a:effectLst>
-            </a:endParaRPr>
-          </a:p>
-        </p:txBody>
-      </p:sp>
-      <p:sp>
-        <p:nvSpPr>
-          <p:cNvPr id="24" name="Rectangle 23">
-            <a:extLst>
-              <a:ext uri="{FF2B5EF4-FFF2-40B4-BE49-F238E27FC236}">
-                <a16:creationId xmlns:a16="http://schemas.microsoft.com/office/drawing/2014/main" id="{DB44AEED-A2FB-37BE-80D0-71782E8CE734}"/>
-              </a:ext>
-            </a:extLst>
-          </p:cNvPr>
-          <p:cNvSpPr/>
-          <p:nvPr/>
-        </p:nvSpPr>
-        <p:spPr>
-          <a:xfrm>
-            <a:off x="6781028" y="1980613"/>
-            <a:ext cx="389850" cy="584775"/>
-          </a:xfrm>
-          <a:prstGeom prst="rect">
-            <a:avLst/>
-          </a:prstGeom>
-          <a:noFill/>
-        </p:spPr>
-        <p:txBody>
-          <a:bodyPr wrap="none" lIns="91440" tIns="45720" rIns="91440" bIns="45720">
-            <a:spAutoFit/>
-          </a:bodyPr>
-          <a:lstStyle/>
-          <a:p>
-            <a:pPr algn="ctr"/>
-            <a:r>
-              <a:rPr lang="en-US" sz="3200" b="0" i="0" u="none" strike="noStrike" cap="none" spc="0" dirty="0">
+              </a:endParaRPr>
+            </a:p>
+          </p:txBody>
+        </p:sp>
+        <p:sp>
+          <p:nvSpPr>
+            <p:cNvPr id="24" name="Rectangle 23">
+              <a:extLst>
+                <a:ext uri="{FF2B5EF4-FFF2-40B4-BE49-F238E27FC236}">
+                  <a16:creationId xmlns:a16="http://schemas.microsoft.com/office/drawing/2014/main" id="{DB44AEED-A2FB-37BE-80D0-71782E8CE734}"/>
+                </a:ext>
+              </a:extLst>
+            </p:cNvPr>
+            <p:cNvSpPr/>
+            <p:nvPr/>
+          </p:nvSpPr>
+          <p:spPr>
+            <a:xfrm>
+              <a:off x="6781028" y="1980613"/>
+              <a:ext cx="389850" cy="584775"/>
+            </a:xfrm>
+            <a:prstGeom prst="rect">
+              <a:avLst/>
+            </a:prstGeom>
+            <a:noFill/>
+          </p:spPr>
+          <p:txBody>
+            <a:bodyPr wrap="none" lIns="91440" tIns="45720" rIns="91440" bIns="45720">
+              <a:spAutoFit/>
+            </a:bodyPr>
+            <a:lstStyle/>
+            <a:p>
+              <a:pPr algn="ctr"/>
+              <a:r>
+                <a:rPr lang="en-US" sz="3200" b="0" i="0" u="none" strike="noStrike" cap="none" spc="0" dirty="0">
+                  <a:ln w="0"/>
+                  <a:solidFill>
+                    <a:schemeClr val="tx1"/>
+                  </a:solidFill>
+                  <a:effectLst>
+                    <a:outerShdw blurRad="38100" dist="19050" dir="2700000" algn="tl" rotWithShape="0">
+                      <a:schemeClr val="dk1">
+                        <a:alpha val="40000"/>
+                      </a:schemeClr>
+                    </a:outerShdw>
+                  </a:effectLst>
+                  <a:latin typeface="Calibri" panose="020F0502020204030204" pitchFamily="34" charset="0"/>
+                </a:rPr>
+                <a:t>*</a:t>
+              </a:r>
+              <a:endParaRPr lang="en-US" sz="3200" b="0" cap="none" spc="0" dirty="0">
                 <a:ln w="0"/>
                 <a:solidFill>
                   <a:schemeClr val="tx1"/>
@@ -4232,57 +5509,57 @@
                     </a:schemeClr>
                   </a:outerShdw>
                 </a:effectLst>
-                <a:latin typeface="Calibri" panose="020F0502020204030204" pitchFamily="34" charset="0"/>
-              </a:rPr>
-              <a:t>*</a:t>
-            </a:r>
-            <a:endParaRPr lang="en-US" sz="3200" b="0" cap="none" spc="0" dirty="0">
-              <a:ln w="0"/>
-              <a:solidFill>
-                <a:schemeClr val="tx1"/>
-              </a:solidFill>
-              <a:effectLst>
-                <a:outerShdw blurRad="38100" dist="19050" dir="2700000" algn="tl" rotWithShape="0">
-                  <a:schemeClr val="dk1">
-                    <a:alpha val="40000"/>
-                  </a:schemeClr>
-                </a:outerShdw>
-              </a:effectLst>
-            </a:endParaRPr>
-          </a:p>
-        </p:txBody>
-      </p:sp>
-      <p:sp>
-        <p:nvSpPr>
-          <p:cNvPr id="25" name="Rectangle 24">
-            <a:extLst>
-              <a:ext uri="{FF2B5EF4-FFF2-40B4-BE49-F238E27FC236}">
-                <a16:creationId xmlns:a16="http://schemas.microsoft.com/office/drawing/2014/main" id="{7667526A-F4FE-E617-E006-CEBBB95E3A2E}"/>
-              </a:ext>
-            </a:extLst>
-          </p:cNvPr>
-          <p:cNvSpPr/>
-          <p:nvPr/>
-        </p:nvSpPr>
-        <p:spPr>
-          <a:xfrm>
-            <a:off x="3966173" y="2984014"/>
-            <a:ext cx="389850" cy="584775"/>
-          </a:xfrm>
-          <a:prstGeom prst="rect">
-            <a:avLst/>
-          </a:prstGeom>
-          <a:noFill/>
-        </p:spPr>
-        <p:txBody>
-          <a:bodyPr wrap="none" lIns="91440" tIns="45720" rIns="91440" bIns="45720">
-            <a:spAutoFit/>
-          </a:bodyPr>
-          <a:lstStyle/>
-          <a:p>
-            <a:pPr algn="ctr"/>
-            <a:r>
-              <a:rPr lang="en-US" sz="3200" b="0" i="0" u="none" strike="noStrike" cap="none" spc="0" dirty="0">
+              </a:endParaRPr>
+            </a:p>
+          </p:txBody>
+        </p:sp>
+        <p:sp>
+          <p:nvSpPr>
+            <p:cNvPr id="25" name="Rectangle 24">
+              <a:extLst>
+                <a:ext uri="{FF2B5EF4-FFF2-40B4-BE49-F238E27FC236}">
+                  <a16:creationId xmlns:a16="http://schemas.microsoft.com/office/drawing/2014/main" id="{7667526A-F4FE-E617-E006-CEBBB95E3A2E}"/>
+                </a:ext>
+              </a:extLst>
+            </p:cNvPr>
+            <p:cNvSpPr/>
+            <p:nvPr/>
+          </p:nvSpPr>
+          <p:spPr>
+            <a:xfrm>
+              <a:off x="3966173" y="2984014"/>
+              <a:ext cx="389850" cy="584775"/>
+            </a:xfrm>
+            <a:prstGeom prst="rect">
+              <a:avLst/>
+            </a:prstGeom>
+            <a:noFill/>
+          </p:spPr>
+          <p:txBody>
+            <a:bodyPr wrap="none" lIns="91440" tIns="45720" rIns="91440" bIns="45720">
+              <a:spAutoFit/>
+            </a:bodyPr>
+            <a:lstStyle/>
+            <a:p>
+              <a:pPr algn="ctr"/>
+              <a:r>
+                <a:rPr lang="en-US" sz="3200" b="0" i="0" u="none" strike="noStrike" cap="none" spc="0" dirty="0">
+                  <a:ln w="0"/>
+                  <a:solidFill>
+                    <a:schemeClr val="tx1"/>
+                  </a:solidFill>
+                  <a:effectLst>
+                    <a:outerShdw blurRad="38100" dist="19050" dir="2700000" algn="tl" rotWithShape="0">
+                      <a:schemeClr val="dk1">
+                        <a:alpha val="40000"/>
+                      </a:schemeClr>
+                    </a:outerShdw>
+                  </a:effectLst>
+                  <a:latin typeface="Calibri" panose="020F0502020204030204" pitchFamily="34" charset="0"/>
+                </a:rPr>
+                <a:t>*</a:t>
+              </a:r>
+              <a:endParaRPr lang="en-US" sz="3200" b="0" cap="none" spc="0" dirty="0">
                 <a:ln w="0"/>
                 <a:solidFill>
                   <a:schemeClr val="tx1"/>
@@ -4294,57 +5571,57 @@
                     </a:schemeClr>
                   </a:outerShdw>
                 </a:effectLst>
-                <a:latin typeface="Calibri" panose="020F0502020204030204" pitchFamily="34" charset="0"/>
-              </a:rPr>
-              <a:t>*</a:t>
-            </a:r>
-            <a:endParaRPr lang="en-US" sz="3200" b="0" cap="none" spc="0" dirty="0">
-              <a:ln w="0"/>
-              <a:solidFill>
-                <a:schemeClr val="tx1"/>
-              </a:solidFill>
-              <a:effectLst>
-                <a:outerShdw blurRad="38100" dist="19050" dir="2700000" algn="tl" rotWithShape="0">
-                  <a:schemeClr val="dk1">
-                    <a:alpha val="40000"/>
-                  </a:schemeClr>
-                </a:outerShdw>
-              </a:effectLst>
-            </a:endParaRPr>
-          </a:p>
-        </p:txBody>
-      </p:sp>
-      <p:sp>
-        <p:nvSpPr>
-          <p:cNvPr id="27" name="Rectangle 26">
-            <a:extLst>
-              <a:ext uri="{FF2B5EF4-FFF2-40B4-BE49-F238E27FC236}">
-                <a16:creationId xmlns:a16="http://schemas.microsoft.com/office/drawing/2014/main" id="{EE1D553B-D4F3-142E-B066-1585BCD35E18}"/>
-              </a:ext>
-            </a:extLst>
-          </p:cNvPr>
-          <p:cNvSpPr/>
-          <p:nvPr/>
-        </p:nvSpPr>
-        <p:spPr>
-          <a:xfrm>
-            <a:off x="6804594" y="2935579"/>
-            <a:ext cx="389850" cy="584775"/>
-          </a:xfrm>
-          <a:prstGeom prst="rect">
-            <a:avLst/>
-          </a:prstGeom>
-          <a:noFill/>
-        </p:spPr>
-        <p:txBody>
-          <a:bodyPr wrap="none" lIns="91440" tIns="45720" rIns="91440" bIns="45720">
-            <a:spAutoFit/>
-          </a:bodyPr>
-          <a:lstStyle/>
-          <a:p>
-            <a:pPr algn="ctr"/>
-            <a:r>
-              <a:rPr lang="en-US" sz="3200" b="0" i="0" u="none" strike="noStrike" cap="none" spc="0" dirty="0">
+              </a:endParaRPr>
+            </a:p>
+          </p:txBody>
+        </p:sp>
+        <p:sp>
+          <p:nvSpPr>
+            <p:cNvPr id="27" name="Rectangle 26">
+              <a:extLst>
+                <a:ext uri="{FF2B5EF4-FFF2-40B4-BE49-F238E27FC236}">
+                  <a16:creationId xmlns:a16="http://schemas.microsoft.com/office/drawing/2014/main" id="{EE1D553B-D4F3-142E-B066-1585BCD35E18}"/>
+                </a:ext>
+              </a:extLst>
+            </p:cNvPr>
+            <p:cNvSpPr/>
+            <p:nvPr/>
+          </p:nvSpPr>
+          <p:spPr>
+            <a:xfrm>
+              <a:off x="6804594" y="2935579"/>
+              <a:ext cx="389850" cy="584775"/>
+            </a:xfrm>
+            <a:prstGeom prst="rect">
+              <a:avLst/>
+            </a:prstGeom>
+            <a:noFill/>
+          </p:spPr>
+          <p:txBody>
+            <a:bodyPr wrap="none" lIns="91440" tIns="45720" rIns="91440" bIns="45720">
+              <a:spAutoFit/>
+            </a:bodyPr>
+            <a:lstStyle/>
+            <a:p>
+              <a:pPr algn="ctr"/>
+              <a:r>
+                <a:rPr lang="en-US" sz="3200" b="0" i="0" u="none" strike="noStrike" cap="none" spc="0" dirty="0">
+                  <a:ln w="0"/>
+                  <a:solidFill>
+                    <a:schemeClr val="tx1"/>
+                  </a:solidFill>
+                  <a:effectLst>
+                    <a:outerShdw blurRad="38100" dist="19050" dir="2700000" algn="tl" rotWithShape="0">
+                      <a:schemeClr val="dk1">
+                        <a:alpha val="40000"/>
+                      </a:schemeClr>
+                    </a:outerShdw>
+                  </a:effectLst>
+                  <a:latin typeface="Calibri" panose="020F0502020204030204" pitchFamily="34" charset="0"/>
+                </a:rPr>
+                <a:t>*</a:t>
+              </a:r>
+              <a:endParaRPr lang="en-US" sz="3200" b="0" cap="none" spc="0" dirty="0">
                 <a:ln w="0"/>
                 <a:solidFill>
                   <a:schemeClr val="tx1"/>
@@ -4356,57 +5633,57 @@
                     </a:schemeClr>
                   </a:outerShdw>
                 </a:effectLst>
-                <a:latin typeface="Calibri" panose="020F0502020204030204" pitchFamily="34" charset="0"/>
-              </a:rPr>
-              <a:t>*</a:t>
-            </a:r>
-            <a:endParaRPr lang="en-US" sz="3200" b="0" cap="none" spc="0" dirty="0">
-              <a:ln w="0"/>
-              <a:solidFill>
-                <a:schemeClr val="tx1"/>
-              </a:solidFill>
-              <a:effectLst>
-                <a:outerShdw blurRad="38100" dist="19050" dir="2700000" algn="tl" rotWithShape="0">
-                  <a:schemeClr val="dk1">
-                    <a:alpha val="40000"/>
-                  </a:schemeClr>
-                </a:outerShdw>
-              </a:effectLst>
-            </a:endParaRPr>
-          </a:p>
-        </p:txBody>
-      </p:sp>
-      <p:sp>
-        <p:nvSpPr>
-          <p:cNvPr id="29" name="Rectangle 28">
-            <a:extLst>
-              <a:ext uri="{FF2B5EF4-FFF2-40B4-BE49-F238E27FC236}">
-                <a16:creationId xmlns:a16="http://schemas.microsoft.com/office/drawing/2014/main" id="{11D6FD58-17CA-B196-2202-518AD92EE179}"/>
-              </a:ext>
-            </a:extLst>
-          </p:cNvPr>
-          <p:cNvSpPr/>
-          <p:nvPr/>
-        </p:nvSpPr>
-        <p:spPr>
-          <a:xfrm>
-            <a:off x="6804594" y="3863991"/>
-            <a:ext cx="389850" cy="584775"/>
-          </a:xfrm>
-          <a:prstGeom prst="rect">
-            <a:avLst/>
-          </a:prstGeom>
-          <a:noFill/>
-        </p:spPr>
-        <p:txBody>
-          <a:bodyPr wrap="none" lIns="91440" tIns="45720" rIns="91440" bIns="45720">
-            <a:spAutoFit/>
-          </a:bodyPr>
-          <a:lstStyle/>
-          <a:p>
-            <a:pPr algn="ctr"/>
-            <a:r>
-              <a:rPr lang="en-US" sz="3200" b="0" i="0" u="none" strike="noStrike" cap="none" spc="0" dirty="0">
+              </a:endParaRPr>
+            </a:p>
+          </p:txBody>
+        </p:sp>
+        <p:sp>
+          <p:nvSpPr>
+            <p:cNvPr id="29" name="Rectangle 28">
+              <a:extLst>
+                <a:ext uri="{FF2B5EF4-FFF2-40B4-BE49-F238E27FC236}">
+                  <a16:creationId xmlns:a16="http://schemas.microsoft.com/office/drawing/2014/main" id="{11D6FD58-17CA-B196-2202-518AD92EE179}"/>
+                </a:ext>
+              </a:extLst>
+            </p:cNvPr>
+            <p:cNvSpPr/>
+            <p:nvPr/>
+          </p:nvSpPr>
+          <p:spPr>
+            <a:xfrm>
+              <a:off x="6804594" y="3863991"/>
+              <a:ext cx="389850" cy="584775"/>
+            </a:xfrm>
+            <a:prstGeom prst="rect">
+              <a:avLst/>
+            </a:prstGeom>
+            <a:noFill/>
+          </p:spPr>
+          <p:txBody>
+            <a:bodyPr wrap="none" lIns="91440" tIns="45720" rIns="91440" bIns="45720">
+              <a:spAutoFit/>
+            </a:bodyPr>
+            <a:lstStyle/>
+            <a:p>
+              <a:pPr algn="ctr"/>
+              <a:r>
+                <a:rPr lang="en-US" sz="3200" b="0" i="0" u="none" strike="noStrike" cap="none" spc="0" dirty="0">
+                  <a:ln w="0"/>
+                  <a:solidFill>
+                    <a:schemeClr val="tx1"/>
+                  </a:solidFill>
+                  <a:effectLst>
+                    <a:outerShdw blurRad="38100" dist="19050" dir="2700000" algn="tl" rotWithShape="0">
+                      <a:schemeClr val="dk1">
+                        <a:alpha val="40000"/>
+                      </a:schemeClr>
+                    </a:outerShdw>
+                  </a:effectLst>
+                  <a:latin typeface="Calibri" panose="020F0502020204030204" pitchFamily="34" charset="0"/>
+                </a:rPr>
+                <a:t>*</a:t>
+              </a:r>
+              <a:endParaRPr lang="en-US" sz="3200" b="0" cap="none" spc="0" dirty="0">
                 <a:ln w="0"/>
                 <a:solidFill>
                   <a:schemeClr val="tx1"/>
@@ -4418,57 +5695,57 @@
                     </a:schemeClr>
                   </a:outerShdw>
                 </a:effectLst>
-                <a:latin typeface="Calibri" panose="020F0502020204030204" pitchFamily="34" charset="0"/>
-              </a:rPr>
-              <a:t>*</a:t>
-            </a:r>
-            <a:endParaRPr lang="en-US" sz="3200" b="0" cap="none" spc="0" dirty="0">
-              <a:ln w="0"/>
-              <a:solidFill>
-                <a:schemeClr val="tx1"/>
-              </a:solidFill>
-              <a:effectLst>
-                <a:outerShdw blurRad="38100" dist="19050" dir="2700000" algn="tl" rotWithShape="0">
-                  <a:schemeClr val="dk1">
-                    <a:alpha val="40000"/>
-                  </a:schemeClr>
-                </a:outerShdw>
-              </a:effectLst>
-            </a:endParaRPr>
-          </a:p>
-        </p:txBody>
-      </p:sp>
-      <p:sp>
-        <p:nvSpPr>
-          <p:cNvPr id="32" name="Rectangle 31">
-            <a:extLst>
-              <a:ext uri="{FF2B5EF4-FFF2-40B4-BE49-F238E27FC236}">
-                <a16:creationId xmlns:a16="http://schemas.microsoft.com/office/drawing/2014/main" id="{B93E15C7-3F37-CDF2-4F77-2FB6AF1F90B9}"/>
-              </a:ext>
-            </a:extLst>
-          </p:cNvPr>
-          <p:cNvSpPr/>
-          <p:nvPr/>
-        </p:nvSpPr>
-        <p:spPr>
-          <a:xfrm>
-            <a:off x="5847643" y="1997250"/>
-            <a:ext cx="389850" cy="584775"/>
-          </a:xfrm>
-          <a:prstGeom prst="rect">
-            <a:avLst/>
-          </a:prstGeom>
-          <a:noFill/>
-        </p:spPr>
-        <p:txBody>
-          <a:bodyPr wrap="none" lIns="91440" tIns="45720" rIns="91440" bIns="45720">
-            <a:spAutoFit/>
-          </a:bodyPr>
-          <a:lstStyle/>
-          <a:p>
-            <a:pPr algn="ctr"/>
-            <a:r>
-              <a:rPr lang="en-US" sz="3200" b="0" i="0" u="none" strike="noStrike" cap="none" spc="0" dirty="0">
+              </a:endParaRPr>
+            </a:p>
+          </p:txBody>
+        </p:sp>
+        <p:sp>
+          <p:nvSpPr>
+            <p:cNvPr id="32" name="Rectangle 31">
+              <a:extLst>
+                <a:ext uri="{FF2B5EF4-FFF2-40B4-BE49-F238E27FC236}">
+                  <a16:creationId xmlns:a16="http://schemas.microsoft.com/office/drawing/2014/main" id="{B93E15C7-3F37-CDF2-4F77-2FB6AF1F90B9}"/>
+                </a:ext>
+              </a:extLst>
+            </p:cNvPr>
+            <p:cNvSpPr/>
+            <p:nvPr/>
+          </p:nvSpPr>
+          <p:spPr>
+            <a:xfrm>
+              <a:off x="5847643" y="1997250"/>
+              <a:ext cx="389850" cy="584775"/>
+            </a:xfrm>
+            <a:prstGeom prst="rect">
+              <a:avLst/>
+            </a:prstGeom>
+            <a:noFill/>
+          </p:spPr>
+          <p:txBody>
+            <a:bodyPr wrap="none" lIns="91440" tIns="45720" rIns="91440" bIns="45720">
+              <a:spAutoFit/>
+            </a:bodyPr>
+            <a:lstStyle/>
+            <a:p>
+              <a:pPr algn="ctr"/>
+              <a:r>
+                <a:rPr lang="en-US" sz="3200" b="0" i="0" u="none" strike="noStrike" cap="none" spc="0" dirty="0">
+                  <a:ln w="0"/>
+                  <a:solidFill>
+                    <a:schemeClr val="tx1"/>
+                  </a:solidFill>
+                  <a:effectLst>
+                    <a:outerShdw blurRad="38100" dist="19050" dir="2700000" algn="tl" rotWithShape="0">
+                      <a:schemeClr val="dk1">
+                        <a:alpha val="40000"/>
+                      </a:schemeClr>
+                    </a:outerShdw>
+                  </a:effectLst>
+                  <a:latin typeface="Calibri" panose="020F0502020204030204" pitchFamily="34" charset="0"/>
+                </a:rPr>
+                <a:t>*</a:t>
+              </a:r>
+              <a:endParaRPr lang="en-US" sz="3200" b="0" cap="none" spc="0" dirty="0">
                 <a:ln w="0"/>
                 <a:solidFill>
                   <a:schemeClr val="tx1"/>
@@ -4480,57 +5757,57 @@
                     </a:schemeClr>
                   </a:outerShdw>
                 </a:effectLst>
-                <a:latin typeface="Calibri" panose="020F0502020204030204" pitchFamily="34" charset="0"/>
-              </a:rPr>
-              <a:t>*</a:t>
-            </a:r>
-            <a:endParaRPr lang="en-US" sz="3200" b="0" cap="none" spc="0" dirty="0">
-              <a:ln w="0"/>
-              <a:solidFill>
-                <a:schemeClr val="tx1"/>
-              </a:solidFill>
-              <a:effectLst>
-                <a:outerShdw blurRad="38100" dist="19050" dir="2700000" algn="tl" rotWithShape="0">
-                  <a:schemeClr val="dk1">
-                    <a:alpha val="40000"/>
-                  </a:schemeClr>
-                </a:outerShdw>
-              </a:effectLst>
-            </a:endParaRPr>
-          </a:p>
-        </p:txBody>
-      </p:sp>
-      <p:sp>
-        <p:nvSpPr>
-          <p:cNvPr id="33" name="Rectangle 32">
-            <a:extLst>
-              <a:ext uri="{FF2B5EF4-FFF2-40B4-BE49-F238E27FC236}">
-                <a16:creationId xmlns:a16="http://schemas.microsoft.com/office/drawing/2014/main" id="{6FD2C49A-8A6E-2B3F-53C7-35CDD441FFF9}"/>
-              </a:ext>
-            </a:extLst>
-          </p:cNvPr>
-          <p:cNvSpPr/>
-          <p:nvPr/>
-        </p:nvSpPr>
-        <p:spPr>
-          <a:xfrm>
-            <a:off x="3966173" y="3888502"/>
-            <a:ext cx="389850" cy="584775"/>
-          </a:xfrm>
-          <a:prstGeom prst="rect">
-            <a:avLst/>
-          </a:prstGeom>
-          <a:noFill/>
-        </p:spPr>
-        <p:txBody>
-          <a:bodyPr wrap="none" lIns="91440" tIns="45720" rIns="91440" bIns="45720">
-            <a:spAutoFit/>
-          </a:bodyPr>
-          <a:lstStyle/>
-          <a:p>
-            <a:pPr algn="ctr"/>
-            <a:r>
-              <a:rPr lang="en-US" sz="3200" b="0" i="0" u="none" strike="noStrike" cap="none" spc="0" dirty="0">
+              </a:endParaRPr>
+            </a:p>
+          </p:txBody>
+        </p:sp>
+        <p:sp>
+          <p:nvSpPr>
+            <p:cNvPr id="33" name="Rectangle 32">
+              <a:extLst>
+                <a:ext uri="{FF2B5EF4-FFF2-40B4-BE49-F238E27FC236}">
+                  <a16:creationId xmlns:a16="http://schemas.microsoft.com/office/drawing/2014/main" id="{6FD2C49A-8A6E-2B3F-53C7-35CDD441FFF9}"/>
+                </a:ext>
+              </a:extLst>
+            </p:cNvPr>
+            <p:cNvSpPr/>
+            <p:nvPr/>
+          </p:nvSpPr>
+          <p:spPr>
+            <a:xfrm>
+              <a:off x="3966173" y="3888502"/>
+              <a:ext cx="389850" cy="584775"/>
+            </a:xfrm>
+            <a:prstGeom prst="rect">
+              <a:avLst/>
+            </a:prstGeom>
+            <a:noFill/>
+          </p:spPr>
+          <p:txBody>
+            <a:bodyPr wrap="none" lIns="91440" tIns="45720" rIns="91440" bIns="45720">
+              <a:spAutoFit/>
+            </a:bodyPr>
+            <a:lstStyle/>
+            <a:p>
+              <a:pPr algn="ctr"/>
+              <a:r>
+                <a:rPr lang="en-US" sz="3200" b="0" i="0" u="none" strike="noStrike" cap="none" spc="0" dirty="0">
+                  <a:ln w="0"/>
+                  <a:solidFill>
+                    <a:schemeClr val="tx1"/>
+                  </a:solidFill>
+                  <a:effectLst>
+                    <a:outerShdw blurRad="38100" dist="19050" dir="2700000" algn="tl" rotWithShape="0">
+                      <a:schemeClr val="dk1">
+                        <a:alpha val="40000"/>
+                      </a:schemeClr>
+                    </a:outerShdw>
+                  </a:effectLst>
+                  <a:latin typeface="Calibri" panose="020F0502020204030204" pitchFamily="34" charset="0"/>
+                </a:rPr>
+                <a:t>*</a:t>
+              </a:r>
+              <a:endParaRPr lang="en-US" sz="3200" b="0" cap="none" spc="0" dirty="0">
                 <a:ln w="0"/>
                 <a:solidFill>
                   <a:schemeClr val="tx1"/>
@@ -4542,26 +5819,11 @@
                     </a:schemeClr>
                   </a:outerShdw>
                 </a:effectLst>
-                <a:latin typeface="Calibri" panose="020F0502020204030204" pitchFamily="34" charset="0"/>
-              </a:rPr>
-              <a:t>*</a:t>
-            </a:r>
-            <a:endParaRPr lang="en-US" sz="3200" b="0" cap="none" spc="0" dirty="0">
-              <a:ln w="0"/>
-              <a:solidFill>
-                <a:schemeClr val="tx1"/>
-              </a:solidFill>
-              <a:effectLst>
-                <a:outerShdw blurRad="38100" dist="19050" dir="2700000" algn="tl" rotWithShape="0">
-                  <a:schemeClr val="dk1">
-                    <a:alpha val="40000"/>
-                  </a:schemeClr>
-                </a:outerShdw>
-              </a:effectLst>
-            </a:endParaRPr>
-          </a:p>
-        </p:txBody>
-      </p:sp>
+              </a:endParaRPr>
+            </a:p>
+          </p:txBody>
+        </p:sp>
+      </p:grpSp>
     </p:spTree>
     <p:extLst>
       <p:ext uri="{BB962C8B-B14F-4D97-AF65-F5344CB8AC3E}">
@@ -5695,6 +6957,7 @@
               <a:rPr lang="en-US" sz="900" b="1" dirty="0"/>
               <a:t>Presence/Absence</a:t>
             </a:r>
+            <a:endParaRPr lang="en-US" sz="900" dirty="0"/>
           </a:p>
           <a:p>
             <a:r>
@@ -5749,7 +7012,7 @@
           <a:p>
             <a:r>
               <a:rPr lang="en-US" sz="900" dirty="0"/>
-              <a:t>(Intercept) -0.31286    0.03152  -9.925   &lt;2e-16 ***</a:t>
+              <a:t>(Intercept) -0.42253    0.02527  -16.72   &lt;2e-16 ***</a:t>
             </a:r>
           </a:p>
           <a:p>
@@ -5810,7 +7073,7 @@
           <a:p>
             <a:r>
               <a:rPr lang="en-US" sz="900" dirty="0"/>
-              <a:t>s(salinity) 8.373  8.875  105.7  &lt;2e-16 ***</a:t>
+              <a:t>s(salinity) 8.488  8.923  242.3  &lt;2e-16 ***</a:t>
             </a:r>
           </a:p>
           <a:p>
@@ -5835,13 +7098,13 @@
           <a:p>
             <a:r>
               <a:rPr lang="en-US" sz="900" dirty="0"/>
-              <a:t>R-sq.(adj) =  0.0248   Deviance explained = 2.02%</a:t>
-            </a:r>
-          </a:p>
-          <a:p>
-            <a:r>
-              <a:rPr lang="en-US" sz="900" dirty="0"/>
-              <a:t>UBRE = 0.33999  Scale est. = 1         n = 4249</a:t>
+              <a:t>R-sq.(adj) =  0.0356   Deviance explained = 2.81%</a:t>
+            </a:r>
+          </a:p>
+          <a:p>
+            <a:r>
+              <a:rPr lang="en-US" sz="900" dirty="0"/>
+              <a:t>UBRE = 0.31076  Scale est. = 1         n = 6827</a:t>
             </a:r>
           </a:p>
         </p:txBody>
@@ -5883,7 +7146,7 @@
           <a:p>
             <a:r>
               <a:rPr lang="en-US" sz="900" dirty="0"/>
-              <a:t>Family: Negative Binomial(1.032) </a:t>
+              <a:t>Family: Negative Binomial(0.92) </a:t>
             </a:r>
           </a:p>
           <a:p>
@@ -5933,7 +7196,7 @@
           <a:p>
             <a:r>
               <a:rPr lang="en-US" sz="900" dirty="0"/>
-              <a:t>(Intercept)   7.6221     0.0232   328.5   &lt;2e-16 ***</a:t>
+              <a:t>(Intercept)  7.28671    0.01997   364.8   &lt;2e-16 ***</a:t>
             </a:r>
           </a:p>
           <a:p>
@@ -5994,13 +7257,13 @@
           <a:p>
             <a:r>
               <a:rPr lang="en-US" sz="900" dirty="0"/>
-              <a:t>s(salinity) 8.835  8.992 2377.3  &lt;2e-16 ***</a:t>
-            </a:r>
-          </a:p>
-          <a:p>
-            <a:r>
-              <a:rPr lang="en-US" sz="900" dirty="0"/>
-              <a:t>s(month)    3.361  3.773  124.2  &lt;2e-16 ***</a:t>
+              <a:t>s(salinity) 8.745  8.981 2569.7  &lt;2e-16 ***</a:t>
+            </a:r>
+          </a:p>
+          <a:p>
+            <a:r>
+              <a:rPr lang="en-US" sz="900" dirty="0"/>
+              <a:t>s(month)    3.908  3.995  810.3  &lt;2e-16 ***</a:t>
             </a:r>
           </a:p>
           <a:p>
@@ -6025,13 +7288,13 @@
           <a:p>
             <a:r>
               <a:rPr lang="en-US" sz="900" dirty="0"/>
-              <a:t>R-sq.(adj) =  0.351   Deviance explained = 46.3%</a:t>
-            </a:r>
-          </a:p>
-          <a:p>
-            <a:r>
-              <a:rPr lang="en-US" sz="900" dirty="0"/>
-              <a:t>-REML =  15574  Scale est. = 1         n = 1802</a:t>
+              <a:t>R-sq.(adj) =  0.416   Deviance explained = 46.7%</a:t>
+            </a:r>
+          </a:p>
+          <a:p>
+            <a:r>
+              <a:rPr lang="en-US" sz="900" dirty="0"/>
+              <a:t>-REML =  22650  Scale est. = 1         n = 2729</a:t>
             </a:r>
           </a:p>
         </p:txBody>
@@ -6093,9 +7356,8 @@
               </a:ext>
             </a:extLst>
           </a:blip>
-          <a:stretch>
-            <a:fillRect/>
-          </a:stretch>
+          <a:srcRect/>
+          <a:stretch/>
         </p:blipFill>
         <p:spPr>
           <a:xfrm>
@@ -6692,7 +7954,7 @@
       </p:sp>
       <p:pic>
         <p:nvPicPr>
-          <p:cNvPr id="5" name="Picture 4" descr="Diagram&#10;&#10;Description automatically generated with low confidence">
+          <p:cNvPr id="5" name="Picture 4">
             <a:extLst>
               <a:ext uri="{FF2B5EF4-FFF2-40B4-BE49-F238E27FC236}">
                 <a16:creationId xmlns:a16="http://schemas.microsoft.com/office/drawing/2014/main" id="{F2F2F654-FE9F-B627-F699-AA451159A393}"/>
@@ -6705,21 +7967,20 @@
           <p:nvPr/>
         </p:nvPicPr>
         <p:blipFill>
-          <a:blip r:embed="rId2">
+          <a:blip r:embed="rId3">
             <a:extLst>
               <a:ext uri="{28A0092B-C50C-407E-A947-70E740481C1C}">
                 <a14:useLocalDpi xmlns:a14="http://schemas.microsoft.com/office/drawing/2010/main" val="0"/>
               </a:ext>
             </a:extLst>
           </a:blip>
-          <a:stretch>
-            <a:fillRect/>
-          </a:stretch>
+          <a:srcRect/>
+          <a:stretch/>
         </p:blipFill>
         <p:spPr>
           <a:xfrm>
             <a:off x="7726860" y="0"/>
-            <a:ext cx="4408714" cy="6858000"/>
+            <a:ext cx="4408714" cy="6857999"/>
           </a:xfrm>
           <a:prstGeom prst="rect">
             <a:avLst/>
@@ -6746,14 +8007,14 @@
           <p:nvPr>
             <p:extLst>
               <p:ext uri="{D42A27DB-BD31-4B8C-83A1-F6EECF244321}">
-                <p14:modId xmlns:p14="http://schemas.microsoft.com/office/powerpoint/2010/main" val="4056011892"/>
+                <p14:modId xmlns:p14="http://schemas.microsoft.com/office/powerpoint/2010/main" val="3093341510"/>
               </p:ext>
             </p:extLst>
           </p:nvPr>
         </p:nvGraphicFramePr>
         <p:xfrm>
           <a:off x="1294441" y="2343539"/>
-          <a:ext cx="5524500" cy="1645920"/>
+          <a:ext cx="5524500" cy="1699739"/>
         </p:xfrm>
         <a:graphic>
           <a:graphicData uri="http://schemas.openxmlformats.org/drawingml/2006/table">
@@ -6791,7 +8052,7 @@
                   </a:extLst>
                 </a:gridCol>
               </a:tblGrid>
-              <a:tr h="182880">
+              <a:tr h="236699">
                 <a:tc>
                   <a:txBody>
                     <a:bodyPr/>
@@ -7743,8 +9004,8 @@
         </p:blipFill>
         <p:spPr>
           <a:xfrm>
-            <a:off x="4414118" y="1066565"/>
-            <a:ext cx="7774398" cy="5182933"/>
+            <a:off x="4414118" y="1066566"/>
+            <a:ext cx="7774398" cy="5182931"/>
           </a:xfrm>
           <a:prstGeom prst="rect">
             <a:avLst/>
@@ -7864,7 +9125,7 @@
       </p:grpSpPr>
       <p:pic>
         <p:nvPicPr>
-          <p:cNvPr id="3" name="Picture 2" descr="Chart, box and whisker chart&#10;&#10;Description automatically generated">
+          <p:cNvPr id="3" name="Picture 2">
             <a:extLst>
               <a:ext uri="{FF2B5EF4-FFF2-40B4-BE49-F238E27FC236}">
                 <a16:creationId xmlns:a16="http://schemas.microsoft.com/office/drawing/2014/main" id="{01410686-AB3B-369D-659E-7A677DB4B5A9}"/>
@@ -7884,9 +9145,8 @@
               </a:ext>
             </a:extLst>
           </a:blip>
-          <a:stretch>
-            <a:fillRect/>
-          </a:stretch>
+          <a:srcRect/>
+          <a:stretch/>
         </p:blipFill>
         <p:spPr>
           <a:xfrm>
@@ -7918,7 +9178,7 @@
           <p:nvPr>
             <p:extLst>
               <p:ext uri="{D42A27DB-BD31-4B8C-83A1-F6EECF244321}">
-                <p14:modId xmlns:p14="http://schemas.microsoft.com/office/powerpoint/2010/main" val="3620362097"/>
+                <p14:modId xmlns:p14="http://schemas.microsoft.com/office/powerpoint/2010/main" val="3342924536"/>
               </p:ext>
             </p:extLst>
           </p:nvPr>
@@ -8139,12 +9399,18 @@
                     <a:p>
                       <a:pPr algn="l" fontAlgn="b"/>
                       <a:r>
-                        <a:rPr lang="en-US" sz="1100" u="none" strike="noStrike">
+                        <a:rPr lang="en-US" sz="1100" u="none" strike="noStrike" dirty="0" err="1">
                           <a:effectLst/>
                         </a:rPr>
-                        <a:t>aov(log(BPUE + 1) ~ Drought)</a:t>
+                        <a:t>aov</a:t>
                       </a:r>
-                      <a:endParaRPr lang="en-US" sz="1100" b="0" i="0" u="none" strike="noStrike">
+                      <a:r>
+                        <a:rPr lang="en-US" sz="1100" u="none" strike="noStrike" dirty="0">
+                          <a:effectLst/>
+                        </a:rPr>
+                        <a:t>(log(BPUE + 1) ~ Drought)</a:t>
+                      </a:r>
+                      <a:endParaRPr lang="en-US" sz="1100" b="0" i="0" u="none" strike="noStrike" dirty="0">
                         <a:solidFill>
                           <a:srgbClr val="000000"/>
                         </a:solidFill>
@@ -8238,12 +9504,12 @@
                     <a:p>
                       <a:pPr algn="r" fontAlgn="b"/>
                       <a:r>
-                        <a:rPr lang="en-US" sz="1100" u="none" strike="noStrike">
+                        <a:rPr lang="en-US" sz="1100" u="none" strike="noStrike" dirty="0">
                           <a:effectLst/>
                         </a:rPr>
-                        <a:t>0.0055199</a:t>
+                        <a:t>0.00552</a:t>
                       </a:r>
-                      <a:endParaRPr lang="en-US" sz="1100" b="0" i="0" u="none" strike="noStrike">
+                      <a:endParaRPr lang="en-US" sz="1100" b="0" i="0" u="none" strike="noStrike" dirty="0">
                         <a:solidFill>
                           <a:srgbClr val="000000"/>
                         </a:solidFill>

</xml_diff>